<commit_message>
Squash: started Landau damping
</commit_message>
<xml_diff>
--- a/MATLAB/Matlab implementation.pptx
+++ b/MATLAB/Matlab implementation.pptx
@@ -22,6 +22,7 @@
     <p:sldId id="273" r:id="rId16"/>
     <p:sldId id="274" r:id="rId17"/>
     <p:sldId id="275" r:id="rId18"/>
+    <p:sldId id="276" r:id="rId19"/>
   </p:sldIdLst>
   <p:sldSz cx="12192000" cy="6858000"/>
   <p:notesSz cx="6858000" cy="9144000"/>
@@ -120,6 +121,11 @@
       </a:defRPr>
     </a:lvl9pPr>
   </p:defaultTextStyle>
+  <p:extLst>
+    <p:ext uri="{EFAFB233-063F-42B5-8137-9DF3F51BA10A}">
+      <p15:sldGuideLst xmlns:p15="http://schemas.microsoft.com/office/powerpoint/2012/main"/>
+    </p:ext>
+  </p:extLst>
 </p:presentation>
 </file>
 
@@ -272,7 +278,7 @@
           <a:p>
             <a:fld id="{4DD88CC0-223C-42D1-8E07-16FF5CB0841E}" type="datetimeFigureOut">
               <a:rPr lang="es-ES" smtClean="0"/>
-              <a:t>04/11/2022</a:t>
+              <a:t>08/11/2022</a:t>
             </a:fld>
             <a:endParaRPr lang="es-ES"/>
           </a:p>
@@ -472,7 +478,7 @@
           <a:p>
             <a:fld id="{4DD88CC0-223C-42D1-8E07-16FF5CB0841E}" type="datetimeFigureOut">
               <a:rPr lang="es-ES" smtClean="0"/>
-              <a:t>04/11/2022</a:t>
+              <a:t>08/11/2022</a:t>
             </a:fld>
             <a:endParaRPr lang="es-ES"/>
           </a:p>
@@ -682,7 +688,7 @@
           <a:p>
             <a:fld id="{4DD88CC0-223C-42D1-8E07-16FF5CB0841E}" type="datetimeFigureOut">
               <a:rPr lang="es-ES" smtClean="0"/>
-              <a:t>04/11/2022</a:t>
+              <a:t>08/11/2022</a:t>
             </a:fld>
             <a:endParaRPr lang="es-ES"/>
           </a:p>
@@ -882,7 +888,7 @@
           <a:p>
             <a:fld id="{4DD88CC0-223C-42D1-8E07-16FF5CB0841E}" type="datetimeFigureOut">
               <a:rPr lang="es-ES" smtClean="0"/>
-              <a:t>04/11/2022</a:t>
+              <a:t>08/11/2022</a:t>
             </a:fld>
             <a:endParaRPr lang="es-ES"/>
           </a:p>
@@ -1158,7 +1164,7 @@
           <a:p>
             <a:fld id="{4DD88CC0-223C-42D1-8E07-16FF5CB0841E}" type="datetimeFigureOut">
               <a:rPr lang="es-ES" smtClean="0"/>
-              <a:t>04/11/2022</a:t>
+              <a:t>08/11/2022</a:t>
             </a:fld>
             <a:endParaRPr lang="es-ES"/>
           </a:p>
@@ -1426,7 +1432,7 @@
           <a:p>
             <a:fld id="{4DD88CC0-223C-42D1-8E07-16FF5CB0841E}" type="datetimeFigureOut">
               <a:rPr lang="es-ES" smtClean="0"/>
-              <a:t>04/11/2022</a:t>
+              <a:t>08/11/2022</a:t>
             </a:fld>
             <a:endParaRPr lang="es-ES"/>
           </a:p>
@@ -1841,7 +1847,7 @@
           <a:p>
             <a:fld id="{4DD88CC0-223C-42D1-8E07-16FF5CB0841E}" type="datetimeFigureOut">
               <a:rPr lang="es-ES" smtClean="0"/>
-              <a:t>04/11/2022</a:t>
+              <a:t>08/11/2022</a:t>
             </a:fld>
             <a:endParaRPr lang="es-ES"/>
           </a:p>
@@ -1983,7 +1989,7 @@
           <a:p>
             <a:fld id="{4DD88CC0-223C-42D1-8E07-16FF5CB0841E}" type="datetimeFigureOut">
               <a:rPr lang="es-ES" smtClean="0"/>
-              <a:t>04/11/2022</a:t>
+              <a:t>08/11/2022</a:t>
             </a:fld>
             <a:endParaRPr lang="es-ES"/>
           </a:p>
@@ -2096,7 +2102,7 @@
           <a:p>
             <a:fld id="{4DD88CC0-223C-42D1-8E07-16FF5CB0841E}" type="datetimeFigureOut">
               <a:rPr lang="es-ES" smtClean="0"/>
-              <a:t>04/11/2022</a:t>
+              <a:t>08/11/2022</a:t>
             </a:fld>
             <a:endParaRPr lang="es-ES"/>
           </a:p>
@@ -2409,7 +2415,7 @@
           <a:p>
             <a:fld id="{4DD88CC0-223C-42D1-8E07-16FF5CB0841E}" type="datetimeFigureOut">
               <a:rPr lang="es-ES" smtClean="0"/>
-              <a:t>04/11/2022</a:t>
+              <a:t>08/11/2022</a:t>
             </a:fld>
             <a:endParaRPr lang="es-ES"/>
           </a:p>
@@ -2698,7 +2704,7 @@
           <a:p>
             <a:fld id="{4DD88CC0-223C-42D1-8E07-16FF5CB0841E}" type="datetimeFigureOut">
               <a:rPr lang="es-ES" smtClean="0"/>
-              <a:t>04/11/2022</a:t>
+              <a:t>08/11/2022</a:t>
             </a:fld>
             <a:endParaRPr lang="es-ES"/>
           </a:p>
@@ -2941,7 +2947,7 @@
           <a:p>
             <a:fld id="{4DD88CC0-223C-42D1-8E07-16FF5CB0841E}" type="datetimeFigureOut">
               <a:rPr lang="es-ES" smtClean="0"/>
-              <a:t>04/11/2022</a:t>
+              <a:t>08/11/2022</a:t>
             </a:fld>
             <a:endParaRPr lang="es-ES"/>
           </a:p>
@@ -5437,6 +5443,92 @@
 </p:sld>
 </file>
 
+<file path=ppt/slides/slide18.xml><?xml version="1.0" encoding="utf-8"?>
+<p:sld xmlns:a="http://schemas.openxmlformats.org/drawingml/2006/main" xmlns:r="http://schemas.openxmlformats.org/officeDocument/2006/relationships" xmlns:p="http://schemas.openxmlformats.org/presentationml/2006/main">
+  <p:cSld>
+    <p:spTree>
+      <p:nvGrpSpPr>
+        <p:cNvPr id="1" name=""/>
+        <p:cNvGrpSpPr/>
+        <p:nvPr/>
+      </p:nvGrpSpPr>
+      <p:grpSpPr>
+        <a:xfrm>
+          <a:off x="0" y="0"/>
+          <a:ext cx="0" cy="0"/>
+          <a:chOff x="0" y="0"/>
+          <a:chExt cx="0" cy="0"/>
+        </a:xfrm>
+      </p:grpSpPr>
+      <p:sp>
+        <p:nvSpPr>
+          <p:cNvPr id="2" name="Title 1">
+            <a:extLst>
+              <a:ext uri="{FF2B5EF4-FFF2-40B4-BE49-F238E27FC236}">
+                <a16:creationId xmlns:a16="http://schemas.microsoft.com/office/drawing/2014/main" id="{AFD7D6B8-FA78-4ED7-A594-C8954E05541C}"/>
+              </a:ext>
+            </a:extLst>
+          </p:cNvPr>
+          <p:cNvSpPr>
+            <a:spLocks noGrp="1"/>
+          </p:cNvSpPr>
+          <p:nvPr>
+            <p:ph type="title"/>
+          </p:nvPr>
+        </p:nvSpPr>
+        <p:spPr/>
+        <p:txBody>
+          <a:bodyPr/>
+          <a:lstStyle/>
+          <a:p>
+            <a:r>
+              <a:rPr lang="en-GB" dirty="0"/>
+              <a:t>Observation</a:t>
+            </a:r>
+          </a:p>
+        </p:txBody>
+      </p:sp>
+      <p:sp>
+        <p:nvSpPr>
+          <p:cNvPr id="3" name="Content Placeholder 2">
+            <a:extLst>
+              <a:ext uri="{FF2B5EF4-FFF2-40B4-BE49-F238E27FC236}">
+                <a16:creationId xmlns:a16="http://schemas.microsoft.com/office/drawing/2014/main" id="{EF26B421-FC7C-4D72-A75D-D3E58443850A}"/>
+              </a:ext>
+            </a:extLst>
+          </p:cNvPr>
+          <p:cNvSpPr>
+            <a:spLocks noGrp="1"/>
+          </p:cNvSpPr>
+          <p:nvPr>
+            <p:ph idx="1"/>
+          </p:nvPr>
+        </p:nvSpPr>
+        <p:spPr/>
+        <p:txBody>
+          <a:bodyPr/>
+          <a:lstStyle/>
+          <a:p>
+            <a:r>
+              <a:rPr lang="en-GB" dirty="0"/>
+              <a:t>I’ve been doing 1D3V simulations while in last year it was all 1D1V</a:t>
+            </a:r>
+          </a:p>
+        </p:txBody>
+      </p:sp>
+    </p:spTree>
+    <p:extLst>
+      <p:ext uri="{BB962C8B-B14F-4D97-AF65-F5344CB8AC3E}">
+        <p14:creationId xmlns:p14="http://schemas.microsoft.com/office/powerpoint/2010/main" val="4066802917"/>
+      </p:ext>
+    </p:extLst>
+  </p:cSld>
+  <p:clrMapOvr>
+    <a:masterClrMapping/>
+  </p:clrMapOvr>
+</p:sld>
+</file>
+
 <file path=ppt/slides/slide2.xml><?xml version="1.0" encoding="utf-8"?>
 <p:sld xmlns:a="http://schemas.openxmlformats.org/drawingml/2006/main" xmlns:r="http://schemas.openxmlformats.org/officeDocument/2006/relationships" xmlns:p="http://schemas.openxmlformats.org/presentationml/2006/main">
   <p:cSld>
@@ -6729,8 +6821,8 @@
           </a:fontRef>
         </p:style>
       </p:cxnSp>
-      <mc:AlternateContent xmlns:mc="http://schemas.openxmlformats.org/markup-compatibility/2006">
-        <mc:Choice xmlns:a14="http://schemas.microsoft.com/office/drawing/2010/main" Requires="a14">
+      <mc:AlternateContent xmlns:mc="http://schemas.openxmlformats.org/markup-compatibility/2006" xmlns:a14="http://schemas.microsoft.com/office/drawing/2010/main">
+        <mc:Choice Requires="a14">
           <p:sp>
             <p:nvSpPr>
               <p:cNvPr id="13" name="TextBox 12">
@@ -6885,7 +6977,7 @@
             </p:txBody>
           </p:sp>
         </mc:Choice>
-        <mc:Fallback>
+        <mc:Fallback xmlns="">
           <p:sp>
             <p:nvSpPr>
               <p:cNvPr id="13" name="TextBox 12">
@@ -6971,8 +7063,8 @@
           </a:fontRef>
         </p:style>
       </p:cxnSp>
-      <mc:AlternateContent xmlns:mc="http://schemas.openxmlformats.org/markup-compatibility/2006">
-        <mc:Choice xmlns:a14="http://schemas.microsoft.com/office/drawing/2010/main" Requires="a14">
+      <mc:AlternateContent xmlns:mc="http://schemas.openxmlformats.org/markup-compatibility/2006" xmlns:a14="http://schemas.microsoft.com/office/drawing/2010/main">
+        <mc:Choice Requires="a14">
           <p:sp>
             <p:nvSpPr>
               <p:cNvPr id="17" name="TextBox 16">
@@ -7063,7 +7155,7 @@
             </p:txBody>
           </p:sp>
         </mc:Choice>
-        <mc:Fallback>
+        <mc:Fallback xmlns="">
           <p:sp>
             <p:nvSpPr>
               <p:cNvPr id="17" name="TextBox 16">
@@ -7108,8 +7200,8 @@
           </p:sp>
         </mc:Fallback>
       </mc:AlternateContent>
-      <mc:AlternateContent xmlns:mc="http://schemas.openxmlformats.org/markup-compatibility/2006">
-        <mc:Choice xmlns:a14="http://schemas.microsoft.com/office/drawing/2010/main" Requires="a14">
+      <mc:AlternateContent xmlns:mc="http://schemas.openxmlformats.org/markup-compatibility/2006" xmlns:a14="http://schemas.microsoft.com/office/drawing/2010/main">
+        <mc:Choice Requires="a14">
           <p:sp>
             <p:nvSpPr>
               <p:cNvPr id="8" name="TextBox 7">
@@ -7268,7 +7360,7 @@
             </p:txBody>
           </p:sp>
         </mc:Choice>
-        <mc:Fallback>
+        <mc:Fallback xmlns="">
           <p:sp>
             <p:nvSpPr>
               <p:cNvPr id="8" name="TextBox 7">

</xml_diff>

<commit_message>
Landau Damping With Absolute Scale
</commit_message>
<xml_diff>
--- a/MATLAB/Matlab implementation.pptx
+++ b/MATLAB/Matlab implementation.pptx
@@ -23,6 +23,13 @@
     <p:sldId id="274" r:id="rId17"/>
     <p:sldId id="275" r:id="rId18"/>
     <p:sldId id="276" r:id="rId19"/>
+    <p:sldId id="277" r:id="rId20"/>
+    <p:sldId id="278" r:id="rId21"/>
+    <p:sldId id="279" r:id="rId22"/>
+    <p:sldId id="280" r:id="rId23"/>
+    <p:sldId id="281" r:id="rId24"/>
+    <p:sldId id="282" r:id="rId25"/>
+    <p:sldId id="283" r:id="rId26"/>
   </p:sldIdLst>
   <p:sldSz cx="12192000" cy="6858000"/>
   <p:notesSz cx="6858000" cy="9144000"/>
@@ -278,7 +285,7 @@
           <a:p>
             <a:fld id="{4DD88CC0-223C-42D1-8E07-16FF5CB0841E}" type="datetimeFigureOut">
               <a:rPr lang="es-ES" smtClean="0"/>
-              <a:t>08/11/2022</a:t>
+              <a:t>15/11/2022</a:t>
             </a:fld>
             <a:endParaRPr lang="es-ES"/>
           </a:p>
@@ -478,7 +485,7 @@
           <a:p>
             <a:fld id="{4DD88CC0-223C-42D1-8E07-16FF5CB0841E}" type="datetimeFigureOut">
               <a:rPr lang="es-ES" smtClean="0"/>
-              <a:t>08/11/2022</a:t>
+              <a:t>15/11/2022</a:t>
             </a:fld>
             <a:endParaRPr lang="es-ES"/>
           </a:p>
@@ -688,7 +695,7 @@
           <a:p>
             <a:fld id="{4DD88CC0-223C-42D1-8E07-16FF5CB0841E}" type="datetimeFigureOut">
               <a:rPr lang="es-ES" smtClean="0"/>
-              <a:t>08/11/2022</a:t>
+              <a:t>15/11/2022</a:t>
             </a:fld>
             <a:endParaRPr lang="es-ES"/>
           </a:p>
@@ -888,7 +895,7 @@
           <a:p>
             <a:fld id="{4DD88CC0-223C-42D1-8E07-16FF5CB0841E}" type="datetimeFigureOut">
               <a:rPr lang="es-ES" smtClean="0"/>
-              <a:t>08/11/2022</a:t>
+              <a:t>15/11/2022</a:t>
             </a:fld>
             <a:endParaRPr lang="es-ES"/>
           </a:p>
@@ -1164,7 +1171,7 @@
           <a:p>
             <a:fld id="{4DD88CC0-223C-42D1-8E07-16FF5CB0841E}" type="datetimeFigureOut">
               <a:rPr lang="es-ES" smtClean="0"/>
-              <a:t>08/11/2022</a:t>
+              <a:t>15/11/2022</a:t>
             </a:fld>
             <a:endParaRPr lang="es-ES"/>
           </a:p>
@@ -1432,7 +1439,7 @@
           <a:p>
             <a:fld id="{4DD88CC0-223C-42D1-8E07-16FF5CB0841E}" type="datetimeFigureOut">
               <a:rPr lang="es-ES" smtClean="0"/>
-              <a:t>08/11/2022</a:t>
+              <a:t>15/11/2022</a:t>
             </a:fld>
             <a:endParaRPr lang="es-ES"/>
           </a:p>
@@ -1847,7 +1854,7 @@
           <a:p>
             <a:fld id="{4DD88CC0-223C-42D1-8E07-16FF5CB0841E}" type="datetimeFigureOut">
               <a:rPr lang="es-ES" smtClean="0"/>
-              <a:t>08/11/2022</a:t>
+              <a:t>15/11/2022</a:t>
             </a:fld>
             <a:endParaRPr lang="es-ES"/>
           </a:p>
@@ -1989,7 +1996,7 @@
           <a:p>
             <a:fld id="{4DD88CC0-223C-42D1-8E07-16FF5CB0841E}" type="datetimeFigureOut">
               <a:rPr lang="es-ES" smtClean="0"/>
-              <a:t>08/11/2022</a:t>
+              <a:t>15/11/2022</a:t>
             </a:fld>
             <a:endParaRPr lang="es-ES"/>
           </a:p>
@@ -2102,7 +2109,7 @@
           <a:p>
             <a:fld id="{4DD88CC0-223C-42D1-8E07-16FF5CB0841E}" type="datetimeFigureOut">
               <a:rPr lang="es-ES" smtClean="0"/>
-              <a:t>08/11/2022</a:t>
+              <a:t>15/11/2022</a:t>
             </a:fld>
             <a:endParaRPr lang="es-ES"/>
           </a:p>
@@ -2415,7 +2422,7 @@
           <a:p>
             <a:fld id="{4DD88CC0-223C-42D1-8E07-16FF5CB0841E}" type="datetimeFigureOut">
               <a:rPr lang="es-ES" smtClean="0"/>
-              <a:t>08/11/2022</a:t>
+              <a:t>15/11/2022</a:t>
             </a:fld>
             <a:endParaRPr lang="es-ES"/>
           </a:p>
@@ -2704,7 +2711,7 @@
           <a:p>
             <a:fld id="{4DD88CC0-223C-42D1-8E07-16FF5CB0841E}" type="datetimeFigureOut">
               <a:rPr lang="es-ES" smtClean="0"/>
-              <a:t>08/11/2022</a:t>
+              <a:t>15/11/2022</a:t>
             </a:fld>
             <a:endParaRPr lang="es-ES"/>
           </a:p>
@@ -2947,7 +2954,7 @@
           <a:p>
             <a:fld id="{4DD88CC0-223C-42D1-8E07-16FF5CB0841E}" type="datetimeFigureOut">
               <a:rPr lang="es-ES" smtClean="0"/>
-              <a:t>08/11/2022</a:t>
+              <a:t>15/11/2022</a:t>
             </a:fld>
             <a:endParaRPr lang="es-ES"/>
           </a:p>
@@ -5529,6 +5536,162 @@
 </p:sld>
 </file>
 
+<file path=ppt/slides/slide19.xml><?xml version="1.0" encoding="utf-8"?>
+<p:sld xmlns:a="http://schemas.openxmlformats.org/drawingml/2006/main" xmlns:r="http://schemas.openxmlformats.org/officeDocument/2006/relationships" xmlns:p="http://schemas.openxmlformats.org/presentationml/2006/main">
+  <p:cSld>
+    <p:spTree>
+      <p:nvGrpSpPr>
+        <p:cNvPr id="1" name=""/>
+        <p:cNvGrpSpPr/>
+        <p:nvPr/>
+      </p:nvGrpSpPr>
+      <p:grpSpPr>
+        <a:xfrm>
+          <a:off x="0" y="0"/>
+          <a:ext cx="0" cy="0"/>
+          <a:chOff x="0" y="0"/>
+          <a:chExt cx="0" cy="0"/>
+        </a:xfrm>
+      </p:grpSpPr>
+      <p:sp>
+        <p:nvSpPr>
+          <p:cNvPr id="2" name="Title 1">
+            <a:extLst>
+              <a:ext uri="{FF2B5EF4-FFF2-40B4-BE49-F238E27FC236}">
+                <a16:creationId xmlns:a16="http://schemas.microsoft.com/office/drawing/2014/main" id="{0C6324CA-D2D7-44CD-A968-3E2656AA0A17}"/>
+              </a:ext>
+            </a:extLst>
+          </p:cNvPr>
+          <p:cNvSpPr>
+            <a:spLocks noGrp="1"/>
+          </p:cNvSpPr>
+          <p:nvPr>
+            <p:ph type="title"/>
+          </p:nvPr>
+        </p:nvSpPr>
+        <p:spPr/>
+        <p:txBody>
+          <a:bodyPr/>
+          <a:lstStyle/>
+          <a:p>
+            <a:r>
+              <a:rPr lang="en-GB" dirty="0"/>
+              <a:t>Landau Damping</a:t>
+            </a:r>
+          </a:p>
+        </p:txBody>
+      </p:sp>
+      <p:sp>
+        <p:nvSpPr>
+          <p:cNvPr id="3" name="Content Placeholder 2">
+            <a:extLst>
+              <a:ext uri="{FF2B5EF4-FFF2-40B4-BE49-F238E27FC236}">
+                <a16:creationId xmlns:a16="http://schemas.microsoft.com/office/drawing/2014/main" id="{58EC9BC5-36EB-4880-85C1-122F2C5A032B}"/>
+              </a:ext>
+            </a:extLst>
+          </p:cNvPr>
+          <p:cNvSpPr>
+            <a:spLocks noGrp="1"/>
+          </p:cNvSpPr>
+          <p:nvPr>
+            <p:ph idx="1"/>
+          </p:nvPr>
+        </p:nvSpPr>
+        <p:spPr/>
+        <p:txBody>
+          <a:bodyPr/>
+          <a:lstStyle/>
+          <a:p>
+            <a:r>
+              <a:rPr lang="en-GB" dirty="0"/>
+              <a:t>Wave perturbation in electric field</a:t>
+            </a:r>
+          </a:p>
+          <a:p>
+            <a:r>
+              <a:rPr lang="en-GB" dirty="0" err="1"/>
+              <a:t>t_max</a:t>
+            </a:r>
+            <a:r>
+              <a:rPr lang="en-GB" dirty="0"/>
+              <a:t> = 0.00005 dt = 0.0000001</a:t>
+            </a:r>
+          </a:p>
+        </p:txBody>
+      </p:sp>
+      <p:pic>
+        <p:nvPicPr>
+          <p:cNvPr id="5" name="Picture 4">
+            <a:extLst>
+              <a:ext uri="{FF2B5EF4-FFF2-40B4-BE49-F238E27FC236}">
+                <a16:creationId xmlns:a16="http://schemas.microsoft.com/office/drawing/2014/main" id="{5585A3B5-D095-410D-93F0-BDF99F5B3E12}"/>
+              </a:ext>
+            </a:extLst>
+          </p:cNvPr>
+          <p:cNvPicPr>
+            <a:picLocks noChangeAspect="1"/>
+          </p:cNvPicPr>
+          <p:nvPr/>
+        </p:nvPicPr>
+        <p:blipFill>
+          <a:blip r:embed="rId2"/>
+          <a:stretch>
+            <a:fillRect/>
+          </a:stretch>
+        </p:blipFill>
+        <p:spPr>
+          <a:xfrm>
+            <a:off x="6933883" y="2997105"/>
+            <a:ext cx="3463881" cy="3429586"/>
+          </a:xfrm>
+          <a:prstGeom prst="rect">
+            <a:avLst/>
+          </a:prstGeom>
+        </p:spPr>
+      </p:pic>
+      <p:pic>
+        <p:nvPicPr>
+          <p:cNvPr id="7" name="Picture 6">
+            <a:extLst>
+              <a:ext uri="{FF2B5EF4-FFF2-40B4-BE49-F238E27FC236}">
+                <a16:creationId xmlns:a16="http://schemas.microsoft.com/office/drawing/2014/main" id="{D378CCEA-8454-41DC-BD9A-125AA06DE3EE}"/>
+              </a:ext>
+            </a:extLst>
+          </p:cNvPr>
+          <p:cNvPicPr>
+            <a:picLocks noChangeAspect="1"/>
+          </p:cNvPicPr>
+          <p:nvPr/>
+        </p:nvPicPr>
+        <p:blipFill>
+          <a:blip r:embed="rId3"/>
+          <a:stretch>
+            <a:fillRect/>
+          </a:stretch>
+        </p:blipFill>
+        <p:spPr>
+          <a:xfrm>
+            <a:off x="2609984" y="2997105"/>
+            <a:ext cx="4123757" cy="3179858"/>
+          </a:xfrm>
+          <a:prstGeom prst="rect">
+            <a:avLst/>
+          </a:prstGeom>
+        </p:spPr>
+      </p:pic>
+    </p:spTree>
+    <p:extLst>
+      <p:ext uri="{BB962C8B-B14F-4D97-AF65-F5344CB8AC3E}">
+        <p14:creationId xmlns:p14="http://schemas.microsoft.com/office/powerpoint/2010/main" val="3966455197"/>
+      </p:ext>
+    </p:extLst>
+  </p:cSld>
+  <p:clrMapOvr>
+    <a:masterClrMapping/>
+  </p:clrMapOvr>
+</p:sld>
+</file>
+
 <file path=ppt/slides/slide2.xml><?xml version="1.0" encoding="utf-8"?>
 <p:sld xmlns:a="http://schemas.openxmlformats.org/drawingml/2006/main" xmlns:r="http://schemas.openxmlformats.org/officeDocument/2006/relationships" xmlns:p="http://schemas.openxmlformats.org/presentationml/2006/main">
   <p:cSld>
@@ -5713,6 +5876,888 @@
     <p:extLst>
       <p:ext uri="{BB962C8B-B14F-4D97-AF65-F5344CB8AC3E}">
         <p14:creationId xmlns:p14="http://schemas.microsoft.com/office/powerpoint/2010/main" val="2111274076"/>
+      </p:ext>
+    </p:extLst>
+  </p:cSld>
+  <p:clrMapOvr>
+    <a:masterClrMapping/>
+  </p:clrMapOvr>
+</p:sld>
+</file>
+
+<file path=ppt/slides/slide20.xml><?xml version="1.0" encoding="utf-8"?>
+<p:sld xmlns:a="http://schemas.openxmlformats.org/drawingml/2006/main" xmlns:r="http://schemas.openxmlformats.org/officeDocument/2006/relationships" xmlns:p="http://schemas.openxmlformats.org/presentationml/2006/main">
+  <p:cSld>
+    <p:spTree>
+      <p:nvGrpSpPr>
+        <p:cNvPr id="1" name=""/>
+        <p:cNvGrpSpPr/>
+        <p:nvPr/>
+      </p:nvGrpSpPr>
+      <p:grpSpPr>
+        <a:xfrm>
+          <a:off x="0" y="0"/>
+          <a:ext cx="0" cy="0"/>
+          <a:chOff x="0" y="0"/>
+          <a:chExt cx="0" cy="0"/>
+        </a:xfrm>
+      </p:grpSpPr>
+      <p:sp>
+        <p:nvSpPr>
+          <p:cNvPr id="2" name="Title 1">
+            <a:extLst>
+              <a:ext uri="{FF2B5EF4-FFF2-40B4-BE49-F238E27FC236}">
+                <a16:creationId xmlns:a16="http://schemas.microsoft.com/office/drawing/2014/main" id="{0C6324CA-D2D7-44CD-A968-3E2656AA0A17}"/>
+              </a:ext>
+            </a:extLst>
+          </p:cNvPr>
+          <p:cNvSpPr>
+            <a:spLocks noGrp="1"/>
+          </p:cNvSpPr>
+          <p:nvPr>
+            <p:ph type="title"/>
+          </p:nvPr>
+        </p:nvSpPr>
+        <p:spPr/>
+        <p:txBody>
+          <a:bodyPr/>
+          <a:lstStyle/>
+          <a:p>
+            <a:r>
+              <a:rPr lang="en-GB" dirty="0"/>
+              <a:t>Landau Damping</a:t>
+            </a:r>
+          </a:p>
+        </p:txBody>
+      </p:sp>
+      <p:sp>
+        <p:nvSpPr>
+          <p:cNvPr id="3" name="Content Placeholder 2">
+            <a:extLst>
+              <a:ext uri="{FF2B5EF4-FFF2-40B4-BE49-F238E27FC236}">
+                <a16:creationId xmlns:a16="http://schemas.microsoft.com/office/drawing/2014/main" id="{58EC9BC5-36EB-4880-85C1-122F2C5A032B}"/>
+              </a:ext>
+            </a:extLst>
+          </p:cNvPr>
+          <p:cNvSpPr>
+            <a:spLocks noGrp="1"/>
+          </p:cNvSpPr>
+          <p:nvPr>
+            <p:ph idx="1"/>
+          </p:nvPr>
+        </p:nvSpPr>
+        <p:spPr>
+          <a:xfrm>
+            <a:off x="319726" y="4899147"/>
+            <a:ext cx="10515600" cy="4351338"/>
+          </a:xfrm>
+        </p:spPr>
+        <p:txBody>
+          <a:bodyPr/>
+          <a:lstStyle/>
+          <a:p>
+            <a:r>
+              <a:rPr lang="en-GB" dirty="0"/>
+              <a:t>Damping effect shows up, however the time scale is very different.</a:t>
+            </a:r>
+          </a:p>
+          <a:p>
+            <a:r>
+              <a:rPr lang="en-GB" dirty="0"/>
+              <a:t>Perhaps it’s because I create wave perturbation in electric field directly instead of in the particles.</a:t>
+            </a:r>
+          </a:p>
+        </p:txBody>
+      </p:sp>
+      <p:pic>
+        <p:nvPicPr>
+          <p:cNvPr id="5" name="Picture 4">
+            <a:extLst>
+              <a:ext uri="{FF2B5EF4-FFF2-40B4-BE49-F238E27FC236}">
+                <a16:creationId xmlns:a16="http://schemas.microsoft.com/office/drawing/2014/main" id="{5585A3B5-D095-410D-93F0-BDF99F5B3E12}"/>
+              </a:ext>
+            </a:extLst>
+          </p:cNvPr>
+          <p:cNvPicPr>
+            <a:picLocks noChangeAspect="1"/>
+          </p:cNvPicPr>
+          <p:nvPr/>
+        </p:nvPicPr>
+        <p:blipFill>
+          <a:blip r:embed="rId2"/>
+          <a:stretch>
+            <a:fillRect/>
+          </a:stretch>
+        </p:blipFill>
+        <p:spPr>
+          <a:xfrm>
+            <a:off x="6208019" y="1272000"/>
+            <a:ext cx="3463881" cy="3429586"/>
+          </a:xfrm>
+          <a:prstGeom prst="rect">
+            <a:avLst/>
+          </a:prstGeom>
+        </p:spPr>
+      </p:pic>
+      <p:pic>
+        <p:nvPicPr>
+          <p:cNvPr id="7" name="Picture 6">
+            <a:extLst>
+              <a:ext uri="{FF2B5EF4-FFF2-40B4-BE49-F238E27FC236}">
+                <a16:creationId xmlns:a16="http://schemas.microsoft.com/office/drawing/2014/main" id="{D378CCEA-8454-41DC-BD9A-125AA06DE3EE}"/>
+              </a:ext>
+            </a:extLst>
+          </p:cNvPr>
+          <p:cNvPicPr>
+            <a:picLocks noChangeAspect="1"/>
+          </p:cNvPicPr>
+          <p:nvPr/>
+        </p:nvPicPr>
+        <p:blipFill>
+          <a:blip r:embed="rId3"/>
+          <a:stretch>
+            <a:fillRect/>
+          </a:stretch>
+        </p:blipFill>
+        <p:spPr>
+          <a:xfrm>
+            <a:off x="1205390" y="1272000"/>
+            <a:ext cx="4123757" cy="3179858"/>
+          </a:xfrm>
+          <a:prstGeom prst="rect">
+            <a:avLst/>
+          </a:prstGeom>
+        </p:spPr>
+      </p:pic>
+    </p:spTree>
+    <p:extLst>
+      <p:ext uri="{BB962C8B-B14F-4D97-AF65-F5344CB8AC3E}">
+        <p14:creationId xmlns:p14="http://schemas.microsoft.com/office/powerpoint/2010/main" val="25057455"/>
+      </p:ext>
+    </p:extLst>
+  </p:cSld>
+  <p:clrMapOvr>
+    <a:masterClrMapping/>
+  </p:clrMapOvr>
+</p:sld>
+</file>
+
+<file path=ppt/slides/slide21.xml><?xml version="1.0" encoding="utf-8"?>
+<p:sld xmlns:a="http://schemas.openxmlformats.org/drawingml/2006/main" xmlns:r="http://schemas.openxmlformats.org/officeDocument/2006/relationships" xmlns:p="http://schemas.openxmlformats.org/presentationml/2006/main">
+  <p:cSld>
+    <p:spTree>
+      <p:nvGrpSpPr>
+        <p:cNvPr id="1" name=""/>
+        <p:cNvGrpSpPr/>
+        <p:nvPr/>
+      </p:nvGrpSpPr>
+      <p:grpSpPr>
+        <a:xfrm>
+          <a:off x="0" y="0"/>
+          <a:ext cx="0" cy="0"/>
+          <a:chOff x="0" y="0"/>
+          <a:chExt cx="0" cy="0"/>
+        </a:xfrm>
+      </p:grpSpPr>
+      <p:sp>
+        <p:nvSpPr>
+          <p:cNvPr id="2" name="Title 1">
+            <a:extLst>
+              <a:ext uri="{FF2B5EF4-FFF2-40B4-BE49-F238E27FC236}">
+                <a16:creationId xmlns:a16="http://schemas.microsoft.com/office/drawing/2014/main" id="{3DB124F3-DB1A-4CCB-B085-715C2B45C2E3}"/>
+              </a:ext>
+            </a:extLst>
+          </p:cNvPr>
+          <p:cNvSpPr>
+            <a:spLocks noGrp="1"/>
+          </p:cNvSpPr>
+          <p:nvPr>
+            <p:ph type="title"/>
+          </p:nvPr>
+        </p:nvSpPr>
+        <p:spPr/>
+        <p:txBody>
+          <a:bodyPr/>
+          <a:lstStyle/>
+          <a:p>
+            <a:r>
+              <a:rPr lang="en-GB" dirty="0"/>
+              <a:t>Initialization</a:t>
+            </a:r>
+          </a:p>
+        </p:txBody>
+      </p:sp>
+      <p:sp>
+        <p:nvSpPr>
+          <p:cNvPr id="3" name="Content Placeholder 2">
+            <a:extLst>
+              <a:ext uri="{FF2B5EF4-FFF2-40B4-BE49-F238E27FC236}">
+                <a16:creationId xmlns:a16="http://schemas.microsoft.com/office/drawing/2014/main" id="{F326C00E-D12D-474A-9141-7923204942B8}"/>
+              </a:ext>
+            </a:extLst>
+          </p:cNvPr>
+          <p:cNvSpPr>
+            <a:spLocks noGrp="1"/>
+          </p:cNvSpPr>
+          <p:nvPr>
+            <p:ph idx="1"/>
+          </p:nvPr>
+        </p:nvSpPr>
+        <p:spPr>
+          <a:xfrm>
+            <a:off x="6602735" y="1366619"/>
+            <a:ext cx="10515600" cy="4351338"/>
+          </a:xfrm>
+        </p:spPr>
+        <p:txBody>
+          <a:bodyPr/>
+          <a:lstStyle/>
+          <a:p>
+            <a:r>
+              <a:rPr lang="en-GB" dirty="0"/>
+              <a:t>Ref </a:t>
+            </a:r>
+            <a:r>
+              <a:rPr lang="en-GB" sz="1200" dirty="0">
+                <a:hlinkClick r:id="rId2"/>
+              </a:rPr>
+              <a:t>https://cds.cern.ch/record/2057438/files/1418884_181-206.pdf</a:t>
+            </a:r>
+            <a:endParaRPr lang="en-GB" sz="1200" dirty="0"/>
+          </a:p>
+          <a:p>
+            <a:r>
+              <a:rPr lang="en-GB" sz="2000" dirty="0"/>
+              <a:t>And last year</a:t>
+            </a:r>
+            <a:endParaRPr lang="en-GB" dirty="0"/>
+          </a:p>
+        </p:txBody>
+      </p:sp>
+      <p:pic>
+        <p:nvPicPr>
+          <p:cNvPr id="5" name="Picture 4">
+            <a:extLst>
+              <a:ext uri="{FF2B5EF4-FFF2-40B4-BE49-F238E27FC236}">
+                <a16:creationId xmlns:a16="http://schemas.microsoft.com/office/drawing/2014/main" id="{23252783-8A70-4A34-914F-7BD6F38A312D}"/>
+              </a:ext>
+            </a:extLst>
+          </p:cNvPr>
+          <p:cNvPicPr>
+            <a:picLocks noChangeAspect="1"/>
+          </p:cNvPicPr>
+          <p:nvPr/>
+        </p:nvPicPr>
+        <p:blipFill>
+          <a:blip r:embed="rId3"/>
+          <a:stretch>
+            <a:fillRect/>
+          </a:stretch>
+        </p:blipFill>
+        <p:spPr>
+          <a:xfrm>
+            <a:off x="945528" y="1691383"/>
+            <a:ext cx="5478826" cy="675802"/>
+          </a:xfrm>
+          <a:prstGeom prst="rect">
+            <a:avLst/>
+          </a:prstGeom>
+        </p:spPr>
+      </p:pic>
+      <p:sp>
+        <p:nvSpPr>
+          <p:cNvPr id="6" name="Content Placeholder 2">
+            <a:extLst>
+              <a:ext uri="{FF2B5EF4-FFF2-40B4-BE49-F238E27FC236}">
+                <a16:creationId xmlns:a16="http://schemas.microsoft.com/office/drawing/2014/main" id="{283BB8C3-7504-4889-A9CD-83F7B650D650}"/>
+              </a:ext>
+            </a:extLst>
+          </p:cNvPr>
+          <p:cNvSpPr txBox="1">
+            <a:spLocks/>
+          </p:cNvSpPr>
+          <p:nvPr/>
+        </p:nvSpPr>
+        <p:spPr>
+          <a:xfrm>
+            <a:off x="838200" y="2826527"/>
+            <a:ext cx="10515600" cy="4351338"/>
+          </a:xfrm>
+          <a:prstGeom prst="rect">
+            <a:avLst/>
+          </a:prstGeom>
+        </p:spPr>
+        <p:txBody>
+          <a:bodyPr vert="horz" lIns="91440" tIns="45720" rIns="91440" bIns="45720" rtlCol="0">
+            <a:normAutofit/>
+          </a:bodyPr>
+          <a:lstStyle>
+            <a:lvl1pPr marL="228600" indent="-228600" algn="l" defTabSz="914400" rtl="0" eaLnBrk="1" latinLnBrk="0" hangingPunct="1">
+              <a:lnSpc>
+                <a:spcPct val="90000"/>
+              </a:lnSpc>
+              <a:spcBef>
+                <a:spcPts val="1000"/>
+              </a:spcBef>
+              <a:buFont typeface="Arial" panose="020B0604020202020204" pitchFamily="34" charset="0"/>
+              <a:buChar char="•"/>
+              <a:defRPr sz="2800" kern="1200">
+                <a:solidFill>
+                  <a:schemeClr val="tx1"/>
+                </a:solidFill>
+                <a:latin typeface="+mn-lt"/>
+                <a:ea typeface="+mn-ea"/>
+                <a:cs typeface="+mn-cs"/>
+              </a:defRPr>
+            </a:lvl1pPr>
+            <a:lvl2pPr marL="685800" indent="-228600" algn="l" defTabSz="914400" rtl="0" eaLnBrk="1" latinLnBrk="0" hangingPunct="1">
+              <a:lnSpc>
+                <a:spcPct val="90000"/>
+              </a:lnSpc>
+              <a:spcBef>
+                <a:spcPts val="500"/>
+              </a:spcBef>
+              <a:buFont typeface="Arial" panose="020B0604020202020204" pitchFamily="34" charset="0"/>
+              <a:buChar char="•"/>
+              <a:defRPr sz="2400" kern="1200">
+                <a:solidFill>
+                  <a:schemeClr val="tx1"/>
+                </a:solidFill>
+                <a:latin typeface="+mn-lt"/>
+                <a:ea typeface="+mn-ea"/>
+                <a:cs typeface="+mn-cs"/>
+              </a:defRPr>
+            </a:lvl2pPr>
+            <a:lvl3pPr marL="1143000" indent="-228600" algn="l" defTabSz="914400" rtl="0" eaLnBrk="1" latinLnBrk="0" hangingPunct="1">
+              <a:lnSpc>
+                <a:spcPct val="90000"/>
+              </a:lnSpc>
+              <a:spcBef>
+                <a:spcPts val="500"/>
+              </a:spcBef>
+              <a:buFont typeface="Arial" panose="020B0604020202020204" pitchFamily="34" charset="0"/>
+              <a:buChar char="•"/>
+              <a:defRPr sz="2000" kern="1200">
+                <a:solidFill>
+                  <a:schemeClr val="tx1"/>
+                </a:solidFill>
+                <a:latin typeface="+mn-lt"/>
+                <a:ea typeface="+mn-ea"/>
+                <a:cs typeface="+mn-cs"/>
+              </a:defRPr>
+            </a:lvl3pPr>
+            <a:lvl4pPr marL="1600200" indent="-228600" algn="l" defTabSz="914400" rtl="0" eaLnBrk="1" latinLnBrk="0" hangingPunct="1">
+              <a:lnSpc>
+                <a:spcPct val="90000"/>
+              </a:lnSpc>
+              <a:spcBef>
+                <a:spcPts val="500"/>
+              </a:spcBef>
+              <a:buFont typeface="Arial" panose="020B0604020202020204" pitchFamily="34" charset="0"/>
+              <a:buChar char="•"/>
+              <a:defRPr sz="1800" kern="1200">
+                <a:solidFill>
+                  <a:schemeClr val="tx1"/>
+                </a:solidFill>
+                <a:latin typeface="+mn-lt"/>
+                <a:ea typeface="+mn-ea"/>
+                <a:cs typeface="+mn-cs"/>
+              </a:defRPr>
+            </a:lvl4pPr>
+            <a:lvl5pPr marL="2057400" indent="-228600" algn="l" defTabSz="914400" rtl="0" eaLnBrk="1" latinLnBrk="0" hangingPunct="1">
+              <a:lnSpc>
+                <a:spcPct val="90000"/>
+              </a:lnSpc>
+              <a:spcBef>
+                <a:spcPts val="500"/>
+              </a:spcBef>
+              <a:buFont typeface="Arial" panose="020B0604020202020204" pitchFamily="34" charset="0"/>
+              <a:buChar char="•"/>
+              <a:defRPr sz="1800" kern="1200">
+                <a:solidFill>
+                  <a:schemeClr val="tx1"/>
+                </a:solidFill>
+                <a:latin typeface="+mn-lt"/>
+                <a:ea typeface="+mn-ea"/>
+                <a:cs typeface="+mn-cs"/>
+              </a:defRPr>
+            </a:lvl5pPr>
+            <a:lvl6pPr marL="2514600" indent="-228600" algn="l" defTabSz="914400" rtl="0" eaLnBrk="1" latinLnBrk="0" hangingPunct="1">
+              <a:lnSpc>
+                <a:spcPct val="90000"/>
+              </a:lnSpc>
+              <a:spcBef>
+                <a:spcPts val="500"/>
+              </a:spcBef>
+              <a:buFont typeface="Arial" panose="020B0604020202020204" pitchFamily="34" charset="0"/>
+              <a:buChar char="•"/>
+              <a:defRPr sz="1800" kern="1200">
+                <a:solidFill>
+                  <a:schemeClr val="tx1"/>
+                </a:solidFill>
+                <a:latin typeface="+mn-lt"/>
+                <a:ea typeface="+mn-ea"/>
+                <a:cs typeface="+mn-cs"/>
+              </a:defRPr>
+            </a:lvl6pPr>
+            <a:lvl7pPr marL="2971800" indent="-228600" algn="l" defTabSz="914400" rtl="0" eaLnBrk="1" latinLnBrk="0" hangingPunct="1">
+              <a:lnSpc>
+                <a:spcPct val="90000"/>
+              </a:lnSpc>
+              <a:spcBef>
+                <a:spcPts val="500"/>
+              </a:spcBef>
+              <a:buFont typeface="Arial" panose="020B0604020202020204" pitchFamily="34" charset="0"/>
+              <a:buChar char="•"/>
+              <a:defRPr sz="1800" kern="1200">
+                <a:solidFill>
+                  <a:schemeClr val="tx1"/>
+                </a:solidFill>
+                <a:latin typeface="+mn-lt"/>
+                <a:ea typeface="+mn-ea"/>
+                <a:cs typeface="+mn-cs"/>
+              </a:defRPr>
+            </a:lvl7pPr>
+            <a:lvl8pPr marL="3429000" indent="-228600" algn="l" defTabSz="914400" rtl="0" eaLnBrk="1" latinLnBrk="0" hangingPunct="1">
+              <a:lnSpc>
+                <a:spcPct val="90000"/>
+              </a:lnSpc>
+              <a:spcBef>
+                <a:spcPts val="500"/>
+              </a:spcBef>
+              <a:buFont typeface="Arial" panose="020B0604020202020204" pitchFamily="34" charset="0"/>
+              <a:buChar char="•"/>
+              <a:defRPr sz="1800" kern="1200">
+                <a:solidFill>
+                  <a:schemeClr val="tx1"/>
+                </a:solidFill>
+                <a:latin typeface="+mn-lt"/>
+                <a:ea typeface="+mn-ea"/>
+                <a:cs typeface="+mn-cs"/>
+              </a:defRPr>
+            </a:lvl8pPr>
+            <a:lvl9pPr marL="3886200" indent="-228600" algn="l" defTabSz="914400" rtl="0" eaLnBrk="1" latinLnBrk="0" hangingPunct="1">
+              <a:lnSpc>
+                <a:spcPct val="90000"/>
+              </a:lnSpc>
+              <a:spcBef>
+                <a:spcPts val="500"/>
+              </a:spcBef>
+              <a:buFont typeface="Arial" panose="020B0604020202020204" pitchFamily="34" charset="0"/>
+              <a:buChar char="•"/>
+              <a:defRPr sz="1800" kern="1200">
+                <a:solidFill>
+                  <a:schemeClr val="tx1"/>
+                </a:solidFill>
+                <a:latin typeface="+mn-lt"/>
+                <a:ea typeface="+mn-ea"/>
+                <a:cs typeface="+mn-cs"/>
+              </a:defRPr>
+            </a:lvl9pPr>
+          </a:lstStyle>
+          <a:p>
+            <a:r>
+              <a:rPr lang="en-GB" dirty="0"/>
+              <a:t>Velocity distribution looks fine but not sure about mass.</a:t>
+            </a:r>
+          </a:p>
+        </p:txBody>
+      </p:sp>
+    </p:spTree>
+    <p:extLst>
+      <p:ext uri="{BB962C8B-B14F-4D97-AF65-F5344CB8AC3E}">
+        <p14:creationId xmlns:p14="http://schemas.microsoft.com/office/powerpoint/2010/main" val="2771417514"/>
+      </p:ext>
+    </p:extLst>
+  </p:cSld>
+  <p:clrMapOvr>
+    <a:masterClrMapping/>
+  </p:clrMapOvr>
+</p:sld>
+</file>
+
+<file path=ppt/slides/slide22.xml><?xml version="1.0" encoding="utf-8"?>
+<p:sld xmlns:a="http://schemas.openxmlformats.org/drawingml/2006/main" xmlns:r="http://schemas.openxmlformats.org/officeDocument/2006/relationships" xmlns:p="http://schemas.openxmlformats.org/presentationml/2006/main">
+  <p:cSld>
+    <p:spTree>
+      <p:nvGrpSpPr>
+        <p:cNvPr id="1" name=""/>
+        <p:cNvGrpSpPr/>
+        <p:nvPr/>
+      </p:nvGrpSpPr>
+      <p:grpSpPr>
+        <a:xfrm>
+          <a:off x="0" y="0"/>
+          <a:ext cx="0" cy="0"/>
+          <a:chOff x="0" y="0"/>
+          <a:chExt cx="0" cy="0"/>
+        </a:xfrm>
+      </p:grpSpPr>
+      <p:sp>
+        <p:nvSpPr>
+          <p:cNvPr id="2" name="Title 1">
+            <a:extLst>
+              <a:ext uri="{FF2B5EF4-FFF2-40B4-BE49-F238E27FC236}">
+                <a16:creationId xmlns:a16="http://schemas.microsoft.com/office/drawing/2014/main" id="{8BA63CCE-845E-4A6B-90C8-E0F395509CEF}"/>
+              </a:ext>
+            </a:extLst>
+          </p:cNvPr>
+          <p:cNvSpPr>
+            <a:spLocks noGrp="1"/>
+          </p:cNvSpPr>
+          <p:nvPr>
+            <p:ph type="title"/>
+          </p:nvPr>
+        </p:nvSpPr>
+        <p:spPr/>
+        <p:txBody>
+          <a:bodyPr/>
+          <a:lstStyle/>
+          <a:p>
+            <a:r>
+              <a:rPr lang="en-GB" dirty="0"/>
+              <a:t>Small time steps</a:t>
+            </a:r>
+          </a:p>
+        </p:txBody>
+      </p:sp>
+      <p:pic>
+        <p:nvPicPr>
+          <p:cNvPr id="5" name="Picture 4">
+            <a:extLst>
+              <a:ext uri="{FF2B5EF4-FFF2-40B4-BE49-F238E27FC236}">
+                <a16:creationId xmlns:a16="http://schemas.microsoft.com/office/drawing/2014/main" id="{96F6C23E-7156-4C8D-8F24-AECF6F003E89}"/>
+              </a:ext>
+            </a:extLst>
+          </p:cNvPr>
+          <p:cNvPicPr>
+            <a:picLocks noChangeAspect="1"/>
+          </p:cNvPicPr>
+          <p:nvPr/>
+        </p:nvPicPr>
+        <p:blipFill>
+          <a:blip r:embed="rId2"/>
+          <a:stretch>
+            <a:fillRect/>
+          </a:stretch>
+        </p:blipFill>
+        <p:spPr>
+          <a:xfrm>
+            <a:off x="5216466" y="886916"/>
+            <a:ext cx="2228850" cy="5419725"/>
+          </a:xfrm>
+          <a:prstGeom prst="rect">
+            <a:avLst/>
+          </a:prstGeom>
+        </p:spPr>
+      </p:pic>
+    </p:spTree>
+    <p:extLst>
+      <p:ext uri="{BB962C8B-B14F-4D97-AF65-F5344CB8AC3E}">
+        <p14:creationId xmlns:p14="http://schemas.microsoft.com/office/powerpoint/2010/main" val="265086164"/>
+      </p:ext>
+    </p:extLst>
+  </p:cSld>
+  <p:clrMapOvr>
+    <a:masterClrMapping/>
+  </p:clrMapOvr>
+</p:sld>
+</file>
+
+<file path=ppt/slides/slide23.xml><?xml version="1.0" encoding="utf-8"?>
+<p:sld xmlns:a="http://schemas.openxmlformats.org/drawingml/2006/main" xmlns:r="http://schemas.openxmlformats.org/officeDocument/2006/relationships" xmlns:p="http://schemas.openxmlformats.org/presentationml/2006/main">
+  <p:cSld>
+    <p:spTree>
+      <p:nvGrpSpPr>
+        <p:cNvPr id="1" name=""/>
+        <p:cNvGrpSpPr/>
+        <p:nvPr/>
+      </p:nvGrpSpPr>
+      <p:grpSpPr>
+        <a:xfrm>
+          <a:off x="0" y="0"/>
+          <a:ext cx="0" cy="0"/>
+          <a:chOff x="0" y="0"/>
+          <a:chExt cx="0" cy="0"/>
+        </a:xfrm>
+      </p:grpSpPr>
+      <p:sp>
+        <p:nvSpPr>
+          <p:cNvPr id="2" name="Title 1">
+            <a:extLst>
+              <a:ext uri="{FF2B5EF4-FFF2-40B4-BE49-F238E27FC236}">
+                <a16:creationId xmlns:a16="http://schemas.microsoft.com/office/drawing/2014/main" id="{F71FB46A-FB7C-49C7-B86B-E4F19887F9AD}"/>
+              </a:ext>
+            </a:extLst>
+          </p:cNvPr>
+          <p:cNvSpPr>
+            <a:spLocks noGrp="1"/>
+          </p:cNvSpPr>
+          <p:nvPr>
+            <p:ph type="title"/>
+          </p:nvPr>
+        </p:nvSpPr>
+        <p:spPr/>
+        <p:txBody>
+          <a:bodyPr/>
+          <a:lstStyle/>
+          <a:p>
+            <a:r>
+              <a:rPr lang="en-GB" dirty="0"/>
+              <a:t>Larger mass</a:t>
+            </a:r>
+          </a:p>
+        </p:txBody>
+      </p:sp>
+      <p:sp>
+        <p:nvSpPr>
+          <p:cNvPr id="3" name="Content Placeholder 2">
+            <a:extLst>
+              <a:ext uri="{FF2B5EF4-FFF2-40B4-BE49-F238E27FC236}">
+                <a16:creationId xmlns:a16="http://schemas.microsoft.com/office/drawing/2014/main" id="{1E37DC5A-61B4-47B9-9020-4AD7A09F5AAF}"/>
+              </a:ext>
+            </a:extLst>
+          </p:cNvPr>
+          <p:cNvSpPr>
+            <a:spLocks noGrp="1"/>
+          </p:cNvSpPr>
+          <p:nvPr>
+            <p:ph idx="1"/>
+          </p:nvPr>
+        </p:nvSpPr>
+        <p:spPr>
+          <a:xfrm>
+            <a:off x="838200" y="1825625"/>
+            <a:ext cx="7429107" cy="4351338"/>
+          </a:xfrm>
+        </p:spPr>
+        <p:txBody>
+          <a:bodyPr/>
+          <a:lstStyle/>
+          <a:p>
+            <a:r>
+              <a:rPr lang="en-GB" dirty="0"/>
+              <a:t>Instability if mass of particles is too high or time step is too small. This shouldn’t happen as the method should be unconditionally stable.</a:t>
+            </a:r>
+          </a:p>
+        </p:txBody>
+      </p:sp>
+      <p:pic>
+        <p:nvPicPr>
+          <p:cNvPr id="5" name="Picture 4">
+            <a:extLst>
+              <a:ext uri="{FF2B5EF4-FFF2-40B4-BE49-F238E27FC236}">
+                <a16:creationId xmlns:a16="http://schemas.microsoft.com/office/drawing/2014/main" id="{306D2764-F266-43E3-A3A1-BDA58BD642A3}"/>
+              </a:ext>
+            </a:extLst>
+          </p:cNvPr>
+          <p:cNvPicPr>
+            <a:picLocks noChangeAspect="1"/>
+          </p:cNvPicPr>
+          <p:nvPr/>
+        </p:nvPicPr>
+        <p:blipFill>
+          <a:blip r:embed="rId2"/>
+          <a:stretch>
+            <a:fillRect/>
+          </a:stretch>
+        </p:blipFill>
+        <p:spPr>
+          <a:xfrm>
+            <a:off x="8379761" y="881063"/>
+            <a:ext cx="2305050" cy="5295900"/>
+          </a:xfrm>
+          <a:prstGeom prst="rect">
+            <a:avLst/>
+          </a:prstGeom>
+        </p:spPr>
+      </p:pic>
+    </p:spTree>
+    <p:extLst>
+      <p:ext uri="{BB962C8B-B14F-4D97-AF65-F5344CB8AC3E}">
+        <p14:creationId xmlns:p14="http://schemas.microsoft.com/office/powerpoint/2010/main" val="2340436173"/>
+      </p:ext>
+    </p:extLst>
+  </p:cSld>
+  <p:clrMapOvr>
+    <a:masterClrMapping/>
+  </p:clrMapOvr>
+</p:sld>
+</file>
+
+<file path=ppt/slides/slide24.xml><?xml version="1.0" encoding="utf-8"?>
+<p:sld xmlns:a="http://schemas.openxmlformats.org/drawingml/2006/main" xmlns:r="http://schemas.openxmlformats.org/officeDocument/2006/relationships" xmlns:p="http://schemas.openxmlformats.org/presentationml/2006/main">
+  <p:cSld>
+    <p:spTree>
+      <p:nvGrpSpPr>
+        <p:cNvPr id="1" name=""/>
+        <p:cNvGrpSpPr/>
+        <p:nvPr/>
+      </p:nvGrpSpPr>
+      <p:grpSpPr>
+        <a:xfrm>
+          <a:off x="0" y="0"/>
+          <a:ext cx="0" cy="0"/>
+          <a:chOff x="0" y="0"/>
+          <a:chExt cx="0" cy="0"/>
+        </a:xfrm>
+      </p:grpSpPr>
+      <p:sp>
+        <p:nvSpPr>
+          <p:cNvPr id="2" name="Title 1">
+            <a:extLst>
+              <a:ext uri="{FF2B5EF4-FFF2-40B4-BE49-F238E27FC236}">
+                <a16:creationId xmlns:a16="http://schemas.microsoft.com/office/drawing/2014/main" id="{F11AA4BC-285E-4A92-9A18-67213F3A7020}"/>
+              </a:ext>
+            </a:extLst>
+          </p:cNvPr>
+          <p:cNvSpPr>
+            <a:spLocks noGrp="1"/>
+          </p:cNvSpPr>
+          <p:nvPr>
+            <p:ph type="title"/>
+          </p:nvPr>
+        </p:nvSpPr>
+        <p:spPr/>
+        <p:txBody>
+          <a:bodyPr/>
+          <a:lstStyle/>
+          <a:p>
+            <a:r>
+              <a:rPr lang="en-GB" dirty="0"/>
+              <a:t>Overall</a:t>
+            </a:r>
+          </a:p>
+        </p:txBody>
+      </p:sp>
+      <p:sp>
+        <p:nvSpPr>
+          <p:cNvPr id="3" name="Content Placeholder 2">
+            <a:extLst>
+              <a:ext uri="{FF2B5EF4-FFF2-40B4-BE49-F238E27FC236}">
+                <a16:creationId xmlns:a16="http://schemas.microsoft.com/office/drawing/2014/main" id="{D438202C-40CA-4DAE-B14D-06CD478F9F2D}"/>
+              </a:ext>
+            </a:extLst>
+          </p:cNvPr>
+          <p:cNvSpPr>
+            <a:spLocks noGrp="1"/>
+          </p:cNvSpPr>
+          <p:nvPr>
+            <p:ph idx="1"/>
+          </p:nvPr>
+        </p:nvSpPr>
+        <p:spPr/>
+        <p:txBody>
+          <a:bodyPr/>
+          <a:lstStyle/>
+          <a:p>
+            <a:r>
+              <a:rPr lang="en-GB" dirty="0"/>
+              <a:t>Looks good but scales are wrong: either initialization is wrong or some bug in the code like a </a:t>
+            </a:r>
+            <a:r>
+              <a:rPr lang="en-GB"/>
+              <a:t>wrong scaling.</a:t>
+            </a:r>
+          </a:p>
+        </p:txBody>
+      </p:sp>
+    </p:spTree>
+    <p:extLst>
+      <p:ext uri="{BB962C8B-B14F-4D97-AF65-F5344CB8AC3E}">
+        <p14:creationId xmlns:p14="http://schemas.microsoft.com/office/powerpoint/2010/main" val="774124998"/>
+      </p:ext>
+    </p:extLst>
+  </p:cSld>
+  <p:clrMapOvr>
+    <a:masterClrMapping/>
+  </p:clrMapOvr>
+</p:sld>
+</file>
+
+<file path=ppt/slides/slide25.xml><?xml version="1.0" encoding="utf-8"?>
+<p:sld xmlns:a="http://schemas.openxmlformats.org/drawingml/2006/main" xmlns:r="http://schemas.openxmlformats.org/officeDocument/2006/relationships" xmlns:p="http://schemas.openxmlformats.org/presentationml/2006/main">
+  <p:cSld>
+    <p:spTree>
+      <p:nvGrpSpPr>
+        <p:cNvPr id="1" name=""/>
+        <p:cNvGrpSpPr/>
+        <p:nvPr/>
+      </p:nvGrpSpPr>
+      <p:grpSpPr>
+        <a:xfrm>
+          <a:off x="0" y="0"/>
+          <a:ext cx="0" cy="0"/>
+          <a:chOff x="0" y="0"/>
+          <a:chExt cx="0" cy="0"/>
+        </a:xfrm>
+      </p:grpSpPr>
+      <p:sp>
+        <p:nvSpPr>
+          <p:cNvPr id="2" name="Title 1">
+            <a:extLst>
+              <a:ext uri="{FF2B5EF4-FFF2-40B4-BE49-F238E27FC236}">
+                <a16:creationId xmlns:a16="http://schemas.microsoft.com/office/drawing/2014/main" id="{BF554B3E-EC49-4B54-9D66-C6054552B7C7}"/>
+              </a:ext>
+            </a:extLst>
+          </p:cNvPr>
+          <p:cNvSpPr>
+            <a:spLocks noGrp="1"/>
+          </p:cNvSpPr>
+          <p:nvPr>
+            <p:ph type="title"/>
+          </p:nvPr>
+        </p:nvSpPr>
+        <p:spPr/>
+        <p:txBody>
+          <a:bodyPr/>
+          <a:lstStyle/>
+          <a:p>
+            <a:r>
+              <a:rPr lang="en-GB" dirty="0"/>
+              <a:t>Also	</a:t>
+            </a:r>
+          </a:p>
+        </p:txBody>
+      </p:sp>
+      <p:sp>
+        <p:nvSpPr>
+          <p:cNvPr id="3" name="Content Placeholder 2">
+            <a:extLst>
+              <a:ext uri="{FF2B5EF4-FFF2-40B4-BE49-F238E27FC236}">
+                <a16:creationId xmlns:a16="http://schemas.microsoft.com/office/drawing/2014/main" id="{014576F8-313C-4DFE-B8A6-2B5BAE952260}"/>
+              </a:ext>
+            </a:extLst>
+          </p:cNvPr>
+          <p:cNvSpPr>
+            <a:spLocks noGrp="1"/>
+          </p:cNvSpPr>
+          <p:nvPr>
+            <p:ph idx="1"/>
+          </p:nvPr>
+        </p:nvSpPr>
+        <p:spPr/>
+        <p:txBody>
+          <a:bodyPr/>
+          <a:lstStyle/>
+          <a:p>
+            <a:r>
+              <a:rPr lang="en-GB" dirty="0"/>
+              <a:t>For actual code, must solve finite grid instability:</a:t>
+            </a:r>
+          </a:p>
+          <a:p>
+            <a:r>
+              <a:rPr lang="en-GB" dirty="0"/>
+              <a:t>i.e. not allow movement of more than one grid cell per time step.</a:t>
+            </a:r>
+          </a:p>
+        </p:txBody>
+      </p:sp>
+    </p:spTree>
+    <p:extLst>
+      <p:ext uri="{BB962C8B-B14F-4D97-AF65-F5344CB8AC3E}">
+        <p14:creationId xmlns:p14="http://schemas.microsoft.com/office/powerpoint/2010/main" val="968174483"/>
       </p:ext>
     </p:extLst>
   </p:cSld>

</xml_diff>

<commit_message>
Normalised Landau damping (still wrong dt)
</commit_message>
<xml_diff>
--- a/MATLAB/Matlab implementation.pptx
+++ b/MATLAB/Matlab implementation.pptx
@@ -30,6 +30,9 @@
     <p:sldId id="281" r:id="rId24"/>
     <p:sldId id="282" r:id="rId25"/>
     <p:sldId id="283" r:id="rId26"/>
+    <p:sldId id="285" r:id="rId27"/>
+    <p:sldId id="284" r:id="rId28"/>
+    <p:sldId id="287" r:id="rId29"/>
   </p:sldIdLst>
   <p:sldSz cx="12192000" cy="6858000"/>
   <p:notesSz cx="6858000" cy="9144000"/>
@@ -285,7 +288,7 @@
           <a:p>
             <a:fld id="{4DD88CC0-223C-42D1-8E07-16FF5CB0841E}" type="datetimeFigureOut">
               <a:rPr lang="es-ES" smtClean="0"/>
-              <a:t>15/11/2022</a:t>
+              <a:t>16/11/2022</a:t>
             </a:fld>
             <a:endParaRPr lang="es-ES"/>
           </a:p>
@@ -485,7 +488,7 @@
           <a:p>
             <a:fld id="{4DD88CC0-223C-42D1-8E07-16FF5CB0841E}" type="datetimeFigureOut">
               <a:rPr lang="es-ES" smtClean="0"/>
-              <a:t>15/11/2022</a:t>
+              <a:t>16/11/2022</a:t>
             </a:fld>
             <a:endParaRPr lang="es-ES"/>
           </a:p>
@@ -695,7 +698,7 @@
           <a:p>
             <a:fld id="{4DD88CC0-223C-42D1-8E07-16FF5CB0841E}" type="datetimeFigureOut">
               <a:rPr lang="es-ES" smtClean="0"/>
-              <a:t>15/11/2022</a:t>
+              <a:t>16/11/2022</a:t>
             </a:fld>
             <a:endParaRPr lang="es-ES"/>
           </a:p>
@@ -895,7 +898,7 @@
           <a:p>
             <a:fld id="{4DD88CC0-223C-42D1-8E07-16FF5CB0841E}" type="datetimeFigureOut">
               <a:rPr lang="es-ES" smtClean="0"/>
-              <a:t>15/11/2022</a:t>
+              <a:t>16/11/2022</a:t>
             </a:fld>
             <a:endParaRPr lang="es-ES"/>
           </a:p>
@@ -1171,7 +1174,7 @@
           <a:p>
             <a:fld id="{4DD88CC0-223C-42D1-8E07-16FF5CB0841E}" type="datetimeFigureOut">
               <a:rPr lang="es-ES" smtClean="0"/>
-              <a:t>15/11/2022</a:t>
+              <a:t>16/11/2022</a:t>
             </a:fld>
             <a:endParaRPr lang="es-ES"/>
           </a:p>
@@ -1439,7 +1442,7 @@
           <a:p>
             <a:fld id="{4DD88CC0-223C-42D1-8E07-16FF5CB0841E}" type="datetimeFigureOut">
               <a:rPr lang="es-ES" smtClean="0"/>
-              <a:t>15/11/2022</a:t>
+              <a:t>16/11/2022</a:t>
             </a:fld>
             <a:endParaRPr lang="es-ES"/>
           </a:p>
@@ -1854,7 +1857,7 @@
           <a:p>
             <a:fld id="{4DD88CC0-223C-42D1-8E07-16FF5CB0841E}" type="datetimeFigureOut">
               <a:rPr lang="es-ES" smtClean="0"/>
-              <a:t>15/11/2022</a:t>
+              <a:t>16/11/2022</a:t>
             </a:fld>
             <a:endParaRPr lang="es-ES"/>
           </a:p>
@@ -1996,7 +1999,7 @@
           <a:p>
             <a:fld id="{4DD88CC0-223C-42D1-8E07-16FF5CB0841E}" type="datetimeFigureOut">
               <a:rPr lang="es-ES" smtClean="0"/>
-              <a:t>15/11/2022</a:t>
+              <a:t>16/11/2022</a:t>
             </a:fld>
             <a:endParaRPr lang="es-ES"/>
           </a:p>
@@ -2109,7 +2112,7 @@
           <a:p>
             <a:fld id="{4DD88CC0-223C-42D1-8E07-16FF5CB0841E}" type="datetimeFigureOut">
               <a:rPr lang="es-ES" smtClean="0"/>
-              <a:t>15/11/2022</a:t>
+              <a:t>16/11/2022</a:t>
             </a:fld>
             <a:endParaRPr lang="es-ES"/>
           </a:p>
@@ -2422,7 +2425,7 @@
           <a:p>
             <a:fld id="{4DD88CC0-223C-42D1-8E07-16FF5CB0841E}" type="datetimeFigureOut">
               <a:rPr lang="es-ES" smtClean="0"/>
-              <a:t>15/11/2022</a:t>
+              <a:t>16/11/2022</a:t>
             </a:fld>
             <a:endParaRPr lang="es-ES"/>
           </a:p>
@@ -2711,7 +2714,7 @@
           <a:p>
             <a:fld id="{4DD88CC0-223C-42D1-8E07-16FF5CB0841E}" type="datetimeFigureOut">
               <a:rPr lang="es-ES" smtClean="0"/>
-              <a:t>15/11/2022</a:t>
+              <a:t>16/11/2022</a:t>
             </a:fld>
             <a:endParaRPr lang="es-ES"/>
           </a:p>
@@ -2954,7 +2957,7 @@
           <a:p>
             <a:fld id="{4DD88CC0-223C-42D1-8E07-16FF5CB0841E}" type="datetimeFigureOut">
               <a:rPr lang="es-ES" smtClean="0"/>
-              <a:t>15/11/2022</a:t>
+              <a:t>16/11/2022</a:t>
             </a:fld>
             <a:endParaRPr lang="es-ES"/>
           </a:p>
@@ -6758,6 +6761,3008 @@
     <p:extLst>
       <p:ext uri="{BB962C8B-B14F-4D97-AF65-F5344CB8AC3E}">
         <p14:creationId xmlns:p14="http://schemas.microsoft.com/office/powerpoint/2010/main" val="968174483"/>
+      </p:ext>
+    </p:extLst>
+  </p:cSld>
+  <p:clrMapOvr>
+    <a:masterClrMapping/>
+  </p:clrMapOvr>
+</p:sld>
+</file>
+
+<file path=ppt/slides/slide26.xml><?xml version="1.0" encoding="utf-8"?>
+<p:sld xmlns:a="http://schemas.openxmlformats.org/drawingml/2006/main" xmlns:r="http://schemas.openxmlformats.org/officeDocument/2006/relationships" xmlns:p="http://schemas.openxmlformats.org/presentationml/2006/main">
+  <p:cSld>
+    <p:spTree>
+      <p:nvGrpSpPr>
+        <p:cNvPr id="1" name=""/>
+        <p:cNvGrpSpPr/>
+        <p:nvPr/>
+      </p:nvGrpSpPr>
+      <p:grpSpPr>
+        <a:xfrm>
+          <a:off x="0" y="0"/>
+          <a:ext cx="0" cy="0"/>
+          <a:chOff x="0" y="0"/>
+          <a:chExt cx="0" cy="0"/>
+        </a:xfrm>
+      </p:grpSpPr>
+      <p:sp>
+        <p:nvSpPr>
+          <p:cNvPr id="2" name="Title 1">
+            <a:extLst>
+              <a:ext uri="{FF2B5EF4-FFF2-40B4-BE49-F238E27FC236}">
+                <a16:creationId xmlns:a16="http://schemas.microsoft.com/office/drawing/2014/main" id="{A741D544-D415-41E6-B036-413C8005A761}"/>
+              </a:ext>
+            </a:extLst>
+          </p:cNvPr>
+          <p:cNvSpPr>
+            <a:spLocks noGrp="1"/>
+          </p:cNvSpPr>
+          <p:nvPr>
+            <p:ph type="title"/>
+          </p:nvPr>
+        </p:nvSpPr>
+        <p:spPr>
+          <a:xfrm>
+            <a:off x="838200" y="175865"/>
+            <a:ext cx="10515600" cy="1325563"/>
+          </a:xfrm>
+        </p:spPr>
+        <p:txBody>
+          <a:bodyPr/>
+          <a:lstStyle/>
+          <a:p>
+            <a:r>
+              <a:rPr lang="en-GB" dirty="0"/>
+              <a:t>I finally understand</a:t>
+            </a:r>
+          </a:p>
+        </p:txBody>
+      </p:sp>
+      <p:sp>
+        <p:nvSpPr>
+          <p:cNvPr id="3" name="Content Placeholder 2">
+            <a:extLst>
+              <a:ext uri="{FF2B5EF4-FFF2-40B4-BE49-F238E27FC236}">
+                <a16:creationId xmlns:a16="http://schemas.microsoft.com/office/drawing/2014/main" id="{5D915ADE-97D5-4EF5-9F93-605BC97DB526}"/>
+              </a:ext>
+            </a:extLst>
+          </p:cNvPr>
+          <p:cNvSpPr>
+            <a:spLocks noGrp="1"/>
+          </p:cNvSpPr>
+          <p:nvPr>
+            <p:ph idx="1"/>
+          </p:nvPr>
+        </p:nvSpPr>
+        <p:spPr>
+          <a:xfrm>
+            <a:off x="5860540" y="1953844"/>
+            <a:ext cx="10515600" cy="4351338"/>
+          </a:xfrm>
+        </p:spPr>
+        <p:txBody>
+          <a:bodyPr/>
+          <a:lstStyle/>
+          <a:p>
+            <a:pPr marL="0" indent="0">
+              <a:buNone/>
+            </a:pPr>
+            <a:r>
+              <a:rPr lang="en-GB" dirty="0"/>
+              <a:t>Using:</a:t>
+            </a:r>
+          </a:p>
+        </p:txBody>
+      </p:sp>
+      <p:pic>
+        <p:nvPicPr>
+          <p:cNvPr id="5" name="Picture 4">
+            <a:extLst>
+              <a:ext uri="{FF2B5EF4-FFF2-40B4-BE49-F238E27FC236}">
+                <a16:creationId xmlns:a16="http://schemas.microsoft.com/office/drawing/2014/main" id="{99928195-C6B3-4654-9090-E2F6AAD96BA1}"/>
+              </a:ext>
+            </a:extLst>
+          </p:cNvPr>
+          <p:cNvPicPr>
+            <a:picLocks noChangeAspect="1"/>
+          </p:cNvPicPr>
+          <p:nvPr/>
+        </p:nvPicPr>
+        <p:blipFill>
+          <a:blip r:embed="rId2"/>
+          <a:stretch>
+            <a:fillRect/>
+          </a:stretch>
+        </p:blipFill>
+        <p:spPr>
+          <a:xfrm>
+            <a:off x="7021760" y="1899924"/>
+            <a:ext cx="1962150" cy="771525"/>
+          </a:xfrm>
+          <a:prstGeom prst="rect">
+            <a:avLst/>
+          </a:prstGeom>
+        </p:spPr>
+      </p:pic>
+      <p:sp>
+        <p:nvSpPr>
+          <p:cNvPr id="6" name="Content Placeholder 2">
+            <a:extLst>
+              <a:ext uri="{FF2B5EF4-FFF2-40B4-BE49-F238E27FC236}">
+                <a16:creationId xmlns:a16="http://schemas.microsoft.com/office/drawing/2014/main" id="{1D08C16A-EAAC-423D-A568-23EA6B4C0B12}"/>
+              </a:ext>
+            </a:extLst>
+          </p:cNvPr>
+          <p:cNvSpPr txBox="1">
+            <a:spLocks/>
+          </p:cNvSpPr>
+          <p:nvPr/>
+        </p:nvSpPr>
+        <p:spPr>
+          <a:xfrm>
+            <a:off x="955930" y="1127912"/>
+            <a:ext cx="10515600" cy="949928"/>
+          </a:xfrm>
+          <a:prstGeom prst="rect">
+            <a:avLst/>
+          </a:prstGeom>
+        </p:spPr>
+        <p:txBody>
+          <a:bodyPr vert="horz" lIns="91440" tIns="45720" rIns="91440" bIns="45720" rtlCol="0">
+            <a:normAutofit/>
+          </a:bodyPr>
+          <a:lstStyle>
+            <a:lvl1pPr marL="228600" indent="-228600" algn="l" defTabSz="914400" rtl="0" eaLnBrk="1" latinLnBrk="0" hangingPunct="1">
+              <a:lnSpc>
+                <a:spcPct val="90000"/>
+              </a:lnSpc>
+              <a:spcBef>
+                <a:spcPts val="1000"/>
+              </a:spcBef>
+              <a:buFont typeface="Arial" panose="020B0604020202020204" pitchFamily="34" charset="0"/>
+              <a:buChar char="•"/>
+              <a:defRPr sz="2800" kern="1200">
+                <a:solidFill>
+                  <a:schemeClr val="tx1"/>
+                </a:solidFill>
+                <a:latin typeface="+mn-lt"/>
+                <a:ea typeface="+mn-ea"/>
+                <a:cs typeface="+mn-cs"/>
+              </a:defRPr>
+            </a:lvl1pPr>
+            <a:lvl2pPr marL="685800" indent="-228600" algn="l" defTabSz="914400" rtl="0" eaLnBrk="1" latinLnBrk="0" hangingPunct="1">
+              <a:lnSpc>
+                <a:spcPct val="90000"/>
+              </a:lnSpc>
+              <a:spcBef>
+                <a:spcPts val="500"/>
+              </a:spcBef>
+              <a:buFont typeface="Arial" panose="020B0604020202020204" pitchFamily="34" charset="0"/>
+              <a:buChar char="•"/>
+              <a:defRPr sz="2400" kern="1200">
+                <a:solidFill>
+                  <a:schemeClr val="tx1"/>
+                </a:solidFill>
+                <a:latin typeface="+mn-lt"/>
+                <a:ea typeface="+mn-ea"/>
+                <a:cs typeface="+mn-cs"/>
+              </a:defRPr>
+            </a:lvl2pPr>
+            <a:lvl3pPr marL="1143000" indent="-228600" algn="l" defTabSz="914400" rtl="0" eaLnBrk="1" latinLnBrk="0" hangingPunct="1">
+              <a:lnSpc>
+                <a:spcPct val="90000"/>
+              </a:lnSpc>
+              <a:spcBef>
+                <a:spcPts val="500"/>
+              </a:spcBef>
+              <a:buFont typeface="Arial" panose="020B0604020202020204" pitchFamily="34" charset="0"/>
+              <a:buChar char="•"/>
+              <a:defRPr sz="2000" kern="1200">
+                <a:solidFill>
+                  <a:schemeClr val="tx1"/>
+                </a:solidFill>
+                <a:latin typeface="+mn-lt"/>
+                <a:ea typeface="+mn-ea"/>
+                <a:cs typeface="+mn-cs"/>
+              </a:defRPr>
+            </a:lvl3pPr>
+            <a:lvl4pPr marL="1600200" indent="-228600" algn="l" defTabSz="914400" rtl="0" eaLnBrk="1" latinLnBrk="0" hangingPunct="1">
+              <a:lnSpc>
+                <a:spcPct val="90000"/>
+              </a:lnSpc>
+              <a:spcBef>
+                <a:spcPts val="500"/>
+              </a:spcBef>
+              <a:buFont typeface="Arial" panose="020B0604020202020204" pitchFamily="34" charset="0"/>
+              <a:buChar char="•"/>
+              <a:defRPr sz="1800" kern="1200">
+                <a:solidFill>
+                  <a:schemeClr val="tx1"/>
+                </a:solidFill>
+                <a:latin typeface="+mn-lt"/>
+                <a:ea typeface="+mn-ea"/>
+                <a:cs typeface="+mn-cs"/>
+              </a:defRPr>
+            </a:lvl4pPr>
+            <a:lvl5pPr marL="2057400" indent="-228600" algn="l" defTabSz="914400" rtl="0" eaLnBrk="1" latinLnBrk="0" hangingPunct="1">
+              <a:lnSpc>
+                <a:spcPct val="90000"/>
+              </a:lnSpc>
+              <a:spcBef>
+                <a:spcPts val="500"/>
+              </a:spcBef>
+              <a:buFont typeface="Arial" panose="020B0604020202020204" pitchFamily="34" charset="0"/>
+              <a:buChar char="•"/>
+              <a:defRPr sz="1800" kern="1200">
+                <a:solidFill>
+                  <a:schemeClr val="tx1"/>
+                </a:solidFill>
+                <a:latin typeface="+mn-lt"/>
+                <a:ea typeface="+mn-ea"/>
+                <a:cs typeface="+mn-cs"/>
+              </a:defRPr>
+            </a:lvl5pPr>
+            <a:lvl6pPr marL="2514600" indent="-228600" algn="l" defTabSz="914400" rtl="0" eaLnBrk="1" latinLnBrk="0" hangingPunct="1">
+              <a:lnSpc>
+                <a:spcPct val="90000"/>
+              </a:lnSpc>
+              <a:spcBef>
+                <a:spcPts val="500"/>
+              </a:spcBef>
+              <a:buFont typeface="Arial" panose="020B0604020202020204" pitchFamily="34" charset="0"/>
+              <a:buChar char="•"/>
+              <a:defRPr sz="1800" kern="1200">
+                <a:solidFill>
+                  <a:schemeClr val="tx1"/>
+                </a:solidFill>
+                <a:latin typeface="+mn-lt"/>
+                <a:ea typeface="+mn-ea"/>
+                <a:cs typeface="+mn-cs"/>
+              </a:defRPr>
+            </a:lvl6pPr>
+            <a:lvl7pPr marL="2971800" indent="-228600" algn="l" defTabSz="914400" rtl="0" eaLnBrk="1" latinLnBrk="0" hangingPunct="1">
+              <a:lnSpc>
+                <a:spcPct val="90000"/>
+              </a:lnSpc>
+              <a:spcBef>
+                <a:spcPts val="500"/>
+              </a:spcBef>
+              <a:buFont typeface="Arial" panose="020B0604020202020204" pitchFamily="34" charset="0"/>
+              <a:buChar char="•"/>
+              <a:defRPr sz="1800" kern="1200">
+                <a:solidFill>
+                  <a:schemeClr val="tx1"/>
+                </a:solidFill>
+                <a:latin typeface="+mn-lt"/>
+                <a:ea typeface="+mn-ea"/>
+                <a:cs typeface="+mn-cs"/>
+              </a:defRPr>
+            </a:lvl7pPr>
+            <a:lvl8pPr marL="3429000" indent="-228600" algn="l" defTabSz="914400" rtl="0" eaLnBrk="1" latinLnBrk="0" hangingPunct="1">
+              <a:lnSpc>
+                <a:spcPct val="90000"/>
+              </a:lnSpc>
+              <a:spcBef>
+                <a:spcPts val="500"/>
+              </a:spcBef>
+              <a:buFont typeface="Arial" panose="020B0604020202020204" pitchFamily="34" charset="0"/>
+              <a:buChar char="•"/>
+              <a:defRPr sz="1800" kern="1200">
+                <a:solidFill>
+                  <a:schemeClr val="tx1"/>
+                </a:solidFill>
+                <a:latin typeface="+mn-lt"/>
+                <a:ea typeface="+mn-ea"/>
+                <a:cs typeface="+mn-cs"/>
+              </a:defRPr>
+            </a:lvl8pPr>
+            <a:lvl9pPr marL="3886200" indent="-228600" algn="l" defTabSz="914400" rtl="0" eaLnBrk="1" latinLnBrk="0" hangingPunct="1">
+              <a:lnSpc>
+                <a:spcPct val="90000"/>
+              </a:lnSpc>
+              <a:spcBef>
+                <a:spcPts val="500"/>
+              </a:spcBef>
+              <a:buFont typeface="Arial" panose="020B0604020202020204" pitchFamily="34" charset="0"/>
+              <a:buChar char="•"/>
+              <a:defRPr sz="1800" kern="1200">
+                <a:solidFill>
+                  <a:schemeClr val="tx1"/>
+                </a:solidFill>
+                <a:latin typeface="+mn-lt"/>
+                <a:ea typeface="+mn-ea"/>
+                <a:cs typeface="+mn-cs"/>
+              </a:defRPr>
+            </a:lvl9pPr>
+          </a:lstStyle>
+          <a:p>
+            <a:r>
+              <a:rPr lang="en-GB" dirty="0"/>
+              <a:t>Previous code uses: m=1 and q=-1 for electrons, m=2000 and q=1 for ions. With these inputs (and same Np, </a:t>
+            </a:r>
+            <a:r>
+              <a:rPr lang="en-GB" dirty="0" err="1"/>
+              <a:t>Nx</a:t>
+            </a:r>
+            <a:r>
+              <a:rPr lang="en-GB" dirty="0"/>
+              <a:t>, dt…):</a:t>
+            </a:r>
+          </a:p>
+          <a:p>
+            <a:endParaRPr lang="en-GB" dirty="0"/>
+          </a:p>
+          <a:p>
+            <a:pPr marL="0" indent="0">
+              <a:buFont typeface="Arial" panose="020B0604020202020204" pitchFamily="34" charset="0"/>
+              <a:buNone/>
+            </a:pPr>
+            <a:endParaRPr lang="en-GB" dirty="0"/>
+          </a:p>
+        </p:txBody>
+      </p:sp>
+      <p:sp>
+        <p:nvSpPr>
+          <p:cNvPr id="7" name="Content Placeholder 2">
+            <a:extLst>
+              <a:ext uri="{FF2B5EF4-FFF2-40B4-BE49-F238E27FC236}">
+                <a16:creationId xmlns:a16="http://schemas.microsoft.com/office/drawing/2014/main" id="{0AA034EA-24B4-4EFF-BD3F-7481F1F7AEF3}"/>
+              </a:ext>
+            </a:extLst>
+          </p:cNvPr>
+          <p:cNvSpPr txBox="1">
+            <a:spLocks/>
+          </p:cNvSpPr>
+          <p:nvPr/>
+        </p:nvSpPr>
+        <p:spPr>
+          <a:xfrm>
+            <a:off x="1321300" y="2517344"/>
+            <a:ext cx="10515600" cy="4351338"/>
+          </a:xfrm>
+          <a:prstGeom prst="rect">
+            <a:avLst/>
+          </a:prstGeom>
+        </p:spPr>
+        <p:txBody>
+          <a:bodyPr vert="horz" lIns="91440" tIns="45720" rIns="91440" bIns="45720" rtlCol="0">
+            <a:normAutofit/>
+          </a:bodyPr>
+          <a:lstStyle>
+            <a:lvl1pPr marL="228600" indent="-228600" algn="l" defTabSz="914400" rtl="0" eaLnBrk="1" latinLnBrk="0" hangingPunct="1">
+              <a:lnSpc>
+                <a:spcPct val="90000"/>
+              </a:lnSpc>
+              <a:spcBef>
+                <a:spcPts val="1000"/>
+              </a:spcBef>
+              <a:buFont typeface="Arial" panose="020B0604020202020204" pitchFamily="34" charset="0"/>
+              <a:buChar char="•"/>
+              <a:defRPr sz="2800" kern="1200">
+                <a:solidFill>
+                  <a:schemeClr val="tx1"/>
+                </a:solidFill>
+                <a:latin typeface="+mn-lt"/>
+                <a:ea typeface="+mn-ea"/>
+                <a:cs typeface="+mn-cs"/>
+              </a:defRPr>
+            </a:lvl1pPr>
+            <a:lvl2pPr marL="685800" indent="-228600" algn="l" defTabSz="914400" rtl="0" eaLnBrk="1" latinLnBrk="0" hangingPunct="1">
+              <a:lnSpc>
+                <a:spcPct val="90000"/>
+              </a:lnSpc>
+              <a:spcBef>
+                <a:spcPts val="500"/>
+              </a:spcBef>
+              <a:buFont typeface="Arial" panose="020B0604020202020204" pitchFamily="34" charset="0"/>
+              <a:buChar char="•"/>
+              <a:defRPr sz="2400" kern="1200">
+                <a:solidFill>
+                  <a:schemeClr val="tx1"/>
+                </a:solidFill>
+                <a:latin typeface="+mn-lt"/>
+                <a:ea typeface="+mn-ea"/>
+                <a:cs typeface="+mn-cs"/>
+              </a:defRPr>
+            </a:lvl2pPr>
+            <a:lvl3pPr marL="1143000" indent="-228600" algn="l" defTabSz="914400" rtl="0" eaLnBrk="1" latinLnBrk="0" hangingPunct="1">
+              <a:lnSpc>
+                <a:spcPct val="90000"/>
+              </a:lnSpc>
+              <a:spcBef>
+                <a:spcPts val="500"/>
+              </a:spcBef>
+              <a:buFont typeface="Arial" panose="020B0604020202020204" pitchFamily="34" charset="0"/>
+              <a:buChar char="•"/>
+              <a:defRPr sz="2000" kern="1200">
+                <a:solidFill>
+                  <a:schemeClr val="tx1"/>
+                </a:solidFill>
+                <a:latin typeface="+mn-lt"/>
+                <a:ea typeface="+mn-ea"/>
+                <a:cs typeface="+mn-cs"/>
+              </a:defRPr>
+            </a:lvl3pPr>
+            <a:lvl4pPr marL="1600200" indent="-228600" algn="l" defTabSz="914400" rtl="0" eaLnBrk="1" latinLnBrk="0" hangingPunct="1">
+              <a:lnSpc>
+                <a:spcPct val="90000"/>
+              </a:lnSpc>
+              <a:spcBef>
+                <a:spcPts val="500"/>
+              </a:spcBef>
+              <a:buFont typeface="Arial" panose="020B0604020202020204" pitchFamily="34" charset="0"/>
+              <a:buChar char="•"/>
+              <a:defRPr sz="1800" kern="1200">
+                <a:solidFill>
+                  <a:schemeClr val="tx1"/>
+                </a:solidFill>
+                <a:latin typeface="+mn-lt"/>
+                <a:ea typeface="+mn-ea"/>
+                <a:cs typeface="+mn-cs"/>
+              </a:defRPr>
+            </a:lvl4pPr>
+            <a:lvl5pPr marL="2057400" indent="-228600" algn="l" defTabSz="914400" rtl="0" eaLnBrk="1" latinLnBrk="0" hangingPunct="1">
+              <a:lnSpc>
+                <a:spcPct val="90000"/>
+              </a:lnSpc>
+              <a:spcBef>
+                <a:spcPts val="500"/>
+              </a:spcBef>
+              <a:buFont typeface="Arial" panose="020B0604020202020204" pitchFamily="34" charset="0"/>
+              <a:buChar char="•"/>
+              <a:defRPr sz="1800" kern="1200">
+                <a:solidFill>
+                  <a:schemeClr val="tx1"/>
+                </a:solidFill>
+                <a:latin typeface="+mn-lt"/>
+                <a:ea typeface="+mn-ea"/>
+                <a:cs typeface="+mn-cs"/>
+              </a:defRPr>
+            </a:lvl5pPr>
+            <a:lvl6pPr marL="2514600" indent="-228600" algn="l" defTabSz="914400" rtl="0" eaLnBrk="1" latinLnBrk="0" hangingPunct="1">
+              <a:lnSpc>
+                <a:spcPct val="90000"/>
+              </a:lnSpc>
+              <a:spcBef>
+                <a:spcPts val="500"/>
+              </a:spcBef>
+              <a:buFont typeface="Arial" panose="020B0604020202020204" pitchFamily="34" charset="0"/>
+              <a:buChar char="•"/>
+              <a:defRPr sz="1800" kern="1200">
+                <a:solidFill>
+                  <a:schemeClr val="tx1"/>
+                </a:solidFill>
+                <a:latin typeface="+mn-lt"/>
+                <a:ea typeface="+mn-ea"/>
+                <a:cs typeface="+mn-cs"/>
+              </a:defRPr>
+            </a:lvl6pPr>
+            <a:lvl7pPr marL="2971800" indent="-228600" algn="l" defTabSz="914400" rtl="0" eaLnBrk="1" latinLnBrk="0" hangingPunct="1">
+              <a:lnSpc>
+                <a:spcPct val="90000"/>
+              </a:lnSpc>
+              <a:spcBef>
+                <a:spcPts val="500"/>
+              </a:spcBef>
+              <a:buFont typeface="Arial" panose="020B0604020202020204" pitchFamily="34" charset="0"/>
+              <a:buChar char="•"/>
+              <a:defRPr sz="1800" kern="1200">
+                <a:solidFill>
+                  <a:schemeClr val="tx1"/>
+                </a:solidFill>
+                <a:latin typeface="+mn-lt"/>
+                <a:ea typeface="+mn-ea"/>
+                <a:cs typeface="+mn-cs"/>
+              </a:defRPr>
+            </a:lvl7pPr>
+            <a:lvl8pPr marL="3429000" indent="-228600" algn="l" defTabSz="914400" rtl="0" eaLnBrk="1" latinLnBrk="0" hangingPunct="1">
+              <a:lnSpc>
+                <a:spcPct val="90000"/>
+              </a:lnSpc>
+              <a:spcBef>
+                <a:spcPts val="500"/>
+              </a:spcBef>
+              <a:buFont typeface="Arial" panose="020B0604020202020204" pitchFamily="34" charset="0"/>
+              <a:buChar char="•"/>
+              <a:defRPr sz="1800" kern="1200">
+                <a:solidFill>
+                  <a:schemeClr val="tx1"/>
+                </a:solidFill>
+                <a:latin typeface="+mn-lt"/>
+                <a:ea typeface="+mn-ea"/>
+                <a:cs typeface="+mn-cs"/>
+              </a:defRPr>
+            </a:lvl8pPr>
+            <a:lvl9pPr marL="3886200" indent="-228600" algn="l" defTabSz="914400" rtl="0" eaLnBrk="1" latinLnBrk="0" hangingPunct="1">
+              <a:lnSpc>
+                <a:spcPct val="90000"/>
+              </a:lnSpc>
+              <a:spcBef>
+                <a:spcPts val="500"/>
+              </a:spcBef>
+              <a:buFont typeface="Arial" panose="020B0604020202020204" pitchFamily="34" charset="0"/>
+              <a:buChar char="•"/>
+              <a:defRPr sz="1800" kern="1200">
+                <a:solidFill>
+                  <a:schemeClr val="tx1"/>
+                </a:solidFill>
+                <a:latin typeface="+mn-lt"/>
+                <a:ea typeface="+mn-ea"/>
+                <a:cs typeface="+mn-cs"/>
+              </a:defRPr>
+            </a:lvl9pPr>
+          </a:lstStyle>
+          <a:p>
+            <a:pPr marL="0" indent="0">
+              <a:buFont typeface="Arial" panose="020B0604020202020204" pitchFamily="34" charset="0"/>
+              <a:buNone/>
+            </a:pPr>
+            <a:r>
+              <a:rPr lang="en-GB" dirty="0"/>
+              <a:t>Mine:</a:t>
+            </a:r>
+          </a:p>
+        </p:txBody>
+      </p:sp>
+      <p:sp>
+        <p:nvSpPr>
+          <p:cNvPr id="8" name="Content Placeholder 2">
+            <a:extLst>
+              <a:ext uri="{FF2B5EF4-FFF2-40B4-BE49-F238E27FC236}">
+                <a16:creationId xmlns:a16="http://schemas.microsoft.com/office/drawing/2014/main" id="{C1F9D259-0E23-4C4A-BBE8-443623566E83}"/>
+              </a:ext>
+            </a:extLst>
+          </p:cNvPr>
+          <p:cNvSpPr txBox="1">
+            <a:spLocks/>
+          </p:cNvSpPr>
+          <p:nvPr/>
+        </p:nvSpPr>
+        <p:spPr>
+          <a:xfrm>
+            <a:off x="6096000" y="2932304"/>
+            <a:ext cx="10515600" cy="4351338"/>
+          </a:xfrm>
+          <a:prstGeom prst="rect">
+            <a:avLst/>
+          </a:prstGeom>
+        </p:spPr>
+        <p:txBody>
+          <a:bodyPr vert="horz" lIns="91440" tIns="45720" rIns="91440" bIns="45720" rtlCol="0">
+            <a:normAutofit/>
+          </a:bodyPr>
+          <a:lstStyle>
+            <a:lvl1pPr marL="228600" indent="-228600" algn="l" defTabSz="914400" rtl="0" eaLnBrk="1" latinLnBrk="0" hangingPunct="1">
+              <a:lnSpc>
+                <a:spcPct val="90000"/>
+              </a:lnSpc>
+              <a:spcBef>
+                <a:spcPts val="1000"/>
+              </a:spcBef>
+              <a:buFont typeface="Arial" panose="020B0604020202020204" pitchFamily="34" charset="0"/>
+              <a:buChar char="•"/>
+              <a:defRPr sz="2800" kern="1200">
+                <a:solidFill>
+                  <a:schemeClr val="tx1"/>
+                </a:solidFill>
+                <a:latin typeface="+mn-lt"/>
+                <a:ea typeface="+mn-ea"/>
+                <a:cs typeface="+mn-cs"/>
+              </a:defRPr>
+            </a:lvl1pPr>
+            <a:lvl2pPr marL="685800" indent="-228600" algn="l" defTabSz="914400" rtl="0" eaLnBrk="1" latinLnBrk="0" hangingPunct="1">
+              <a:lnSpc>
+                <a:spcPct val="90000"/>
+              </a:lnSpc>
+              <a:spcBef>
+                <a:spcPts val="500"/>
+              </a:spcBef>
+              <a:buFont typeface="Arial" panose="020B0604020202020204" pitchFamily="34" charset="0"/>
+              <a:buChar char="•"/>
+              <a:defRPr sz="2400" kern="1200">
+                <a:solidFill>
+                  <a:schemeClr val="tx1"/>
+                </a:solidFill>
+                <a:latin typeface="+mn-lt"/>
+                <a:ea typeface="+mn-ea"/>
+                <a:cs typeface="+mn-cs"/>
+              </a:defRPr>
+            </a:lvl2pPr>
+            <a:lvl3pPr marL="1143000" indent="-228600" algn="l" defTabSz="914400" rtl="0" eaLnBrk="1" latinLnBrk="0" hangingPunct="1">
+              <a:lnSpc>
+                <a:spcPct val="90000"/>
+              </a:lnSpc>
+              <a:spcBef>
+                <a:spcPts val="500"/>
+              </a:spcBef>
+              <a:buFont typeface="Arial" panose="020B0604020202020204" pitchFamily="34" charset="0"/>
+              <a:buChar char="•"/>
+              <a:defRPr sz="2000" kern="1200">
+                <a:solidFill>
+                  <a:schemeClr val="tx1"/>
+                </a:solidFill>
+                <a:latin typeface="+mn-lt"/>
+                <a:ea typeface="+mn-ea"/>
+                <a:cs typeface="+mn-cs"/>
+              </a:defRPr>
+            </a:lvl3pPr>
+            <a:lvl4pPr marL="1600200" indent="-228600" algn="l" defTabSz="914400" rtl="0" eaLnBrk="1" latinLnBrk="0" hangingPunct="1">
+              <a:lnSpc>
+                <a:spcPct val="90000"/>
+              </a:lnSpc>
+              <a:spcBef>
+                <a:spcPts val="500"/>
+              </a:spcBef>
+              <a:buFont typeface="Arial" panose="020B0604020202020204" pitchFamily="34" charset="0"/>
+              <a:buChar char="•"/>
+              <a:defRPr sz="1800" kern="1200">
+                <a:solidFill>
+                  <a:schemeClr val="tx1"/>
+                </a:solidFill>
+                <a:latin typeface="+mn-lt"/>
+                <a:ea typeface="+mn-ea"/>
+                <a:cs typeface="+mn-cs"/>
+              </a:defRPr>
+            </a:lvl4pPr>
+            <a:lvl5pPr marL="2057400" indent="-228600" algn="l" defTabSz="914400" rtl="0" eaLnBrk="1" latinLnBrk="0" hangingPunct="1">
+              <a:lnSpc>
+                <a:spcPct val="90000"/>
+              </a:lnSpc>
+              <a:spcBef>
+                <a:spcPts val="500"/>
+              </a:spcBef>
+              <a:buFont typeface="Arial" panose="020B0604020202020204" pitchFamily="34" charset="0"/>
+              <a:buChar char="•"/>
+              <a:defRPr sz="1800" kern="1200">
+                <a:solidFill>
+                  <a:schemeClr val="tx1"/>
+                </a:solidFill>
+                <a:latin typeface="+mn-lt"/>
+                <a:ea typeface="+mn-ea"/>
+                <a:cs typeface="+mn-cs"/>
+              </a:defRPr>
+            </a:lvl5pPr>
+            <a:lvl6pPr marL="2514600" indent="-228600" algn="l" defTabSz="914400" rtl="0" eaLnBrk="1" latinLnBrk="0" hangingPunct="1">
+              <a:lnSpc>
+                <a:spcPct val="90000"/>
+              </a:lnSpc>
+              <a:spcBef>
+                <a:spcPts val="500"/>
+              </a:spcBef>
+              <a:buFont typeface="Arial" panose="020B0604020202020204" pitchFamily="34" charset="0"/>
+              <a:buChar char="•"/>
+              <a:defRPr sz="1800" kern="1200">
+                <a:solidFill>
+                  <a:schemeClr val="tx1"/>
+                </a:solidFill>
+                <a:latin typeface="+mn-lt"/>
+                <a:ea typeface="+mn-ea"/>
+                <a:cs typeface="+mn-cs"/>
+              </a:defRPr>
+            </a:lvl6pPr>
+            <a:lvl7pPr marL="2971800" indent="-228600" algn="l" defTabSz="914400" rtl="0" eaLnBrk="1" latinLnBrk="0" hangingPunct="1">
+              <a:lnSpc>
+                <a:spcPct val="90000"/>
+              </a:lnSpc>
+              <a:spcBef>
+                <a:spcPts val="500"/>
+              </a:spcBef>
+              <a:buFont typeface="Arial" panose="020B0604020202020204" pitchFamily="34" charset="0"/>
+              <a:buChar char="•"/>
+              <a:defRPr sz="1800" kern="1200">
+                <a:solidFill>
+                  <a:schemeClr val="tx1"/>
+                </a:solidFill>
+                <a:latin typeface="+mn-lt"/>
+                <a:ea typeface="+mn-ea"/>
+                <a:cs typeface="+mn-cs"/>
+              </a:defRPr>
+            </a:lvl7pPr>
+            <a:lvl8pPr marL="3429000" indent="-228600" algn="l" defTabSz="914400" rtl="0" eaLnBrk="1" latinLnBrk="0" hangingPunct="1">
+              <a:lnSpc>
+                <a:spcPct val="90000"/>
+              </a:lnSpc>
+              <a:spcBef>
+                <a:spcPts val="500"/>
+              </a:spcBef>
+              <a:buFont typeface="Arial" panose="020B0604020202020204" pitchFamily="34" charset="0"/>
+              <a:buChar char="•"/>
+              <a:defRPr sz="1800" kern="1200">
+                <a:solidFill>
+                  <a:schemeClr val="tx1"/>
+                </a:solidFill>
+                <a:latin typeface="+mn-lt"/>
+                <a:ea typeface="+mn-ea"/>
+                <a:cs typeface="+mn-cs"/>
+              </a:defRPr>
+            </a:lvl8pPr>
+            <a:lvl9pPr marL="3886200" indent="-228600" algn="l" defTabSz="914400" rtl="0" eaLnBrk="1" latinLnBrk="0" hangingPunct="1">
+              <a:lnSpc>
+                <a:spcPct val="90000"/>
+              </a:lnSpc>
+              <a:spcBef>
+                <a:spcPts val="500"/>
+              </a:spcBef>
+              <a:buFont typeface="Arial" panose="020B0604020202020204" pitchFamily="34" charset="0"/>
+              <a:buChar char="•"/>
+              <a:defRPr sz="1800" kern="1200">
+                <a:solidFill>
+                  <a:schemeClr val="tx1"/>
+                </a:solidFill>
+                <a:latin typeface="+mn-lt"/>
+                <a:ea typeface="+mn-ea"/>
+                <a:cs typeface="+mn-cs"/>
+              </a:defRPr>
+            </a:lvl9pPr>
+          </a:lstStyle>
+          <a:p>
+            <a:pPr marL="0" indent="0">
+              <a:buFont typeface="Arial" panose="020B0604020202020204" pitchFamily="34" charset="0"/>
+              <a:buNone/>
+            </a:pPr>
+            <a:r>
+              <a:rPr lang="en-GB" dirty="0"/>
+              <a:t>Previous:</a:t>
+            </a:r>
+          </a:p>
+        </p:txBody>
+      </p:sp>
+      <p:pic>
+        <p:nvPicPr>
+          <p:cNvPr id="9" name="Picture 8">
+            <a:extLst>
+              <a:ext uri="{FF2B5EF4-FFF2-40B4-BE49-F238E27FC236}">
+                <a16:creationId xmlns:a16="http://schemas.microsoft.com/office/drawing/2014/main" id="{4713BCE3-B0C9-4C27-B450-5432AA7521DB}"/>
+              </a:ext>
+            </a:extLst>
+          </p:cNvPr>
+          <p:cNvPicPr>
+            <a:picLocks noChangeAspect="1"/>
+          </p:cNvPicPr>
+          <p:nvPr/>
+        </p:nvPicPr>
+        <p:blipFill rotWithShape="1">
+          <a:blip r:embed="rId3"/>
+          <a:srcRect l="6111" t="6270" r="12107" b="3893"/>
+          <a:stretch/>
+        </p:blipFill>
+        <p:spPr>
+          <a:xfrm>
+            <a:off x="7939042" y="2903772"/>
+            <a:ext cx="3367249" cy="3662265"/>
+          </a:xfrm>
+          <a:prstGeom prst="rect">
+            <a:avLst/>
+          </a:prstGeom>
+        </p:spPr>
+      </p:pic>
+      <p:pic>
+        <p:nvPicPr>
+          <p:cNvPr id="11" name="Picture 10">
+            <a:extLst>
+              <a:ext uri="{FF2B5EF4-FFF2-40B4-BE49-F238E27FC236}">
+                <a16:creationId xmlns:a16="http://schemas.microsoft.com/office/drawing/2014/main" id="{C5C778E9-BBC6-4029-9AEE-829F79FE5EB0}"/>
+              </a:ext>
+            </a:extLst>
+          </p:cNvPr>
+          <p:cNvPicPr>
+            <a:picLocks noChangeAspect="1"/>
+          </p:cNvPicPr>
+          <p:nvPr/>
+        </p:nvPicPr>
+        <p:blipFill>
+          <a:blip r:embed="rId4"/>
+          <a:stretch>
+            <a:fillRect/>
+          </a:stretch>
+        </p:blipFill>
+        <p:spPr>
+          <a:xfrm>
+            <a:off x="1326634" y="3029887"/>
+            <a:ext cx="3847845" cy="3020669"/>
+          </a:xfrm>
+          <a:prstGeom prst="rect">
+            <a:avLst/>
+          </a:prstGeom>
+        </p:spPr>
+      </p:pic>
+      <p:sp>
+        <p:nvSpPr>
+          <p:cNvPr id="12" name="Content Placeholder 2">
+            <a:extLst>
+              <a:ext uri="{FF2B5EF4-FFF2-40B4-BE49-F238E27FC236}">
+                <a16:creationId xmlns:a16="http://schemas.microsoft.com/office/drawing/2014/main" id="{630A16ED-9E99-417E-A262-E2D0BEDC9520}"/>
+              </a:ext>
+            </a:extLst>
+          </p:cNvPr>
+          <p:cNvSpPr txBox="1">
+            <a:spLocks/>
+          </p:cNvSpPr>
+          <p:nvPr/>
+        </p:nvSpPr>
+        <p:spPr>
+          <a:xfrm>
+            <a:off x="5174479" y="3856304"/>
+            <a:ext cx="2969663" cy="4653910"/>
+          </a:xfrm>
+          <a:prstGeom prst="rect">
+            <a:avLst/>
+          </a:prstGeom>
+        </p:spPr>
+        <p:txBody>
+          <a:bodyPr vert="horz" lIns="91440" tIns="45720" rIns="91440" bIns="45720" rtlCol="0">
+            <a:normAutofit/>
+          </a:bodyPr>
+          <a:lstStyle>
+            <a:lvl1pPr marL="228600" indent="-228600" algn="l" defTabSz="914400" rtl="0" eaLnBrk="1" latinLnBrk="0" hangingPunct="1">
+              <a:lnSpc>
+                <a:spcPct val="90000"/>
+              </a:lnSpc>
+              <a:spcBef>
+                <a:spcPts val="1000"/>
+              </a:spcBef>
+              <a:buFont typeface="Arial" panose="020B0604020202020204" pitchFamily="34" charset="0"/>
+              <a:buChar char="•"/>
+              <a:defRPr sz="2800" kern="1200">
+                <a:solidFill>
+                  <a:schemeClr val="tx1"/>
+                </a:solidFill>
+                <a:latin typeface="+mn-lt"/>
+                <a:ea typeface="+mn-ea"/>
+                <a:cs typeface="+mn-cs"/>
+              </a:defRPr>
+            </a:lvl1pPr>
+            <a:lvl2pPr marL="685800" indent="-228600" algn="l" defTabSz="914400" rtl="0" eaLnBrk="1" latinLnBrk="0" hangingPunct="1">
+              <a:lnSpc>
+                <a:spcPct val="90000"/>
+              </a:lnSpc>
+              <a:spcBef>
+                <a:spcPts val="500"/>
+              </a:spcBef>
+              <a:buFont typeface="Arial" panose="020B0604020202020204" pitchFamily="34" charset="0"/>
+              <a:buChar char="•"/>
+              <a:defRPr sz="2400" kern="1200">
+                <a:solidFill>
+                  <a:schemeClr val="tx1"/>
+                </a:solidFill>
+                <a:latin typeface="+mn-lt"/>
+                <a:ea typeface="+mn-ea"/>
+                <a:cs typeface="+mn-cs"/>
+              </a:defRPr>
+            </a:lvl2pPr>
+            <a:lvl3pPr marL="1143000" indent="-228600" algn="l" defTabSz="914400" rtl="0" eaLnBrk="1" latinLnBrk="0" hangingPunct="1">
+              <a:lnSpc>
+                <a:spcPct val="90000"/>
+              </a:lnSpc>
+              <a:spcBef>
+                <a:spcPts val="500"/>
+              </a:spcBef>
+              <a:buFont typeface="Arial" panose="020B0604020202020204" pitchFamily="34" charset="0"/>
+              <a:buChar char="•"/>
+              <a:defRPr sz="2000" kern="1200">
+                <a:solidFill>
+                  <a:schemeClr val="tx1"/>
+                </a:solidFill>
+                <a:latin typeface="+mn-lt"/>
+                <a:ea typeface="+mn-ea"/>
+                <a:cs typeface="+mn-cs"/>
+              </a:defRPr>
+            </a:lvl3pPr>
+            <a:lvl4pPr marL="1600200" indent="-228600" algn="l" defTabSz="914400" rtl="0" eaLnBrk="1" latinLnBrk="0" hangingPunct="1">
+              <a:lnSpc>
+                <a:spcPct val="90000"/>
+              </a:lnSpc>
+              <a:spcBef>
+                <a:spcPts val="500"/>
+              </a:spcBef>
+              <a:buFont typeface="Arial" panose="020B0604020202020204" pitchFamily="34" charset="0"/>
+              <a:buChar char="•"/>
+              <a:defRPr sz="1800" kern="1200">
+                <a:solidFill>
+                  <a:schemeClr val="tx1"/>
+                </a:solidFill>
+                <a:latin typeface="+mn-lt"/>
+                <a:ea typeface="+mn-ea"/>
+                <a:cs typeface="+mn-cs"/>
+              </a:defRPr>
+            </a:lvl4pPr>
+            <a:lvl5pPr marL="2057400" indent="-228600" algn="l" defTabSz="914400" rtl="0" eaLnBrk="1" latinLnBrk="0" hangingPunct="1">
+              <a:lnSpc>
+                <a:spcPct val="90000"/>
+              </a:lnSpc>
+              <a:spcBef>
+                <a:spcPts val="500"/>
+              </a:spcBef>
+              <a:buFont typeface="Arial" panose="020B0604020202020204" pitchFamily="34" charset="0"/>
+              <a:buChar char="•"/>
+              <a:defRPr sz="1800" kern="1200">
+                <a:solidFill>
+                  <a:schemeClr val="tx1"/>
+                </a:solidFill>
+                <a:latin typeface="+mn-lt"/>
+                <a:ea typeface="+mn-ea"/>
+                <a:cs typeface="+mn-cs"/>
+              </a:defRPr>
+            </a:lvl5pPr>
+            <a:lvl6pPr marL="2514600" indent="-228600" algn="l" defTabSz="914400" rtl="0" eaLnBrk="1" latinLnBrk="0" hangingPunct="1">
+              <a:lnSpc>
+                <a:spcPct val="90000"/>
+              </a:lnSpc>
+              <a:spcBef>
+                <a:spcPts val="500"/>
+              </a:spcBef>
+              <a:buFont typeface="Arial" panose="020B0604020202020204" pitchFamily="34" charset="0"/>
+              <a:buChar char="•"/>
+              <a:defRPr sz="1800" kern="1200">
+                <a:solidFill>
+                  <a:schemeClr val="tx1"/>
+                </a:solidFill>
+                <a:latin typeface="+mn-lt"/>
+                <a:ea typeface="+mn-ea"/>
+                <a:cs typeface="+mn-cs"/>
+              </a:defRPr>
+            </a:lvl6pPr>
+            <a:lvl7pPr marL="2971800" indent="-228600" algn="l" defTabSz="914400" rtl="0" eaLnBrk="1" latinLnBrk="0" hangingPunct="1">
+              <a:lnSpc>
+                <a:spcPct val="90000"/>
+              </a:lnSpc>
+              <a:spcBef>
+                <a:spcPts val="500"/>
+              </a:spcBef>
+              <a:buFont typeface="Arial" panose="020B0604020202020204" pitchFamily="34" charset="0"/>
+              <a:buChar char="•"/>
+              <a:defRPr sz="1800" kern="1200">
+                <a:solidFill>
+                  <a:schemeClr val="tx1"/>
+                </a:solidFill>
+                <a:latin typeface="+mn-lt"/>
+                <a:ea typeface="+mn-ea"/>
+                <a:cs typeface="+mn-cs"/>
+              </a:defRPr>
+            </a:lvl7pPr>
+            <a:lvl8pPr marL="3429000" indent="-228600" algn="l" defTabSz="914400" rtl="0" eaLnBrk="1" latinLnBrk="0" hangingPunct="1">
+              <a:lnSpc>
+                <a:spcPct val="90000"/>
+              </a:lnSpc>
+              <a:spcBef>
+                <a:spcPts val="500"/>
+              </a:spcBef>
+              <a:buFont typeface="Arial" panose="020B0604020202020204" pitchFamily="34" charset="0"/>
+              <a:buChar char="•"/>
+              <a:defRPr sz="1800" kern="1200">
+                <a:solidFill>
+                  <a:schemeClr val="tx1"/>
+                </a:solidFill>
+                <a:latin typeface="+mn-lt"/>
+                <a:ea typeface="+mn-ea"/>
+                <a:cs typeface="+mn-cs"/>
+              </a:defRPr>
+            </a:lvl8pPr>
+            <a:lvl9pPr marL="3886200" indent="-228600" algn="l" defTabSz="914400" rtl="0" eaLnBrk="1" latinLnBrk="0" hangingPunct="1">
+              <a:lnSpc>
+                <a:spcPct val="90000"/>
+              </a:lnSpc>
+              <a:spcBef>
+                <a:spcPts val="500"/>
+              </a:spcBef>
+              <a:buFont typeface="Arial" panose="020B0604020202020204" pitchFamily="34" charset="0"/>
+              <a:buChar char="•"/>
+              <a:defRPr sz="1800" kern="1200">
+                <a:solidFill>
+                  <a:schemeClr val="tx1"/>
+                </a:solidFill>
+                <a:latin typeface="+mn-lt"/>
+                <a:ea typeface="+mn-ea"/>
+                <a:cs typeface="+mn-cs"/>
+              </a:defRPr>
+            </a:lvl9pPr>
+          </a:lstStyle>
+          <a:p>
+            <a:pPr marL="0" indent="0">
+              <a:buFont typeface="Arial" panose="020B0604020202020204" pitchFamily="34" charset="0"/>
+              <a:buNone/>
+            </a:pPr>
+            <a:r>
+              <a:rPr lang="en-GB" dirty="0"/>
+              <a:t>Same time scale </a:t>
+            </a:r>
+            <a:r>
+              <a:rPr lang="en-GB" dirty="0">
+                <a:sym typeface="Wingdings" panose="05000000000000000000" pitchFamily="2" charset="2"/>
+              </a:rPr>
+              <a:t></a:t>
+            </a:r>
+          </a:p>
+          <a:p>
+            <a:pPr marL="0" indent="0">
+              <a:buFont typeface="Arial" panose="020B0604020202020204" pitchFamily="34" charset="0"/>
+              <a:buNone/>
+            </a:pPr>
+            <a:r>
+              <a:rPr lang="en-GB" dirty="0">
+                <a:sym typeface="Wingdings" panose="05000000000000000000" pitchFamily="2" charset="2"/>
+              </a:rPr>
+              <a:t>But different energy scale</a:t>
+            </a:r>
+          </a:p>
+        </p:txBody>
+      </p:sp>
+    </p:spTree>
+    <p:extLst>
+      <p:ext uri="{BB962C8B-B14F-4D97-AF65-F5344CB8AC3E}">
+        <p14:creationId xmlns:p14="http://schemas.microsoft.com/office/powerpoint/2010/main" val="3536531905"/>
+      </p:ext>
+    </p:extLst>
+  </p:cSld>
+  <p:clrMapOvr>
+    <a:masterClrMapping/>
+  </p:clrMapOvr>
+</p:sld>
+</file>
+
+<file path=ppt/slides/slide27.xml><?xml version="1.0" encoding="utf-8"?>
+<p:sld xmlns:a="http://schemas.openxmlformats.org/drawingml/2006/main" xmlns:r="http://schemas.openxmlformats.org/officeDocument/2006/relationships" xmlns:p="http://schemas.openxmlformats.org/presentationml/2006/main">
+  <p:cSld>
+    <p:spTree>
+      <p:nvGrpSpPr>
+        <p:cNvPr id="1" name=""/>
+        <p:cNvGrpSpPr/>
+        <p:nvPr/>
+      </p:nvGrpSpPr>
+      <p:grpSpPr>
+        <a:xfrm>
+          <a:off x="0" y="0"/>
+          <a:ext cx="0" cy="0"/>
+          <a:chOff x="0" y="0"/>
+          <a:chExt cx="0" cy="0"/>
+        </a:xfrm>
+      </p:grpSpPr>
+      <p:sp>
+        <p:nvSpPr>
+          <p:cNvPr id="2" name="Title 1">
+            <a:extLst>
+              <a:ext uri="{FF2B5EF4-FFF2-40B4-BE49-F238E27FC236}">
+                <a16:creationId xmlns:a16="http://schemas.microsoft.com/office/drawing/2014/main" id="{A741D544-D415-41E6-B036-413C8005A761}"/>
+              </a:ext>
+            </a:extLst>
+          </p:cNvPr>
+          <p:cNvSpPr>
+            <a:spLocks noGrp="1"/>
+          </p:cNvSpPr>
+          <p:nvPr>
+            <p:ph type="title"/>
+          </p:nvPr>
+        </p:nvSpPr>
+        <p:spPr>
+          <a:xfrm>
+            <a:off x="838200" y="175865"/>
+            <a:ext cx="10515600" cy="1325563"/>
+          </a:xfrm>
+        </p:spPr>
+        <p:txBody>
+          <a:bodyPr/>
+          <a:lstStyle/>
+          <a:p>
+            <a:r>
+              <a:rPr lang="en-GB" dirty="0"/>
+              <a:t>Normalizing</a:t>
+            </a:r>
+          </a:p>
+        </p:txBody>
+      </p:sp>
+      <mc:AlternateContent xmlns:mc="http://schemas.openxmlformats.org/markup-compatibility/2006">
+        <mc:Choice xmlns:a14="http://schemas.microsoft.com/office/drawing/2010/main" Requires="a14">
+          <p:sp>
+            <p:nvSpPr>
+              <p:cNvPr id="6" name="Content Placeholder 2">
+                <a:extLst>
+                  <a:ext uri="{FF2B5EF4-FFF2-40B4-BE49-F238E27FC236}">
+                    <a16:creationId xmlns:a16="http://schemas.microsoft.com/office/drawing/2014/main" id="{1D08C16A-EAAC-423D-A568-23EA6B4C0B12}"/>
+                  </a:ext>
+                </a:extLst>
+              </p:cNvPr>
+              <p:cNvSpPr txBox="1">
+                <a:spLocks/>
+              </p:cNvSpPr>
+              <p:nvPr/>
+            </p:nvSpPr>
+            <p:spPr>
+              <a:xfrm>
+                <a:off x="955930" y="1142626"/>
+                <a:ext cx="10515600" cy="949928"/>
+              </a:xfrm>
+              <a:prstGeom prst="rect">
+                <a:avLst/>
+              </a:prstGeom>
+            </p:spPr>
+            <p:txBody>
+              <a:bodyPr vert="horz" lIns="91440" tIns="45720" rIns="91440" bIns="45720" rtlCol="0">
+                <a:normAutofit/>
+              </a:bodyPr>
+              <a:lstStyle>
+                <a:lvl1pPr marL="228600" indent="-228600" algn="l" defTabSz="914400" rtl="0" eaLnBrk="1" latinLnBrk="0" hangingPunct="1">
+                  <a:lnSpc>
+                    <a:spcPct val="90000"/>
+                  </a:lnSpc>
+                  <a:spcBef>
+                    <a:spcPts val="1000"/>
+                  </a:spcBef>
+                  <a:buFont typeface="Arial" panose="020B0604020202020204" pitchFamily="34" charset="0"/>
+                  <a:buChar char="•"/>
+                  <a:defRPr sz="2800" kern="1200">
+                    <a:solidFill>
+                      <a:schemeClr val="tx1"/>
+                    </a:solidFill>
+                    <a:latin typeface="+mn-lt"/>
+                    <a:ea typeface="+mn-ea"/>
+                    <a:cs typeface="+mn-cs"/>
+                  </a:defRPr>
+                </a:lvl1pPr>
+                <a:lvl2pPr marL="685800" indent="-228600" algn="l" defTabSz="914400" rtl="0" eaLnBrk="1" latinLnBrk="0" hangingPunct="1">
+                  <a:lnSpc>
+                    <a:spcPct val="90000"/>
+                  </a:lnSpc>
+                  <a:spcBef>
+                    <a:spcPts val="500"/>
+                  </a:spcBef>
+                  <a:buFont typeface="Arial" panose="020B0604020202020204" pitchFamily="34" charset="0"/>
+                  <a:buChar char="•"/>
+                  <a:defRPr sz="2400" kern="1200">
+                    <a:solidFill>
+                      <a:schemeClr val="tx1"/>
+                    </a:solidFill>
+                    <a:latin typeface="+mn-lt"/>
+                    <a:ea typeface="+mn-ea"/>
+                    <a:cs typeface="+mn-cs"/>
+                  </a:defRPr>
+                </a:lvl2pPr>
+                <a:lvl3pPr marL="1143000" indent="-228600" algn="l" defTabSz="914400" rtl="0" eaLnBrk="1" latinLnBrk="0" hangingPunct="1">
+                  <a:lnSpc>
+                    <a:spcPct val="90000"/>
+                  </a:lnSpc>
+                  <a:spcBef>
+                    <a:spcPts val="500"/>
+                  </a:spcBef>
+                  <a:buFont typeface="Arial" panose="020B0604020202020204" pitchFamily="34" charset="0"/>
+                  <a:buChar char="•"/>
+                  <a:defRPr sz="2000" kern="1200">
+                    <a:solidFill>
+                      <a:schemeClr val="tx1"/>
+                    </a:solidFill>
+                    <a:latin typeface="+mn-lt"/>
+                    <a:ea typeface="+mn-ea"/>
+                    <a:cs typeface="+mn-cs"/>
+                  </a:defRPr>
+                </a:lvl3pPr>
+                <a:lvl4pPr marL="1600200" indent="-228600" algn="l" defTabSz="914400" rtl="0" eaLnBrk="1" latinLnBrk="0" hangingPunct="1">
+                  <a:lnSpc>
+                    <a:spcPct val="90000"/>
+                  </a:lnSpc>
+                  <a:spcBef>
+                    <a:spcPts val="500"/>
+                  </a:spcBef>
+                  <a:buFont typeface="Arial" panose="020B0604020202020204" pitchFamily="34" charset="0"/>
+                  <a:buChar char="•"/>
+                  <a:defRPr sz="1800" kern="1200">
+                    <a:solidFill>
+                      <a:schemeClr val="tx1"/>
+                    </a:solidFill>
+                    <a:latin typeface="+mn-lt"/>
+                    <a:ea typeface="+mn-ea"/>
+                    <a:cs typeface="+mn-cs"/>
+                  </a:defRPr>
+                </a:lvl4pPr>
+                <a:lvl5pPr marL="2057400" indent="-228600" algn="l" defTabSz="914400" rtl="0" eaLnBrk="1" latinLnBrk="0" hangingPunct="1">
+                  <a:lnSpc>
+                    <a:spcPct val="90000"/>
+                  </a:lnSpc>
+                  <a:spcBef>
+                    <a:spcPts val="500"/>
+                  </a:spcBef>
+                  <a:buFont typeface="Arial" panose="020B0604020202020204" pitchFamily="34" charset="0"/>
+                  <a:buChar char="•"/>
+                  <a:defRPr sz="1800" kern="1200">
+                    <a:solidFill>
+                      <a:schemeClr val="tx1"/>
+                    </a:solidFill>
+                    <a:latin typeface="+mn-lt"/>
+                    <a:ea typeface="+mn-ea"/>
+                    <a:cs typeface="+mn-cs"/>
+                  </a:defRPr>
+                </a:lvl5pPr>
+                <a:lvl6pPr marL="2514600" indent="-228600" algn="l" defTabSz="914400" rtl="0" eaLnBrk="1" latinLnBrk="0" hangingPunct="1">
+                  <a:lnSpc>
+                    <a:spcPct val="90000"/>
+                  </a:lnSpc>
+                  <a:spcBef>
+                    <a:spcPts val="500"/>
+                  </a:spcBef>
+                  <a:buFont typeface="Arial" panose="020B0604020202020204" pitchFamily="34" charset="0"/>
+                  <a:buChar char="•"/>
+                  <a:defRPr sz="1800" kern="1200">
+                    <a:solidFill>
+                      <a:schemeClr val="tx1"/>
+                    </a:solidFill>
+                    <a:latin typeface="+mn-lt"/>
+                    <a:ea typeface="+mn-ea"/>
+                    <a:cs typeface="+mn-cs"/>
+                  </a:defRPr>
+                </a:lvl6pPr>
+                <a:lvl7pPr marL="2971800" indent="-228600" algn="l" defTabSz="914400" rtl="0" eaLnBrk="1" latinLnBrk="0" hangingPunct="1">
+                  <a:lnSpc>
+                    <a:spcPct val="90000"/>
+                  </a:lnSpc>
+                  <a:spcBef>
+                    <a:spcPts val="500"/>
+                  </a:spcBef>
+                  <a:buFont typeface="Arial" panose="020B0604020202020204" pitchFamily="34" charset="0"/>
+                  <a:buChar char="•"/>
+                  <a:defRPr sz="1800" kern="1200">
+                    <a:solidFill>
+                      <a:schemeClr val="tx1"/>
+                    </a:solidFill>
+                    <a:latin typeface="+mn-lt"/>
+                    <a:ea typeface="+mn-ea"/>
+                    <a:cs typeface="+mn-cs"/>
+                  </a:defRPr>
+                </a:lvl7pPr>
+                <a:lvl8pPr marL="3429000" indent="-228600" algn="l" defTabSz="914400" rtl="0" eaLnBrk="1" latinLnBrk="0" hangingPunct="1">
+                  <a:lnSpc>
+                    <a:spcPct val="90000"/>
+                  </a:lnSpc>
+                  <a:spcBef>
+                    <a:spcPts val="500"/>
+                  </a:spcBef>
+                  <a:buFont typeface="Arial" panose="020B0604020202020204" pitchFamily="34" charset="0"/>
+                  <a:buChar char="•"/>
+                  <a:defRPr sz="1800" kern="1200">
+                    <a:solidFill>
+                      <a:schemeClr val="tx1"/>
+                    </a:solidFill>
+                    <a:latin typeface="+mn-lt"/>
+                    <a:ea typeface="+mn-ea"/>
+                    <a:cs typeface="+mn-cs"/>
+                  </a:defRPr>
+                </a:lvl8pPr>
+                <a:lvl9pPr marL="3886200" indent="-228600" algn="l" defTabSz="914400" rtl="0" eaLnBrk="1" latinLnBrk="0" hangingPunct="1">
+                  <a:lnSpc>
+                    <a:spcPct val="90000"/>
+                  </a:lnSpc>
+                  <a:spcBef>
+                    <a:spcPts val="500"/>
+                  </a:spcBef>
+                  <a:buFont typeface="Arial" panose="020B0604020202020204" pitchFamily="34" charset="0"/>
+                  <a:buChar char="•"/>
+                  <a:defRPr sz="1800" kern="1200">
+                    <a:solidFill>
+                      <a:schemeClr val="tx1"/>
+                    </a:solidFill>
+                    <a:latin typeface="+mn-lt"/>
+                    <a:ea typeface="+mn-ea"/>
+                    <a:cs typeface="+mn-cs"/>
+                  </a:defRPr>
+                </a:lvl9pPr>
+              </a:lstStyle>
+              <a:p>
+                <a:r>
+                  <a:rPr lang="en-GB" dirty="0"/>
+                  <a:t>If in previous code </a:t>
+                </a:r>
+                <a14:m>
+                  <m:oMath xmlns:m="http://schemas.openxmlformats.org/officeDocument/2006/math">
+                    <m:sSub>
+                      <m:sSubPr>
+                        <m:ctrlPr>
+                          <a:rPr lang="en-GB" b="0" i="1" smtClean="0">
+                            <a:latin typeface="Cambria Math" panose="02040503050406030204" pitchFamily="18" charset="0"/>
+                            <a:ea typeface="Cambria Math" panose="02040503050406030204" pitchFamily="18" charset="0"/>
+                          </a:rPr>
+                        </m:ctrlPr>
+                      </m:sSubPr>
+                      <m:e>
+                        <m:r>
+                          <a:rPr lang="en-GB" i="1" smtClean="0">
+                            <a:latin typeface="Cambria Math" panose="02040503050406030204" pitchFamily="18" charset="0"/>
+                            <a:ea typeface="Cambria Math" panose="02040503050406030204" pitchFamily="18" charset="0"/>
+                          </a:rPr>
+                          <m:t>𝜖</m:t>
+                        </m:r>
+                      </m:e>
+                      <m:sub>
+                        <m:r>
+                          <a:rPr lang="en-GB" b="0" i="1" smtClean="0">
+                            <a:latin typeface="Cambria Math" panose="02040503050406030204" pitchFamily="18" charset="0"/>
+                            <a:ea typeface="Cambria Math" panose="02040503050406030204" pitchFamily="18" charset="0"/>
+                          </a:rPr>
+                          <m:t>0</m:t>
+                        </m:r>
+                      </m:sub>
+                    </m:sSub>
+                  </m:oMath>
+                </a14:m>
+                <a:r>
+                  <a:rPr lang="en-GB" dirty="0"/>
+                  <a:t> was assumed to be 0:</a:t>
+                </a:r>
+              </a:p>
+              <a:p>
+                <a:endParaRPr lang="en-GB" dirty="0"/>
+              </a:p>
+              <a:p>
+                <a:pPr marL="0" indent="0">
+                  <a:buFont typeface="Arial" panose="020B0604020202020204" pitchFamily="34" charset="0"/>
+                  <a:buNone/>
+                </a:pPr>
+                <a:endParaRPr lang="en-GB" dirty="0"/>
+              </a:p>
+            </p:txBody>
+          </p:sp>
+        </mc:Choice>
+        <mc:Fallback>
+          <p:sp>
+            <p:nvSpPr>
+              <p:cNvPr id="6" name="Content Placeholder 2">
+                <a:extLst>
+                  <a:ext uri="{FF2B5EF4-FFF2-40B4-BE49-F238E27FC236}">
+                    <a16:creationId xmlns:a16="http://schemas.microsoft.com/office/drawing/2014/main" id="{1D08C16A-EAAC-423D-A568-23EA6B4C0B12}"/>
+                  </a:ext>
+                </a:extLst>
+              </p:cNvPr>
+              <p:cNvSpPr txBox="1">
+                <a:spLocks noRot="1" noChangeAspect="1" noMove="1" noResize="1" noEditPoints="1" noAdjustHandles="1" noChangeArrowheads="1" noChangeShapeType="1" noTextEdit="1"/>
+              </p:cNvSpPr>
+              <p:nvPr/>
+            </p:nvSpPr>
+            <p:spPr>
+              <a:xfrm>
+                <a:off x="955930" y="1142626"/>
+                <a:ext cx="10515600" cy="949928"/>
+              </a:xfrm>
+              <a:prstGeom prst="rect">
+                <a:avLst/>
+              </a:prstGeom>
+              <a:blipFill>
+                <a:blip r:embed="rId2"/>
+                <a:stretch>
+                  <a:fillRect l="-1043" t="-10256"/>
+                </a:stretch>
+              </a:blipFill>
+            </p:spPr>
+            <p:txBody>
+              <a:bodyPr/>
+              <a:lstStyle/>
+              <a:p>
+                <a:r>
+                  <a:rPr lang="en-GB">
+                    <a:noFill/>
+                  </a:rPr>
+                  <a:t> </a:t>
+                </a:r>
+              </a:p>
+            </p:txBody>
+          </p:sp>
+        </mc:Fallback>
+      </mc:AlternateContent>
+      <p:sp>
+        <p:nvSpPr>
+          <p:cNvPr id="7" name="Content Placeholder 2">
+            <a:extLst>
+              <a:ext uri="{FF2B5EF4-FFF2-40B4-BE49-F238E27FC236}">
+                <a16:creationId xmlns:a16="http://schemas.microsoft.com/office/drawing/2014/main" id="{0AA034EA-24B4-4EFF-BD3F-7481F1F7AEF3}"/>
+              </a:ext>
+            </a:extLst>
+          </p:cNvPr>
+          <p:cNvSpPr txBox="1">
+            <a:spLocks/>
+          </p:cNvSpPr>
+          <p:nvPr/>
+        </p:nvSpPr>
+        <p:spPr>
+          <a:xfrm>
+            <a:off x="955930" y="1905578"/>
+            <a:ext cx="10515600" cy="4351338"/>
+          </a:xfrm>
+          <a:prstGeom prst="rect">
+            <a:avLst/>
+          </a:prstGeom>
+        </p:spPr>
+        <p:txBody>
+          <a:bodyPr vert="horz" lIns="91440" tIns="45720" rIns="91440" bIns="45720" rtlCol="0">
+            <a:normAutofit/>
+          </a:bodyPr>
+          <a:lstStyle>
+            <a:lvl1pPr marL="228600" indent="-228600" algn="l" defTabSz="914400" rtl="0" eaLnBrk="1" latinLnBrk="0" hangingPunct="1">
+              <a:lnSpc>
+                <a:spcPct val="90000"/>
+              </a:lnSpc>
+              <a:spcBef>
+                <a:spcPts val="1000"/>
+              </a:spcBef>
+              <a:buFont typeface="Arial" panose="020B0604020202020204" pitchFamily="34" charset="0"/>
+              <a:buChar char="•"/>
+              <a:defRPr sz="2800" kern="1200">
+                <a:solidFill>
+                  <a:schemeClr val="tx1"/>
+                </a:solidFill>
+                <a:latin typeface="+mn-lt"/>
+                <a:ea typeface="+mn-ea"/>
+                <a:cs typeface="+mn-cs"/>
+              </a:defRPr>
+            </a:lvl1pPr>
+            <a:lvl2pPr marL="685800" indent="-228600" algn="l" defTabSz="914400" rtl="0" eaLnBrk="1" latinLnBrk="0" hangingPunct="1">
+              <a:lnSpc>
+                <a:spcPct val="90000"/>
+              </a:lnSpc>
+              <a:spcBef>
+                <a:spcPts val="500"/>
+              </a:spcBef>
+              <a:buFont typeface="Arial" panose="020B0604020202020204" pitchFamily="34" charset="0"/>
+              <a:buChar char="•"/>
+              <a:defRPr sz="2400" kern="1200">
+                <a:solidFill>
+                  <a:schemeClr val="tx1"/>
+                </a:solidFill>
+                <a:latin typeface="+mn-lt"/>
+                <a:ea typeface="+mn-ea"/>
+                <a:cs typeface="+mn-cs"/>
+              </a:defRPr>
+            </a:lvl2pPr>
+            <a:lvl3pPr marL="1143000" indent="-228600" algn="l" defTabSz="914400" rtl="0" eaLnBrk="1" latinLnBrk="0" hangingPunct="1">
+              <a:lnSpc>
+                <a:spcPct val="90000"/>
+              </a:lnSpc>
+              <a:spcBef>
+                <a:spcPts val="500"/>
+              </a:spcBef>
+              <a:buFont typeface="Arial" panose="020B0604020202020204" pitchFamily="34" charset="0"/>
+              <a:buChar char="•"/>
+              <a:defRPr sz="2000" kern="1200">
+                <a:solidFill>
+                  <a:schemeClr val="tx1"/>
+                </a:solidFill>
+                <a:latin typeface="+mn-lt"/>
+                <a:ea typeface="+mn-ea"/>
+                <a:cs typeface="+mn-cs"/>
+              </a:defRPr>
+            </a:lvl3pPr>
+            <a:lvl4pPr marL="1600200" indent="-228600" algn="l" defTabSz="914400" rtl="0" eaLnBrk="1" latinLnBrk="0" hangingPunct="1">
+              <a:lnSpc>
+                <a:spcPct val="90000"/>
+              </a:lnSpc>
+              <a:spcBef>
+                <a:spcPts val="500"/>
+              </a:spcBef>
+              <a:buFont typeface="Arial" panose="020B0604020202020204" pitchFamily="34" charset="0"/>
+              <a:buChar char="•"/>
+              <a:defRPr sz="1800" kern="1200">
+                <a:solidFill>
+                  <a:schemeClr val="tx1"/>
+                </a:solidFill>
+                <a:latin typeface="+mn-lt"/>
+                <a:ea typeface="+mn-ea"/>
+                <a:cs typeface="+mn-cs"/>
+              </a:defRPr>
+            </a:lvl4pPr>
+            <a:lvl5pPr marL="2057400" indent="-228600" algn="l" defTabSz="914400" rtl="0" eaLnBrk="1" latinLnBrk="0" hangingPunct="1">
+              <a:lnSpc>
+                <a:spcPct val="90000"/>
+              </a:lnSpc>
+              <a:spcBef>
+                <a:spcPts val="500"/>
+              </a:spcBef>
+              <a:buFont typeface="Arial" panose="020B0604020202020204" pitchFamily="34" charset="0"/>
+              <a:buChar char="•"/>
+              <a:defRPr sz="1800" kern="1200">
+                <a:solidFill>
+                  <a:schemeClr val="tx1"/>
+                </a:solidFill>
+                <a:latin typeface="+mn-lt"/>
+                <a:ea typeface="+mn-ea"/>
+                <a:cs typeface="+mn-cs"/>
+              </a:defRPr>
+            </a:lvl5pPr>
+            <a:lvl6pPr marL="2514600" indent="-228600" algn="l" defTabSz="914400" rtl="0" eaLnBrk="1" latinLnBrk="0" hangingPunct="1">
+              <a:lnSpc>
+                <a:spcPct val="90000"/>
+              </a:lnSpc>
+              <a:spcBef>
+                <a:spcPts val="500"/>
+              </a:spcBef>
+              <a:buFont typeface="Arial" panose="020B0604020202020204" pitchFamily="34" charset="0"/>
+              <a:buChar char="•"/>
+              <a:defRPr sz="1800" kern="1200">
+                <a:solidFill>
+                  <a:schemeClr val="tx1"/>
+                </a:solidFill>
+                <a:latin typeface="+mn-lt"/>
+                <a:ea typeface="+mn-ea"/>
+                <a:cs typeface="+mn-cs"/>
+              </a:defRPr>
+            </a:lvl6pPr>
+            <a:lvl7pPr marL="2971800" indent="-228600" algn="l" defTabSz="914400" rtl="0" eaLnBrk="1" latinLnBrk="0" hangingPunct="1">
+              <a:lnSpc>
+                <a:spcPct val="90000"/>
+              </a:lnSpc>
+              <a:spcBef>
+                <a:spcPts val="500"/>
+              </a:spcBef>
+              <a:buFont typeface="Arial" panose="020B0604020202020204" pitchFamily="34" charset="0"/>
+              <a:buChar char="•"/>
+              <a:defRPr sz="1800" kern="1200">
+                <a:solidFill>
+                  <a:schemeClr val="tx1"/>
+                </a:solidFill>
+                <a:latin typeface="+mn-lt"/>
+                <a:ea typeface="+mn-ea"/>
+                <a:cs typeface="+mn-cs"/>
+              </a:defRPr>
+            </a:lvl7pPr>
+            <a:lvl8pPr marL="3429000" indent="-228600" algn="l" defTabSz="914400" rtl="0" eaLnBrk="1" latinLnBrk="0" hangingPunct="1">
+              <a:lnSpc>
+                <a:spcPct val="90000"/>
+              </a:lnSpc>
+              <a:spcBef>
+                <a:spcPts val="500"/>
+              </a:spcBef>
+              <a:buFont typeface="Arial" panose="020B0604020202020204" pitchFamily="34" charset="0"/>
+              <a:buChar char="•"/>
+              <a:defRPr sz="1800" kern="1200">
+                <a:solidFill>
+                  <a:schemeClr val="tx1"/>
+                </a:solidFill>
+                <a:latin typeface="+mn-lt"/>
+                <a:ea typeface="+mn-ea"/>
+                <a:cs typeface="+mn-cs"/>
+              </a:defRPr>
+            </a:lvl8pPr>
+            <a:lvl9pPr marL="3886200" indent="-228600" algn="l" defTabSz="914400" rtl="0" eaLnBrk="1" latinLnBrk="0" hangingPunct="1">
+              <a:lnSpc>
+                <a:spcPct val="90000"/>
+              </a:lnSpc>
+              <a:spcBef>
+                <a:spcPts val="500"/>
+              </a:spcBef>
+              <a:buFont typeface="Arial" panose="020B0604020202020204" pitchFamily="34" charset="0"/>
+              <a:buChar char="•"/>
+              <a:defRPr sz="1800" kern="1200">
+                <a:solidFill>
+                  <a:schemeClr val="tx1"/>
+                </a:solidFill>
+                <a:latin typeface="+mn-lt"/>
+                <a:ea typeface="+mn-ea"/>
+                <a:cs typeface="+mn-cs"/>
+              </a:defRPr>
+            </a:lvl9pPr>
+          </a:lstStyle>
+          <a:p>
+            <a:pPr marL="0" indent="0">
+              <a:buFont typeface="Arial" panose="020B0604020202020204" pitchFamily="34" charset="0"/>
+              <a:buNone/>
+            </a:pPr>
+            <a:r>
+              <a:rPr lang="en-GB" dirty="0"/>
+              <a:t>Mine:</a:t>
+            </a:r>
+          </a:p>
+        </p:txBody>
+      </p:sp>
+      <p:sp>
+        <p:nvSpPr>
+          <p:cNvPr id="8" name="Content Placeholder 2">
+            <a:extLst>
+              <a:ext uri="{FF2B5EF4-FFF2-40B4-BE49-F238E27FC236}">
+                <a16:creationId xmlns:a16="http://schemas.microsoft.com/office/drawing/2014/main" id="{C1F9D259-0E23-4C4A-BBE8-443623566E83}"/>
+              </a:ext>
+            </a:extLst>
+          </p:cNvPr>
+          <p:cNvSpPr txBox="1">
+            <a:spLocks/>
+          </p:cNvSpPr>
+          <p:nvPr/>
+        </p:nvSpPr>
+        <p:spPr>
+          <a:xfrm>
+            <a:off x="6674491" y="2003525"/>
+            <a:ext cx="10515600" cy="4351338"/>
+          </a:xfrm>
+          <a:prstGeom prst="rect">
+            <a:avLst/>
+          </a:prstGeom>
+        </p:spPr>
+        <p:txBody>
+          <a:bodyPr vert="horz" lIns="91440" tIns="45720" rIns="91440" bIns="45720" rtlCol="0">
+            <a:normAutofit/>
+          </a:bodyPr>
+          <a:lstStyle>
+            <a:lvl1pPr marL="228600" indent="-228600" algn="l" defTabSz="914400" rtl="0" eaLnBrk="1" latinLnBrk="0" hangingPunct="1">
+              <a:lnSpc>
+                <a:spcPct val="90000"/>
+              </a:lnSpc>
+              <a:spcBef>
+                <a:spcPts val="1000"/>
+              </a:spcBef>
+              <a:buFont typeface="Arial" panose="020B0604020202020204" pitchFamily="34" charset="0"/>
+              <a:buChar char="•"/>
+              <a:defRPr sz="2800" kern="1200">
+                <a:solidFill>
+                  <a:schemeClr val="tx1"/>
+                </a:solidFill>
+                <a:latin typeface="+mn-lt"/>
+                <a:ea typeface="+mn-ea"/>
+                <a:cs typeface="+mn-cs"/>
+              </a:defRPr>
+            </a:lvl1pPr>
+            <a:lvl2pPr marL="685800" indent="-228600" algn="l" defTabSz="914400" rtl="0" eaLnBrk="1" latinLnBrk="0" hangingPunct="1">
+              <a:lnSpc>
+                <a:spcPct val="90000"/>
+              </a:lnSpc>
+              <a:spcBef>
+                <a:spcPts val="500"/>
+              </a:spcBef>
+              <a:buFont typeface="Arial" panose="020B0604020202020204" pitchFamily="34" charset="0"/>
+              <a:buChar char="•"/>
+              <a:defRPr sz="2400" kern="1200">
+                <a:solidFill>
+                  <a:schemeClr val="tx1"/>
+                </a:solidFill>
+                <a:latin typeface="+mn-lt"/>
+                <a:ea typeface="+mn-ea"/>
+                <a:cs typeface="+mn-cs"/>
+              </a:defRPr>
+            </a:lvl2pPr>
+            <a:lvl3pPr marL="1143000" indent="-228600" algn="l" defTabSz="914400" rtl="0" eaLnBrk="1" latinLnBrk="0" hangingPunct="1">
+              <a:lnSpc>
+                <a:spcPct val="90000"/>
+              </a:lnSpc>
+              <a:spcBef>
+                <a:spcPts val="500"/>
+              </a:spcBef>
+              <a:buFont typeface="Arial" panose="020B0604020202020204" pitchFamily="34" charset="0"/>
+              <a:buChar char="•"/>
+              <a:defRPr sz="2000" kern="1200">
+                <a:solidFill>
+                  <a:schemeClr val="tx1"/>
+                </a:solidFill>
+                <a:latin typeface="+mn-lt"/>
+                <a:ea typeface="+mn-ea"/>
+                <a:cs typeface="+mn-cs"/>
+              </a:defRPr>
+            </a:lvl3pPr>
+            <a:lvl4pPr marL="1600200" indent="-228600" algn="l" defTabSz="914400" rtl="0" eaLnBrk="1" latinLnBrk="0" hangingPunct="1">
+              <a:lnSpc>
+                <a:spcPct val="90000"/>
+              </a:lnSpc>
+              <a:spcBef>
+                <a:spcPts val="500"/>
+              </a:spcBef>
+              <a:buFont typeface="Arial" panose="020B0604020202020204" pitchFamily="34" charset="0"/>
+              <a:buChar char="•"/>
+              <a:defRPr sz="1800" kern="1200">
+                <a:solidFill>
+                  <a:schemeClr val="tx1"/>
+                </a:solidFill>
+                <a:latin typeface="+mn-lt"/>
+                <a:ea typeface="+mn-ea"/>
+                <a:cs typeface="+mn-cs"/>
+              </a:defRPr>
+            </a:lvl4pPr>
+            <a:lvl5pPr marL="2057400" indent="-228600" algn="l" defTabSz="914400" rtl="0" eaLnBrk="1" latinLnBrk="0" hangingPunct="1">
+              <a:lnSpc>
+                <a:spcPct val="90000"/>
+              </a:lnSpc>
+              <a:spcBef>
+                <a:spcPts val="500"/>
+              </a:spcBef>
+              <a:buFont typeface="Arial" panose="020B0604020202020204" pitchFamily="34" charset="0"/>
+              <a:buChar char="•"/>
+              <a:defRPr sz="1800" kern="1200">
+                <a:solidFill>
+                  <a:schemeClr val="tx1"/>
+                </a:solidFill>
+                <a:latin typeface="+mn-lt"/>
+                <a:ea typeface="+mn-ea"/>
+                <a:cs typeface="+mn-cs"/>
+              </a:defRPr>
+            </a:lvl5pPr>
+            <a:lvl6pPr marL="2514600" indent="-228600" algn="l" defTabSz="914400" rtl="0" eaLnBrk="1" latinLnBrk="0" hangingPunct="1">
+              <a:lnSpc>
+                <a:spcPct val="90000"/>
+              </a:lnSpc>
+              <a:spcBef>
+                <a:spcPts val="500"/>
+              </a:spcBef>
+              <a:buFont typeface="Arial" panose="020B0604020202020204" pitchFamily="34" charset="0"/>
+              <a:buChar char="•"/>
+              <a:defRPr sz="1800" kern="1200">
+                <a:solidFill>
+                  <a:schemeClr val="tx1"/>
+                </a:solidFill>
+                <a:latin typeface="+mn-lt"/>
+                <a:ea typeface="+mn-ea"/>
+                <a:cs typeface="+mn-cs"/>
+              </a:defRPr>
+            </a:lvl6pPr>
+            <a:lvl7pPr marL="2971800" indent="-228600" algn="l" defTabSz="914400" rtl="0" eaLnBrk="1" latinLnBrk="0" hangingPunct="1">
+              <a:lnSpc>
+                <a:spcPct val="90000"/>
+              </a:lnSpc>
+              <a:spcBef>
+                <a:spcPts val="500"/>
+              </a:spcBef>
+              <a:buFont typeface="Arial" panose="020B0604020202020204" pitchFamily="34" charset="0"/>
+              <a:buChar char="•"/>
+              <a:defRPr sz="1800" kern="1200">
+                <a:solidFill>
+                  <a:schemeClr val="tx1"/>
+                </a:solidFill>
+                <a:latin typeface="+mn-lt"/>
+                <a:ea typeface="+mn-ea"/>
+                <a:cs typeface="+mn-cs"/>
+              </a:defRPr>
+            </a:lvl7pPr>
+            <a:lvl8pPr marL="3429000" indent="-228600" algn="l" defTabSz="914400" rtl="0" eaLnBrk="1" latinLnBrk="0" hangingPunct="1">
+              <a:lnSpc>
+                <a:spcPct val="90000"/>
+              </a:lnSpc>
+              <a:spcBef>
+                <a:spcPts val="500"/>
+              </a:spcBef>
+              <a:buFont typeface="Arial" panose="020B0604020202020204" pitchFamily="34" charset="0"/>
+              <a:buChar char="•"/>
+              <a:defRPr sz="1800" kern="1200">
+                <a:solidFill>
+                  <a:schemeClr val="tx1"/>
+                </a:solidFill>
+                <a:latin typeface="+mn-lt"/>
+                <a:ea typeface="+mn-ea"/>
+                <a:cs typeface="+mn-cs"/>
+              </a:defRPr>
+            </a:lvl8pPr>
+            <a:lvl9pPr marL="3886200" indent="-228600" algn="l" defTabSz="914400" rtl="0" eaLnBrk="1" latinLnBrk="0" hangingPunct="1">
+              <a:lnSpc>
+                <a:spcPct val="90000"/>
+              </a:lnSpc>
+              <a:spcBef>
+                <a:spcPts val="500"/>
+              </a:spcBef>
+              <a:buFont typeface="Arial" panose="020B0604020202020204" pitchFamily="34" charset="0"/>
+              <a:buChar char="•"/>
+              <a:defRPr sz="1800" kern="1200">
+                <a:solidFill>
+                  <a:schemeClr val="tx1"/>
+                </a:solidFill>
+                <a:latin typeface="+mn-lt"/>
+                <a:ea typeface="+mn-ea"/>
+                <a:cs typeface="+mn-cs"/>
+              </a:defRPr>
+            </a:lvl9pPr>
+          </a:lstStyle>
+          <a:p>
+            <a:pPr marL="0" indent="0">
+              <a:buFont typeface="Arial" panose="020B0604020202020204" pitchFamily="34" charset="0"/>
+              <a:buNone/>
+            </a:pPr>
+            <a:r>
+              <a:rPr lang="en-GB" dirty="0"/>
+              <a:t>Previous:</a:t>
+            </a:r>
+          </a:p>
+        </p:txBody>
+      </p:sp>
+      <p:pic>
+        <p:nvPicPr>
+          <p:cNvPr id="9" name="Picture 8">
+            <a:extLst>
+              <a:ext uri="{FF2B5EF4-FFF2-40B4-BE49-F238E27FC236}">
+                <a16:creationId xmlns:a16="http://schemas.microsoft.com/office/drawing/2014/main" id="{4713BCE3-B0C9-4C27-B450-5432AA7521DB}"/>
+              </a:ext>
+            </a:extLst>
+          </p:cNvPr>
+          <p:cNvPicPr>
+            <a:picLocks noChangeAspect="1"/>
+          </p:cNvPicPr>
+          <p:nvPr/>
+        </p:nvPicPr>
+        <p:blipFill rotWithShape="1">
+          <a:blip r:embed="rId3"/>
+          <a:srcRect l="6111" t="6270" r="12107" b="3893"/>
+          <a:stretch/>
+        </p:blipFill>
+        <p:spPr>
+          <a:xfrm>
+            <a:off x="5387807" y="2594651"/>
+            <a:ext cx="3367249" cy="3662265"/>
+          </a:xfrm>
+          <a:prstGeom prst="rect">
+            <a:avLst/>
+          </a:prstGeom>
+        </p:spPr>
+      </p:pic>
+      <p:sp>
+        <p:nvSpPr>
+          <p:cNvPr id="12" name="Content Placeholder 2">
+            <a:extLst>
+              <a:ext uri="{FF2B5EF4-FFF2-40B4-BE49-F238E27FC236}">
+                <a16:creationId xmlns:a16="http://schemas.microsoft.com/office/drawing/2014/main" id="{630A16ED-9E99-417E-A262-E2D0BEDC9520}"/>
+              </a:ext>
+            </a:extLst>
+          </p:cNvPr>
+          <p:cNvSpPr txBox="1">
+            <a:spLocks/>
+          </p:cNvSpPr>
+          <p:nvPr/>
+        </p:nvSpPr>
+        <p:spPr>
+          <a:xfrm>
+            <a:off x="8962628" y="3383001"/>
+            <a:ext cx="2969663" cy="4653910"/>
+          </a:xfrm>
+          <a:prstGeom prst="rect">
+            <a:avLst/>
+          </a:prstGeom>
+        </p:spPr>
+        <p:txBody>
+          <a:bodyPr vert="horz" lIns="91440" tIns="45720" rIns="91440" bIns="45720" rtlCol="0">
+            <a:normAutofit/>
+          </a:bodyPr>
+          <a:lstStyle>
+            <a:lvl1pPr marL="228600" indent="-228600" algn="l" defTabSz="914400" rtl="0" eaLnBrk="1" latinLnBrk="0" hangingPunct="1">
+              <a:lnSpc>
+                <a:spcPct val="90000"/>
+              </a:lnSpc>
+              <a:spcBef>
+                <a:spcPts val="1000"/>
+              </a:spcBef>
+              <a:buFont typeface="Arial" panose="020B0604020202020204" pitchFamily="34" charset="0"/>
+              <a:buChar char="•"/>
+              <a:defRPr sz="2800" kern="1200">
+                <a:solidFill>
+                  <a:schemeClr val="tx1"/>
+                </a:solidFill>
+                <a:latin typeface="+mn-lt"/>
+                <a:ea typeface="+mn-ea"/>
+                <a:cs typeface="+mn-cs"/>
+              </a:defRPr>
+            </a:lvl1pPr>
+            <a:lvl2pPr marL="685800" indent="-228600" algn="l" defTabSz="914400" rtl="0" eaLnBrk="1" latinLnBrk="0" hangingPunct="1">
+              <a:lnSpc>
+                <a:spcPct val="90000"/>
+              </a:lnSpc>
+              <a:spcBef>
+                <a:spcPts val="500"/>
+              </a:spcBef>
+              <a:buFont typeface="Arial" panose="020B0604020202020204" pitchFamily="34" charset="0"/>
+              <a:buChar char="•"/>
+              <a:defRPr sz="2400" kern="1200">
+                <a:solidFill>
+                  <a:schemeClr val="tx1"/>
+                </a:solidFill>
+                <a:latin typeface="+mn-lt"/>
+                <a:ea typeface="+mn-ea"/>
+                <a:cs typeface="+mn-cs"/>
+              </a:defRPr>
+            </a:lvl2pPr>
+            <a:lvl3pPr marL="1143000" indent="-228600" algn="l" defTabSz="914400" rtl="0" eaLnBrk="1" latinLnBrk="0" hangingPunct="1">
+              <a:lnSpc>
+                <a:spcPct val="90000"/>
+              </a:lnSpc>
+              <a:spcBef>
+                <a:spcPts val="500"/>
+              </a:spcBef>
+              <a:buFont typeface="Arial" panose="020B0604020202020204" pitchFamily="34" charset="0"/>
+              <a:buChar char="•"/>
+              <a:defRPr sz="2000" kern="1200">
+                <a:solidFill>
+                  <a:schemeClr val="tx1"/>
+                </a:solidFill>
+                <a:latin typeface="+mn-lt"/>
+                <a:ea typeface="+mn-ea"/>
+                <a:cs typeface="+mn-cs"/>
+              </a:defRPr>
+            </a:lvl3pPr>
+            <a:lvl4pPr marL="1600200" indent="-228600" algn="l" defTabSz="914400" rtl="0" eaLnBrk="1" latinLnBrk="0" hangingPunct="1">
+              <a:lnSpc>
+                <a:spcPct val="90000"/>
+              </a:lnSpc>
+              <a:spcBef>
+                <a:spcPts val="500"/>
+              </a:spcBef>
+              <a:buFont typeface="Arial" panose="020B0604020202020204" pitchFamily="34" charset="0"/>
+              <a:buChar char="•"/>
+              <a:defRPr sz="1800" kern="1200">
+                <a:solidFill>
+                  <a:schemeClr val="tx1"/>
+                </a:solidFill>
+                <a:latin typeface="+mn-lt"/>
+                <a:ea typeface="+mn-ea"/>
+                <a:cs typeface="+mn-cs"/>
+              </a:defRPr>
+            </a:lvl4pPr>
+            <a:lvl5pPr marL="2057400" indent="-228600" algn="l" defTabSz="914400" rtl="0" eaLnBrk="1" latinLnBrk="0" hangingPunct="1">
+              <a:lnSpc>
+                <a:spcPct val="90000"/>
+              </a:lnSpc>
+              <a:spcBef>
+                <a:spcPts val="500"/>
+              </a:spcBef>
+              <a:buFont typeface="Arial" panose="020B0604020202020204" pitchFamily="34" charset="0"/>
+              <a:buChar char="•"/>
+              <a:defRPr sz="1800" kern="1200">
+                <a:solidFill>
+                  <a:schemeClr val="tx1"/>
+                </a:solidFill>
+                <a:latin typeface="+mn-lt"/>
+                <a:ea typeface="+mn-ea"/>
+                <a:cs typeface="+mn-cs"/>
+              </a:defRPr>
+            </a:lvl5pPr>
+            <a:lvl6pPr marL="2514600" indent="-228600" algn="l" defTabSz="914400" rtl="0" eaLnBrk="1" latinLnBrk="0" hangingPunct="1">
+              <a:lnSpc>
+                <a:spcPct val="90000"/>
+              </a:lnSpc>
+              <a:spcBef>
+                <a:spcPts val="500"/>
+              </a:spcBef>
+              <a:buFont typeface="Arial" panose="020B0604020202020204" pitchFamily="34" charset="0"/>
+              <a:buChar char="•"/>
+              <a:defRPr sz="1800" kern="1200">
+                <a:solidFill>
+                  <a:schemeClr val="tx1"/>
+                </a:solidFill>
+                <a:latin typeface="+mn-lt"/>
+                <a:ea typeface="+mn-ea"/>
+                <a:cs typeface="+mn-cs"/>
+              </a:defRPr>
+            </a:lvl6pPr>
+            <a:lvl7pPr marL="2971800" indent="-228600" algn="l" defTabSz="914400" rtl="0" eaLnBrk="1" latinLnBrk="0" hangingPunct="1">
+              <a:lnSpc>
+                <a:spcPct val="90000"/>
+              </a:lnSpc>
+              <a:spcBef>
+                <a:spcPts val="500"/>
+              </a:spcBef>
+              <a:buFont typeface="Arial" panose="020B0604020202020204" pitchFamily="34" charset="0"/>
+              <a:buChar char="•"/>
+              <a:defRPr sz="1800" kern="1200">
+                <a:solidFill>
+                  <a:schemeClr val="tx1"/>
+                </a:solidFill>
+                <a:latin typeface="+mn-lt"/>
+                <a:ea typeface="+mn-ea"/>
+                <a:cs typeface="+mn-cs"/>
+              </a:defRPr>
+            </a:lvl7pPr>
+            <a:lvl8pPr marL="3429000" indent="-228600" algn="l" defTabSz="914400" rtl="0" eaLnBrk="1" latinLnBrk="0" hangingPunct="1">
+              <a:lnSpc>
+                <a:spcPct val="90000"/>
+              </a:lnSpc>
+              <a:spcBef>
+                <a:spcPts val="500"/>
+              </a:spcBef>
+              <a:buFont typeface="Arial" panose="020B0604020202020204" pitchFamily="34" charset="0"/>
+              <a:buChar char="•"/>
+              <a:defRPr sz="1800" kern="1200">
+                <a:solidFill>
+                  <a:schemeClr val="tx1"/>
+                </a:solidFill>
+                <a:latin typeface="+mn-lt"/>
+                <a:ea typeface="+mn-ea"/>
+                <a:cs typeface="+mn-cs"/>
+              </a:defRPr>
+            </a:lvl8pPr>
+            <a:lvl9pPr marL="3886200" indent="-228600" algn="l" defTabSz="914400" rtl="0" eaLnBrk="1" latinLnBrk="0" hangingPunct="1">
+              <a:lnSpc>
+                <a:spcPct val="90000"/>
+              </a:lnSpc>
+              <a:spcBef>
+                <a:spcPts val="500"/>
+              </a:spcBef>
+              <a:buFont typeface="Arial" panose="020B0604020202020204" pitchFamily="34" charset="0"/>
+              <a:buChar char="•"/>
+              <a:defRPr sz="1800" kern="1200">
+                <a:solidFill>
+                  <a:schemeClr val="tx1"/>
+                </a:solidFill>
+                <a:latin typeface="+mn-lt"/>
+                <a:ea typeface="+mn-ea"/>
+                <a:cs typeface="+mn-cs"/>
+              </a:defRPr>
+            </a:lvl9pPr>
+          </a:lstStyle>
+          <a:p>
+            <a:pPr marL="0" indent="0">
+              <a:buFont typeface="Arial" panose="020B0604020202020204" pitchFamily="34" charset="0"/>
+              <a:buNone/>
+            </a:pPr>
+            <a:r>
+              <a:rPr lang="en-GB" dirty="0"/>
+              <a:t>Very similar results, but slope is different</a:t>
+            </a:r>
+            <a:endParaRPr lang="en-GB" dirty="0">
+              <a:sym typeface="Wingdings" panose="05000000000000000000" pitchFamily="2" charset="2"/>
+            </a:endParaRPr>
+          </a:p>
+        </p:txBody>
+      </p:sp>
+      <p:pic>
+        <p:nvPicPr>
+          <p:cNvPr id="16" name="Picture 15">
+            <a:extLst>
+              <a:ext uri="{FF2B5EF4-FFF2-40B4-BE49-F238E27FC236}">
+                <a16:creationId xmlns:a16="http://schemas.microsoft.com/office/drawing/2014/main" id="{F5829E4F-B0E4-455E-BD25-767957C00B46}"/>
+              </a:ext>
+            </a:extLst>
+          </p:cNvPr>
+          <p:cNvPicPr>
+            <a:picLocks noChangeAspect="1"/>
+          </p:cNvPicPr>
+          <p:nvPr/>
+        </p:nvPicPr>
+        <p:blipFill>
+          <a:blip r:embed="rId4"/>
+          <a:stretch>
+            <a:fillRect/>
+          </a:stretch>
+        </p:blipFill>
+        <p:spPr>
+          <a:xfrm>
+            <a:off x="1330738" y="2468189"/>
+            <a:ext cx="3293129" cy="3438201"/>
+          </a:xfrm>
+          <a:prstGeom prst="rect">
+            <a:avLst/>
+          </a:prstGeom>
+        </p:spPr>
+      </p:pic>
+    </p:spTree>
+    <p:extLst>
+      <p:ext uri="{BB962C8B-B14F-4D97-AF65-F5344CB8AC3E}">
+        <p14:creationId xmlns:p14="http://schemas.microsoft.com/office/powerpoint/2010/main" val="1657885019"/>
+      </p:ext>
+    </p:extLst>
+  </p:cSld>
+  <p:clrMapOvr>
+    <a:masterClrMapping/>
+  </p:clrMapOvr>
+</p:sld>
+</file>
+
+<file path=ppt/slides/slide28.xml><?xml version="1.0" encoding="utf-8"?>
+<p:sld xmlns:a="http://schemas.openxmlformats.org/drawingml/2006/main" xmlns:r="http://schemas.openxmlformats.org/officeDocument/2006/relationships" xmlns:p="http://schemas.openxmlformats.org/presentationml/2006/main">
+  <p:cSld>
+    <p:spTree>
+      <p:nvGrpSpPr>
+        <p:cNvPr id="1" name=""/>
+        <p:cNvGrpSpPr/>
+        <p:nvPr/>
+      </p:nvGrpSpPr>
+      <p:grpSpPr>
+        <a:xfrm>
+          <a:off x="0" y="0"/>
+          <a:ext cx="0" cy="0"/>
+          <a:chOff x="0" y="0"/>
+          <a:chExt cx="0" cy="0"/>
+        </a:xfrm>
+      </p:grpSpPr>
+      <p:sp>
+        <p:nvSpPr>
+          <p:cNvPr id="2" name="Title 1">
+            <a:extLst>
+              <a:ext uri="{FF2B5EF4-FFF2-40B4-BE49-F238E27FC236}">
+                <a16:creationId xmlns:a16="http://schemas.microsoft.com/office/drawing/2014/main" id="{A741D544-D415-41E6-B036-413C8005A761}"/>
+              </a:ext>
+            </a:extLst>
+          </p:cNvPr>
+          <p:cNvSpPr>
+            <a:spLocks noGrp="1"/>
+          </p:cNvSpPr>
+          <p:nvPr>
+            <p:ph type="title"/>
+          </p:nvPr>
+        </p:nvSpPr>
+        <p:spPr>
+          <a:xfrm>
+            <a:off x="838200" y="175865"/>
+            <a:ext cx="10515600" cy="1325563"/>
+          </a:xfrm>
+        </p:spPr>
+        <p:txBody>
+          <a:bodyPr/>
+          <a:lstStyle/>
+          <a:p>
+            <a:r>
+              <a:rPr lang="en-GB" dirty="0"/>
+              <a:t>Further normalising</a:t>
+            </a:r>
+          </a:p>
+        </p:txBody>
+      </p:sp>
+      <p:sp>
+        <p:nvSpPr>
+          <p:cNvPr id="6" name="Content Placeholder 2">
+            <a:extLst>
+              <a:ext uri="{FF2B5EF4-FFF2-40B4-BE49-F238E27FC236}">
+                <a16:creationId xmlns:a16="http://schemas.microsoft.com/office/drawing/2014/main" id="{1D08C16A-EAAC-423D-A568-23EA6B4C0B12}"/>
+              </a:ext>
+            </a:extLst>
+          </p:cNvPr>
+          <p:cNvSpPr txBox="1">
+            <a:spLocks/>
+          </p:cNvSpPr>
+          <p:nvPr/>
+        </p:nvSpPr>
+        <p:spPr>
+          <a:xfrm>
+            <a:off x="955930" y="1142626"/>
+            <a:ext cx="10515600" cy="949928"/>
+          </a:xfrm>
+          <a:prstGeom prst="rect">
+            <a:avLst/>
+          </a:prstGeom>
+        </p:spPr>
+        <p:txBody>
+          <a:bodyPr vert="horz" lIns="91440" tIns="45720" rIns="91440" bIns="45720" rtlCol="0">
+            <a:normAutofit/>
+          </a:bodyPr>
+          <a:lstStyle>
+            <a:lvl1pPr marL="228600" indent="-228600" algn="l" defTabSz="914400" rtl="0" eaLnBrk="1" latinLnBrk="0" hangingPunct="1">
+              <a:lnSpc>
+                <a:spcPct val="90000"/>
+              </a:lnSpc>
+              <a:spcBef>
+                <a:spcPts val="1000"/>
+              </a:spcBef>
+              <a:buFont typeface="Arial" panose="020B0604020202020204" pitchFamily="34" charset="0"/>
+              <a:buChar char="•"/>
+              <a:defRPr sz="2800" kern="1200">
+                <a:solidFill>
+                  <a:schemeClr val="tx1"/>
+                </a:solidFill>
+                <a:latin typeface="+mn-lt"/>
+                <a:ea typeface="+mn-ea"/>
+                <a:cs typeface="+mn-cs"/>
+              </a:defRPr>
+            </a:lvl1pPr>
+            <a:lvl2pPr marL="685800" indent="-228600" algn="l" defTabSz="914400" rtl="0" eaLnBrk="1" latinLnBrk="0" hangingPunct="1">
+              <a:lnSpc>
+                <a:spcPct val="90000"/>
+              </a:lnSpc>
+              <a:spcBef>
+                <a:spcPts val="500"/>
+              </a:spcBef>
+              <a:buFont typeface="Arial" panose="020B0604020202020204" pitchFamily="34" charset="0"/>
+              <a:buChar char="•"/>
+              <a:defRPr sz="2400" kern="1200">
+                <a:solidFill>
+                  <a:schemeClr val="tx1"/>
+                </a:solidFill>
+                <a:latin typeface="+mn-lt"/>
+                <a:ea typeface="+mn-ea"/>
+                <a:cs typeface="+mn-cs"/>
+              </a:defRPr>
+            </a:lvl2pPr>
+            <a:lvl3pPr marL="1143000" indent="-228600" algn="l" defTabSz="914400" rtl="0" eaLnBrk="1" latinLnBrk="0" hangingPunct="1">
+              <a:lnSpc>
+                <a:spcPct val="90000"/>
+              </a:lnSpc>
+              <a:spcBef>
+                <a:spcPts val="500"/>
+              </a:spcBef>
+              <a:buFont typeface="Arial" panose="020B0604020202020204" pitchFamily="34" charset="0"/>
+              <a:buChar char="•"/>
+              <a:defRPr sz="2000" kern="1200">
+                <a:solidFill>
+                  <a:schemeClr val="tx1"/>
+                </a:solidFill>
+                <a:latin typeface="+mn-lt"/>
+                <a:ea typeface="+mn-ea"/>
+                <a:cs typeface="+mn-cs"/>
+              </a:defRPr>
+            </a:lvl3pPr>
+            <a:lvl4pPr marL="1600200" indent="-228600" algn="l" defTabSz="914400" rtl="0" eaLnBrk="1" latinLnBrk="0" hangingPunct="1">
+              <a:lnSpc>
+                <a:spcPct val="90000"/>
+              </a:lnSpc>
+              <a:spcBef>
+                <a:spcPts val="500"/>
+              </a:spcBef>
+              <a:buFont typeface="Arial" panose="020B0604020202020204" pitchFamily="34" charset="0"/>
+              <a:buChar char="•"/>
+              <a:defRPr sz="1800" kern="1200">
+                <a:solidFill>
+                  <a:schemeClr val="tx1"/>
+                </a:solidFill>
+                <a:latin typeface="+mn-lt"/>
+                <a:ea typeface="+mn-ea"/>
+                <a:cs typeface="+mn-cs"/>
+              </a:defRPr>
+            </a:lvl4pPr>
+            <a:lvl5pPr marL="2057400" indent="-228600" algn="l" defTabSz="914400" rtl="0" eaLnBrk="1" latinLnBrk="0" hangingPunct="1">
+              <a:lnSpc>
+                <a:spcPct val="90000"/>
+              </a:lnSpc>
+              <a:spcBef>
+                <a:spcPts val="500"/>
+              </a:spcBef>
+              <a:buFont typeface="Arial" panose="020B0604020202020204" pitchFamily="34" charset="0"/>
+              <a:buChar char="•"/>
+              <a:defRPr sz="1800" kern="1200">
+                <a:solidFill>
+                  <a:schemeClr val="tx1"/>
+                </a:solidFill>
+                <a:latin typeface="+mn-lt"/>
+                <a:ea typeface="+mn-ea"/>
+                <a:cs typeface="+mn-cs"/>
+              </a:defRPr>
+            </a:lvl5pPr>
+            <a:lvl6pPr marL="2514600" indent="-228600" algn="l" defTabSz="914400" rtl="0" eaLnBrk="1" latinLnBrk="0" hangingPunct="1">
+              <a:lnSpc>
+                <a:spcPct val="90000"/>
+              </a:lnSpc>
+              <a:spcBef>
+                <a:spcPts val="500"/>
+              </a:spcBef>
+              <a:buFont typeface="Arial" panose="020B0604020202020204" pitchFamily="34" charset="0"/>
+              <a:buChar char="•"/>
+              <a:defRPr sz="1800" kern="1200">
+                <a:solidFill>
+                  <a:schemeClr val="tx1"/>
+                </a:solidFill>
+                <a:latin typeface="+mn-lt"/>
+                <a:ea typeface="+mn-ea"/>
+                <a:cs typeface="+mn-cs"/>
+              </a:defRPr>
+            </a:lvl6pPr>
+            <a:lvl7pPr marL="2971800" indent="-228600" algn="l" defTabSz="914400" rtl="0" eaLnBrk="1" latinLnBrk="0" hangingPunct="1">
+              <a:lnSpc>
+                <a:spcPct val="90000"/>
+              </a:lnSpc>
+              <a:spcBef>
+                <a:spcPts val="500"/>
+              </a:spcBef>
+              <a:buFont typeface="Arial" panose="020B0604020202020204" pitchFamily="34" charset="0"/>
+              <a:buChar char="•"/>
+              <a:defRPr sz="1800" kern="1200">
+                <a:solidFill>
+                  <a:schemeClr val="tx1"/>
+                </a:solidFill>
+                <a:latin typeface="+mn-lt"/>
+                <a:ea typeface="+mn-ea"/>
+                <a:cs typeface="+mn-cs"/>
+              </a:defRPr>
+            </a:lvl7pPr>
+            <a:lvl8pPr marL="3429000" indent="-228600" algn="l" defTabSz="914400" rtl="0" eaLnBrk="1" latinLnBrk="0" hangingPunct="1">
+              <a:lnSpc>
+                <a:spcPct val="90000"/>
+              </a:lnSpc>
+              <a:spcBef>
+                <a:spcPts val="500"/>
+              </a:spcBef>
+              <a:buFont typeface="Arial" panose="020B0604020202020204" pitchFamily="34" charset="0"/>
+              <a:buChar char="•"/>
+              <a:defRPr sz="1800" kern="1200">
+                <a:solidFill>
+                  <a:schemeClr val="tx1"/>
+                </a:solidFill>
+                <a:latin typeface="+mn-lt"/>
+                <a:ea typeface="+mn-ea"/>
+                <a:cs typeface="+mn-cs"/>
+              </a:defRPr>
+            </a:lvl8pPr>
+            <a:lvl9pPr marL="3886200" indent="-228600" algn="l" defTabSz="914400" rtl="0" eaLnBrk="1" latinLnBrk="0" hangingPunct="1">
+              <a:lnSpc>
+                <a:spcPct val="90000"/>
+              </a:lnSpc>
+              <a:spcBef>
+                <a:spcPts val="500"/>
+              </a:spcBef>
+              <a:buFont typeface="Arial" panose="020B0604020202020204" pitchFamily="34" charset="0"/>
+              <a:buChar char="•"/>
+              <a:defRPr sz="1800" kern="1200">
+                <a:solidFill>
+                  <a:schemeClr val="tx1"/>
+                </a:solidFill>
+                <a:latin typeface="+mn-lt"/>
+                <a:ea typeface="+mn-ea"/>
+                <a:cs typeface="+mn-cs"/>
+              </a:defRPr>
+            </a:lvl9pPr>
+          </a:lstStyle>
+          <a:p>
+            <a:r>
+              <a:rPr lang="en-GB" dirty="0"/>
+              <a:t>If c is 1 (which doesn’t appear in last year’s code):</a:t>
+            </a:r>
+          </a:p>
+          <a:p>
+            <a:endParaRPr lang="en-GB" dirty="0"/>
+          </a:p>
+          <a:p>
+            <a:pPr marL="0" indent="0">
+              <a:buFont typeface="Arial" panose="020B0604020202020204" pitchFamily="34" charset="0"/>
+              <a:buNone/>
+            </a:pPr>
+            <a:endParaRPr lang="en-GB" dirty="0"/>
+          </a:p>
+        </p:txBody>
+      </p:sp>
+      <p:sp>
+        <p:nvSpPr>
+          <p:cNvPr id="7" name="Content Placeholder 2">
+            <a:extLst>
+              <a:ext uri="{FF2B5EF4-FFF2-40B4-BE49-F238E27FC236}">
+                <a16:creationId xmlns:a16="http://schemas.microsoft.com/office/drawing/2014/main" id="{0AA034EA-24B4-4EFF-BD3F-7481F1F7AEF3}"/>
+              </a:ext>
+            </a:extLst>
+          </p:cNvPr>
+          <p:cNvSpPr txBox="1">
+            <a:spLocks/>
+          </p:cNvSpPr>
+          <p:nvPr/>
+        </p:nvSpPr>
+        <p:spPr>
+          <a:xfrm>
+            <a:off x="955930" y="1905578"/>
+            <a:ext cx="10515600" cy="4351338"/>
+          </a:xfrm>
+          <a:prstGeom prst="rect">
+            <a:avLst/>
+          </a:prstGeom>
+        </p:spPr>
+        <p:txBody>
+          <a:bodyPr vert="horz" lIns="91440" tIns="45720" rIns="91440" bIns="45720" rtlCol="0">
+            <a:normAutofit/>
+          </a:bodyPr>
+          <a:lstStyle>
+            <a:lvl1pPr marL="228600" indent="-228600" algn="l" defTabSz="914400" rtl="0" eaLnBrk="1" latinLnBrk="0" hangingPunct="1">
+              <a:lnSpc>
+                <a:spcPct val="90000"/>
+              </a:lnSpc>
+              <a:spcBef>
+                <a:spcPts val="1000"/>
+              </a:spcBef>
+              <a:buFont typeface="Arial" panose="020B0604020202020204" pitchFamily="34" charset="0"/>
+              <a:buChar char="•"/>
+              <a:defRPr sz="2800" kern="1200">
+                <a:solidFill>
+                  <a:schemeClr val="tx1"/>
+                </a:solidFill>
+                <a:latin typeface="+mn-lt"/>
+                <a:ea typeface="+mn-ea"/>
+                <a:cs typeface="+mn-cs"/>
+              </a:defRPr>
+            </a:lvl1pPr>
+            <a:lvl2pPr marL="685800" indent="-228600" algn="l" defTabSz="914400" rtl="0" eaLnBrk="1" latinLnBrk="0" hangingPunct="1">
+              <a:lnSpc>
+                <a:spcPct val="90000"/>
+              </a:lnSpc>
+              <a:spcBef>
+                <a:spcPts val="500"/>
+              </a:spcBef>
+              <a:buFont typeface="Arial" panose="020B0604020202020204" pitchFamily="34" charset="0"/>
+              <a:buChar char="•"/>
+              <a:defRPr sz="2400" kern="1200">
+                <a:solidFill>
+                  <a:schemeClr val="tx1"/>
+                </a:solidFill>
+                <a:latin typeface="+mn-lt"/>
+                <a:ea typeface="+mn-ea"/>
+                <a:cs typeface="+mn-cs"/>
+              </a:defRPr>
+            </a:lvl2pPr>
+            <a:lvl3pPr marL="1143000" indent="-228600" algn="l" defTabSz="914400" rtl="0" eaLnBrk="1" latinLnBrk="0" hangingPunct="1">
+              <a:lnSpc>
+                <a:spcPct val="90000"/>
+              </a:lnSpc>
+              <a:spcBef>
+                <a:spcPts val="500"/>
+              </a:spcBef>
+              <a:buFont typeface="Arial" panose="020B0604020202020204" pitchFamily="34" charset="0"/>
+              <a:buChar char="•"/>
+              <a:defRPr sz="2000" kern="1200">
+                <a:solidFill>
+                  <a:schemeClr val="tx1"/>
+                </a:solidFill>
+                <a:latin typeface="+mn-lt"/>
+                <a:ea typeface="+mn-ea"/>
+                <a:cs typeface="+mn-cs"/>
+              </a:defRPr>
+            </a:lvl3pPr>
+            <a:lvl4pPr marL="1600200" indent="-228600" algn="l" defTabSz="914400" rtl="0" eaLnBrk="1" latinLnBrk="0" hangingPunct="1">
+              <a:lnSpc>
+                <a:spcPct val="90000"/>
+              </a:lnSpc>
+              <a:spcBef>
+                <a:spcPts val="500"/>
+              </a:spcBef>
+              <a:buFont typeface="Arial" panose="020B0604020202020204" pitchFamily="34" charset="0"/>
+              <a:buChar char="•"/>
+              <a:defRPr sz="1800" kern="1200">
+                <a:solidFill>
+                  <a:schemeClr val="tx1"/>
+                </a:solidFill>
+                <a:latin typeface="+mn-lt"/>
+                <a:ea typeface="+mn-ea"/>
+                <a:cs typeface="+mn-cs"/>
+              </a:defRPr>
+            </a:lvl4pPr>
+            <a:lvl5pPr marL="2057400" indent="-228600" algn="l" defTabSz="914400" rtl="0" eaLnBrk="1" latinLnBrk="0" hangingPunct="1">
+              <a:lnSpc>
+                <a:spcPct val="90000"/>
+              </a:lnSpc>
+              <a:spcBef>
+                <a:spcPts val="500"/>
+              </a:spcBef>
+              <a:buFont typeface="Arial" panose="020B0604020202020204" pitchFamily="34" charset="0"/>
+              <a:buChar char="•"/>
+              <a:defRPr sz="1800" kern="1200">
+                <a:solidFill>
+                  <a:schemeClr val="tx1"/>
+                </a:solidFill>
+                <a:latin typeface="+mn-lt"/>
+                <a:ea typeface="+mn-ea"/>
+                <a:cs typeface="+mn-cs"/>
+              </a:defRPr>
+            </a:lvl5pPr>
+            <a:lvl6pPr marL="2514600" indent="-228600" algn="l" defTabSz="914400" rtl="0" eaLnBrk="1" latinLnBrk="0" hangingPunct="1">
+              <a:lnSpc>
+                <a:spcPct val="90000"/>
+              </a:lnSpc>
+              <a:spcBef>
+                <a:spcPts val="500"/>
+              </a:spcBef>
+              <a:buFont typeface="Arial" panose="020B0604020202020204" pitchFamily="34" charset="0"/>
+              <a:buChar char="•"/>
+              <a:defRPr sz="1800" kern="1200">
+                <a:solidFill>
+                  <a:schemeClr val="tx1"/>
+                </a:solidFill>
+                <a:latin typeface="+mn-lt"/>
+                <a:ea typeface="+mn-ea"/>
+                <a:cs typeface="+mn-cs"/>
+              </a:defRPr>
+            </a:lvl6pPr>
+            <a:lvl7pPr marL="2971800" indent="-228600" algn="l" defTabSz="914400" rtl="0" eaLnBrk="1" latinLnBrk="0" hangingPunct="1">
+              <a:lnSpc>
+                <a:spcPct val="90000"/>
+              </a:lnSpc>
+              <a:spcBef>
+                <a:spcPts val="500"/>
+              </a:spcBef>
+              <a:buFont typeface="Arial" panose="020B0604020202020204" pitchFamily="34" charset="0"/>
+              <a:buChar char="•"/>
+              <a:defRPr sz="1800" kern="1200">
+                <a:solidFill>
+                  <a:schemeClr val="tx1"/>
+                </a:solidFill>
+                <a:latin typeface="+mn-lt"/>
+                <a:ea typeface="+mn-ea"/>
+                <a:cs typeface="+mn-cs"/>
+              </a:defRPr>
+            </a:lvl7pPr>
+            <a:lvl8pPr marL="3429000" indent="-228600" algn="l" defTabSz="914400" rtl="0" eaLnBrk="1" latinLnBrk="0" hangingPunct="1">
+              <a:lnSpc>
+                <a:spcPct val="90000"/>
+              </a:lnSpc>
+              <a:spcBef>
+                <a:spcPts val="500"/>
+              </a:spcBef>
+              <a:buFont typeface="Arial" panose="020B0604020202020204" pitchFamily="34" charset="0"/>
+              <a:buChar char="•"/>
+              <a:defRPr sz="1800" kern="1200">
+                <a:solidFill>
+                  <a:schemeClr val="tx1"/>
+                </a:solidFill>
+                <a:latin typeface="+mn-lt"/>
+                <a:ea typeface="+mn-ea"/>
+                <a:cs typeface="+mn-cs"/>
+              </a:defRPr>
+            </a:lvl8pPr>
+            <a:lvl9pPr marL="3886200" indent="-228600" algn="l" defTabSz="914400" rtl="0" eaLnBrk="1" latinLnBrk="0" hangingPunct="1">
+              <a:lnSpc>
+                <a:spcPct val="90000"/>
+              </a:lnSpc>
+              <a:spcBef>
+                <a:spcPts val="500"/>
+              </a:spcBef>
+              <a:buFont typeface="Arial" panose="020B0604020202020204" pitchFamily="34" charset="0"/>
+              <a:buChar char="•"/>
+              <a:defRPr sz="1800" kern="1200">
+                <a:solidFill>
+                  <a:schemeClr val="tx1"/>
+                </a:solidFill>
+                <a:latin typeface="+mn-lt"/>
+                <a:ea typeface="+mn-ea"/>
+                <a:cs typeface="+mn-cs"/>
+              </a:defRPr>
+            </a:lvl9pPr>
+          </a:lstStyle>
+          <a:p>
+            <a:pPr marL="0" indent="0">
+              <a:buFont typeface="Arial" panose="020B0604020202020204" pitchFamily="34" charset="0"/>
+              <a:buNone/>
+            </a:pPr>
+            <a:r>
+              <a:rPr lang="en-GB" dirty="0"/>
+              <a:t>Mine:</a:t>
+            </a:r>
+          </a:p>
+        </p:txBody>
+      </p:sp>
+      <p:sp>
+        <p:nvSpPr>
+          <p:cNvPr id="8" name="Content Placeholder 2">
+            <a:extLst>
+              <a:ext uri="{FF2B5EF4-FFF2-40B4-BE49-F238E27FC236}">
+                <a16:creationId xmlns:a16="http://schemas.microsoft.com/office/drawing/2014/main" id="{C1F9D259-0E23-4C4A-BBE8-443623566E83}"/>
+              </a:ext>
+            </a:extLst>
+          </p:cNvPr>
+          <p:cNvSpPr txBox="1">
+            <a:spLocks/>
+          </p:cNvSpPr>
+          <p:nvPr/>
+        </p:nvSpPr>
+        <p:spPr>
+          <a:xfrm>
+            <a:off x="6674491" y="2003525"/>
+            <a:ext cx="10515600" cy="4351338"/>
+          </a:xfrm>
+          <a:prstGeom prst="rect">
+            <a:avLst/>
+          </a:prstGeom>
+        </p:spPr>
+        <p:txBody>
+          <a:bodyPr vert="horz" lIns="91440" tIns="45720" rIns="91440" bIns="45720" rtlCol="0">
+            <a:normAutofit/>
+          </a:bodyPr>
+          <a:lstStyle>
+            <a:lvl1pPr marL="228600" indent="-228600" algn="l" defTabSz="914400" rtl="0" eaLnBrk="1" latinLnBrk="0" hangingPunct="1">
+              <a:lnSpc>
+                <a:spcPct val="90000"/>
+              </a:lnSpc>
+              <a:spcBef>
+                <a:spcPts val="1000"/>
+              </a:spcBef>
+              <a:buFont typeface="Arial" panose="020B0604020202020204" pitchFamily="34" charset="0"/>
+              <a:buChar char="•"/>
+              <a:defRPr sz="2800" kern="1200">
+                <a:solidFill>
+                  <a:schemeClr val="tx1"/>
+                </a:solidFill>
+                <a:latin typeface="+mn-lt"/>
+                <a:ea typeface="+mn-ea"/>
+                <a:cs typeface="+mn-cs"/>
+              </a:defRPr>
+            </a:lvl1pPr>
+            <a:lvl2pPr marL="685800" indent="-228600" algn="l" defTabSz="914400" rtl="0" eaLnBrk="1" latinLnBrk="0" hangingPunct="1">
+              <a:lnSpc>
+                <a:spcPct val="90000"/>
+              </a:lnSpc>
+              <a:spcBef>
+                <a:spcPts val="500"/>
+              </a:spcBef>
+              <a:buFont typeface="Arial" panose="020B0604020202020204" pitchFamily="34" charset="0"/>
+              <a:buChar char="•"/>
+              <a:defRPr sz="2400" kern="1200">
+                <a:solidFill>
+                  <a:schemeClr val="tx1"/>
+                </a:solidFill>
+                <a:latin typeface="+mn-lt"/>
+                <a:ea typeface="+mn-ea"/>
+                <a:cs typeface="+mn-cs"/>
+              </a:defRPr>
+            </a:lvl2pPr>
+            <a:lvl3pPr marL="1143000" indent="-228600" algn="l" defTabSz="914400" rtl="0" eaLnBrk="1" latinLnBrk="0" hangingPunct="1">
+              <a:lnSpc>
+                <a:spcPct val="90000"/>
+              </a:lnSpc>
+              <a:spcBef>
+                <a:spcPts val="500"/>
+              </a:spcBef>
+              <a:buFont typeface="Arial" panose="020B0604020202020204" pitchFamily="34" charset="0"/>
+              <a:buChar char="•"/>
+              <a:defRPr sz="2000" kern="1200">
+                <a:solidFill>
+                  <a:schemeClr val="tx1"/>
+                </a:solidFill>
+                <a:latin typeface="+mn-lt"/>
+                <a:ea typeface="+mn-ea"/>
+                <a:cs typeface="+mn-cs"/>
+              </a:defRPr>
+            </a:lvl3pPr>
+            <a:lvl4pPr marL="1600200" indent="-228600" algn="l" defTabSz="914400" rtl="0" eaLnBrk="1" latinLnBrk="0" hangingPunct="1">
+              <a:lnSpc>
+                <a:spcPct val="90000"/>
+              </a:lnSpc>
+              <a:spcBef>
+                <a:spcPts val="500"/>
+              </a:spcBef>
+              <a:buFont typeface="Arial" panose="020B0604020202020204" pitchFamily="34" charset="0"/>
+              <a:buChar char="•"/>
+              <a:defRPr sz="1800" kern="1200">
+                <a:solidFill>
+                  <a:schemeClr val="tx1"/>
+                </a:solidFill>
+                <a:latin typeface="+mn-lt"/>
+                <a:ea typeface="+mn-ea"/>
+                <a:cs typeface="+mn-cs"/>
+              </a:defRPr>
+            </a:lvl4pPr>
+            <a:lvl5pPr marL="2057400" indent="-228600" algn="l" defTabSz="914400" rtl="0" eaLnBrk="1" latinLnBrk="0" hangingPunct="1">
+              <a:lnSpc>
+                <a:spcPct val="90000"/>
+              </a:lnSpc>
+              <a:spcBef>
+                <a:spcPts val="500"/>
+              </a:spcBef>
+              <a:buFont typeface="Arial" panose="020B0604020202020204" pitchFamily="34" charset="0"/>
+              <a:buChar char="•"/>
+              <a:defRPr sz="1800" kern="1200">
+                <a:solidFill>
+                  <a:schemeClr val="tx1"/>
+                </a:solidFill>
+                <a:latin typeface="+mn-lt"/>
+                <a:ea typeface="+mn-ea"/>
+                <a:cs typeface="+mn-cs"/>
+              </a:defRPr>
+            </a:lvl5pPr>
+            <a:lvl6pPr marL="2514600" indent="-228600" algn="l" defTabSz="914400" rtl="0" eaLnBrk="1" latinLnBrk="0" hangingPunct="1">
+              <a:lnSpc>
+                <a:spcPct val="90000"/>
+              </a:lnSpc>
+              <a:spcBef>
+                <a:spcPts val="500"/>
+              </a:spcBef>
+              <a:buFont typeface="Arial" panose="020B0604020202020204" pitchFamily="34" charset="0"/>
+              <a:buChar char="•"/>
+              <a:defRPr sz="1800" kern="1200">
+                <a:solidFill>
+                  <a:schemeClr val="tx1"/>
+                </a:solidFill>
+                <a:latin typeface="+mn-lt"/>
+                <a:ea typeface="+mn-ea"/>
+                <a:cs typeface="+mn-cs"/>
+              </a:defRPr>
+            </a:lvl6pPr>
+            <a:lvl7pPr marL="2971800" indent="-228600" algn="l" defTabSz="914400" rtl="0" eaLnBrk="1" latinLnBrk="0" hangingPunct="1">
+              <a:lnSpc>
+                <a:spcPct val="90000"/>
+              </a:lnSpc>
+              <a:spcBef>
+                <a:spcPts val="500"/>
+              </a:spcBef>
+              <a:buFont typeface="Arial" panose="020B0604020202020204" pitchFamily="34" charset="0"/>
+              <a:buChar char="•"/>
+              <a:defRPr sz="1800" kern="1200">
+                <a:solidFill>
+                  <a:schemeClr val="tx1"/>
+                </a:solidFill>
+                <a:latin typeface="+mn-lt"/>
+                <a:ea typeface="+mn-ea"/>
+                <a:cs typeface="+mn-cs"/>
+              </a:defRPr>
+            </a:lvl7pPr>
+            <a:lvl8pPr marL="3429000" indent="-228600" algn="l" defTabSz="914400" rtl="0" eaLnBrk="1" latinLnBrk="0" hangingPunct="1">
+              <a:lnSpc>
+                <a:spcPct val="90000"/>
+              </a:lnSpc>
+              <a:spcBef>
+                <a:spcPts val="500"/>
+              </a:spcBef>
+              <a:buFont typeface="Arial" panose="020B0604020202020204" pitchFamily="34" charset="0"/>
+              <a:buChar char="•"/>
+              <a:defRPr sz="1800" kern="1200">
+                <a:solidFill>
+                  <a:schemeClr val="tx1"/>
+                </a:solidFill>
+                <a:latin typeface="+mn-lt"/>
+                <a:ea typeface="+mn-ea"/>
+                <a:cs typeface="+mn-cs"/>
+              </a:defRPr>
+            </a:lvl8pPr>
+            <a:lvl9pPr marL="3886200" indent="-228600" algn="l" defTabSz="914400" rtl="0" eaLnBrk="1" latinLnBrk="0" hangingPunct="1">
+              <a:lnSpc>
+                <a:spcPct val="90000"/>
+              </a:lnSpc>
+              <a:spcBef>
+                <a:spcPts val="500"/>
+              </a:spcBef>
+              <a:buFont typeface="Arial" panose="020B0604020202020204" pitchFamily="34" charset="0"/>
+              <a:buChar char="•"/>
+              <a:defRPr sz="1800" kern="1200">
+                <a:solidFill>
+                  <a:schemeClr val="tx1"/>
+                </a:solidFill>
+                <a:latin typeface="+mn-lt"/>
+                <a:ea typeface="+mn-ea"/>
+                <a:cs typeface="+mn-cs"/>
+              </a:defRPr>
+            </a:lvl9pPr>
+          </a:lstStyle>
+          <a:p>
+            <a:pPr marL="0" indent="0">
+              <a:buFont typeface="Arial" panose="020B0604020202020204" pitchFamily="34" charset="0"/>
+              <a:buNone/>
+            </a:pPr>
+            <a:r>
+              <a:rPr lang="en-GB" dirty="0"/>
+              <a:t>Previous:</a:t>
+            </a:r>
+          </a:p>
+        </p:txBody>
+      </p:sp>
+      <p:pic>
+        <p:nvPicPr>
+          <p:cNvPr id="9" name="Picture 8">
+            <a:extLst>
+              <a:ext uri="{FF2B5EF4-FFF2-40B4-BE49-F238E27FC236}">
+                <a16:creationId xmlns:a16="http://schemas.microsoft.com/office/drawing/2014/main" id="{4713BCE3-B0C9-4C27-B450-5432AA7521DB}"/>
+              </a:ext>
+            </a:extLst>
+          </p:cNvPr>
+          <p:cNvPicPr>
+            <a:picLocks noChangeAspect="1"/>
+          </p:cNvPicPr>
+          <p:nvPr/>
+        </p:nvPicPr>
+        <p:blipFill rotWithShape="1">
+          <a:blip r:embed="rId2"/>
+          <a:srcRect l="6111" t="6270" r="12107" b="3893"/>
+          <a:stretch/>
+        </p:blipFill>
+        <p:spPr>
+          <a:xfrm>
+            <a:off x="5387807" y="2594651"/>
+            <a:ext cx="3367249" cy="3662265"/>
+          </a:xfrm>
+          <a:prstGeom prst="rect">
+            <a:avLst/>
+          </a:prstGeom>
+        </p:spPr>
+      </p:pic>
+      <p:sp>
+        <p:nvSpPr>
+          <p:cNvPr id="12" name="Content Placeholder 2">
+            <a:extLst>
+              <a:ext uri="{FF2B5EF4-FFF2-40B4-BE49-F238E27FC236}">
+                <a16:creationId xmlns:a16="http://schemas.microsoft.com/office/drawing/2014/main" id="{630A16ED-9E99-417E-A262-E2D0BEDC9520}"/>
+              </a:ext>
+            </a:extLst>
+          </p:cNvPr>
+          <p:cNvSpPr txBox="1">
+            <a:spLocks/>
+          </p:cNvSpPr>
+          <p:nvPr/>
+        </p:nvSpPr>
+        <p:spPr>
+          <a:xfrm>
+            <a:off x="8962628" y="3383001"/>
+            <a:ext cx="2969663" cy="4653910"/>
+          </a:xfrm>
+          <a:prstGeom prst="rect">
+            <a:avLst/>
+          </a:prstGeom>
+        </p:spPr>
+        <p:txBody>
+          <a:bodyPr vert="horz" lIns="91440" tIns="45720" rIns="91440" bIns="45720" rtlCol="0">
+            <a:normAutofit/>
+          </a:bodyPr>
+          <a:lstStyle>
+            <a:lvl1pPr marL="228600" indent="-228600" algn="l" defTabSz="914400" rtl="0" eaLnBrk="1" latinLnBrk="0" hangingPunct="1">
+              <a:lnSpc>
+                <a:spcPct val="90000"/>
+              </a:lnSpc>
+              <a:spcBef>
+                <a:spcPts val="1000"/>
+              </a:spcBef>
+              <a:buFont typeface="Arial" panose="020B0604020202020204" pitchFamily="34" charset="0"/>
+              <a:buChar char="•"/>
+              <a:defRPr sz="2800" kern="1200">
+                <a:solidFill>
+                  <a:schemeClr val="tx1"/>
+                </a:solidFill>
+                <a:latin typeface="+mn-lt"/>
+                <a:ea typeface="+mn-ea"/>
+                <a:cs typeface="+mn-cs"/>
+              </a:defRPr>
+            </a:lvl1pPr>
+            <a:lvl2pPr marL="685800" indent="-228600" algn="l" defTabSz="914400" rtl="0" eaLnBrk="1" latinLnBrk="0" hangingPunct="1">
+              <a:lnSpc>
+                <a:spcPct val="90000"/>
+              </a:lnSpc>
+              <a:spcBef>
+                <a:spcPts val="500"/>
+              </a:spcBef>
+              <a:buFont typeface="Arial" panose="020B0604020202020204" pitchFamily="34" charset="0"/>
+              <a:buChar char="•"/>
+              <a:defRPr sz="2400" kern="1200">
+                <a:solidFill>
+                  <a:schemeClr val="tx1"/>
+                </a:solidFill>
+                <a:latin typeface="+mn-lt"/>
+                <a:ea typeface="+mn-ea"/>
+                <a:cs typeface="+mn-cs"/>
+              </a:defRPr>
+            </a:lvl2pPr>
+            <a:lvl3pPr marL="1143000" indent="-228600" algn="l" defTabSz="914400" rtl="0" eaLnBrk="1" latinLnBrk="0" hangingPunct="1">
+              <a:lnSpc>
+                <a:spcPct val="90000"/>
+              </a:lnSpc>
+              <a:spcBef>
+                <a:spcPts val="500"/>
+              </a:spcBef>
+              <a:buFont typeface="Arial" panose="020B0604020202020204" pitchFamily="34" charset="0"/>
+              <a:buChar char="•"/>
+              <a:defRPr sz="2000" kern="1200">
+                <a:solidFill>
+                  <a:schemeClr val="tx1"/>
+                </a:solidFill>
+                <a:latin typeface="+mn-lt"/>
+                <a:ea typeface="+mn-ea"/>
+                <a:cs typeface="+mn-cs"/>
+              </a:defRPr>
+            </a:lvl3pPr>
+            <a:lvl4pPr marL="1600200" indent="-228600" algn="l" defTabSz="914400" rtl="0" eaLnBrk="1" latinLnBrk="0" hangingPunct="1">
+              <a:lnSpc>
+                <a:spcPct val="90000"/>
+              </a:lnSpc>
+              <a:spcBef>
+                <a:spcPts val="500"/>
+              </a:spcBef>
+              <a:buFont typeface="Arial" panose="020B0604020202020204" pitchFamily="34" charset="0"/>
+              <a:buChar char="•"/>
+              <a:defRPr sz="1800" kern="1200">
+                <a:solidFill>
+                  <a:schemeClr val="tx1"/>
+                </a:solidFill>
+                <a:latin typeface="+mn-lt"/>
+                <a:ea typeface="+mn-ea"/>
+                <a:cs typeface="+mn-cs"/>
+              </a:defRPr>
+            </a:lvl4pPr>
+            <a:lvl5pPr marL="2057400" indent="-228600" algn="l" defTabSz="914400" rtl="0" eaLnBrk="1" latinLnBrk="0" hangingPunct="1">
+              <a:lnSpc>
+                <a:spcPct val="90000"/>
+              </a:lnSpc>
+              <a:spcBef>
+                <a:spcPts val="500"/>
+              </a:spcBef>
+              <a:buFont typeface="Arial" panose="020B0604020202020204" pitchFamily="34" charset="0"/>
+              <a:buChar char="•"/>
+              <a:defRPr sz="1800" kern="1200">
+                <a:solidFill>
+                  <a:schemeClr val="tx1"/>
+                </a:solidFill>
+                <a:latin typeface="+mn-lt"/>
+                <a:ea typeface="+mn-ea"/>
+                <a:cs typeface="+mn-cs"/>
+              </a:defRPr>
+            </a:lvl5pPr>
+            <a:lvl6pPr marL="2514600" indent="-228600" algn="l" defTabSz="914400" rtl="0" eaLnBrk="1" latinLnBrk="0" hangingPunct="1">
+              <a:lnSpc>
+                <a:spcPct val="90000"/>
+              </a:lnSpc>
+              <a:spcBef>
+                <a:spcPts val="500"/>
+              </a:spcBef>
+              <a:buFont typeface="Arial" panose="020B0604020202020204" pitchFamily="34" charset="0"/>
+              <a:buChar char="•"/>
+              <a:defRPr sz="1800" kern="1200">
+                <a:solidFill>
+                  <a:schemeClr val="tx1"/>
+                </a:solidFill>
+                <a:latin typeface="+mn-lt"/>
+                <a:ea typeface="+mn-ea"/>
+                <a:cs typeface="+mn-cs"/>
+              </a:defRPr>
+            </a:lvl6pPr>
+            <a:lvl7pPr marL="2971800" indent="-228600" algn="l" defTabSz="914400" rtl="0" eaLnBrk="1" latinLnBrk="0" hangingPunct="1">
+              <a:lnSpc>
+                <a:spcPct val="90000"/>
+              </a:lnSpc>
+              <a:spcBef>
+                <a:spcPts val="500"/>
+              </a:spcBef>
+              <a:buFont typeface="Arial" panose="020B0604020202020204" pitchFamily="34" charset="0"/>
+              <a:buChar char="•"/>
+              <a:defRPr sz="1800" kern="1200">
+                <a:solidFill>
+                  <a:schemeClr val="tx1"/>
+                </a:solidFill>
+                <a:latin typeface="+mn-lt"/>
+                <a:ea typeface="+mn-ea"/>
+                <a:cs typeface="+mn-cs"/>
+              </a:defRPr>
+            </a:lvl7pPr>
+            <a:lvl8pPr marL="3429000" indent="-228600" algn="l" defTabSz="914400" rtl="0" eaLnBrk="1" latinLnBrk="0" hangingPunct="1">
+              <a:lnSpc>
+                <a:spcPct val="90000"/>
+              </a:lnSpc>
+              <a:spcBef>
+                <a:spcPts val="500"/>
+              </a:spcBef>
+              <a:buFont typeface="Arial" panose="020B0604020202020204" pitchFamily="34" charset="0"/>
+              <a:buChar char="•"/>
+              <a:defRPr sz="1800" kern="1200">
+                <a:solidFill>
+                  <a:schemeClr val="tx1"/>
+                </a:solidFill>
+                <a:latin typeface="+mn-lt"/>
+                <a:ea typeface="+mn-ea"/>
+                <a:cs typeface="+mn-cs"/>
+              </a:defRPr>
+            </a:lvl8pPr>
+            <a:lvl9pPr marL="3886200" indent="-228600" algn="l" defTabSz="914400" rtl="0" eaLnBrk="1" latinLnBrk="0" hangingPunct="1">
+              <a:lnSpc>
+                <a:spcPct val="90000"/>
+              </a:lnSpc>
+              <a:spcBef>
+                <a:spcPts val="500"/>
+              </a:spcBef>
+              <a:buFont typeface="Arial" panose="020B0604020202020204" pitchFamily="34" charset="0"/>
+              <a:buChar char="•"/>
+              <a:defRPr sz="1800" kern="1200">
+                <a:solidFill>
+                  <a:schemeClr val="tx1"/>
+                </a:solidFill>
+                <a:latin typeface="+mn-lt"/>
+                <a:ea typeface="+mn-ea"/>
+                <a:cs typeface="+mn-cs"/>
+              </a:defRPr>
+            </a:lvl9pPr>
+          </a:lstStyle>
+          <a:p>
+            <a:pPr marL="0" indent="0">
+              <a:buFont typeface="Arial" panose="020B0604020202020204" pitchFamily="34" charset="0"/>
+              <a:buNone/>
+            </a:pPr>
+            <a:r>
+              <a:rPr lang="en-GB" dirty="0"/>
+              <a:t>Same slope, looks good</a:t>
+            </a:r>
+            <a:endParaRPr lang="en-GB" dirty="0">
+              <a:sym typeface="Wingdings" panose="05000000000000000000" pitchFamily="2" charset="2"/>
+            </a:endParaRPr>
+          </a:p>
+        </p:txBody>
+      </p:sp>
+      <p:pic>
+        <p:nvPicPr>
+          <p:cNvPr id="4" name="Picture 3">
+            <a:extLst>
+              <a:ext uri="{FF2B5EF4-FFF2-40B4-BE49-F238E27FC236}">
+                <a16:creationId xmlns:a16="http://schemas.microsoft.com/office/drawing/2014/main" id="{703B8D28-5F86-4C0E-99C4-C404DE30E9B3}"/>
+              </a:ext>
+            </a:extLst>
+          </p:cNvPr>
+          <p:cNvPicPr>
+            <a:picLocks noChangeAspect="1"/>
+          </p:cNvPicPr>
+          <p:nvPr/>
+        </p:nvPicPr>
+        <p:blipFill>
+          <a:blip r:embed="rId3"/>
+          <a:stretch>
+            <a:fillRect/>
+          </a:stretch>
+        </p:blipFill>
+        <p:spPr>
+          <a:xfrm>
+            <a:off x="495169" y="2618943"/>
+            <a:ext cx="3846580" cy="2966936"/>
+          </a:xfrm>
+          <a:prstGeom prst="rect">
+            <a:avLst/>
+          </a:prstGeom>
+        </p:spPr>
+      </p:pic>
+    </p:spTree>
+    <p:extLst>
+      <p:ext uri="{BB962C8B-B14F-4D97-AF65-F5344CB8AC3E}">
+        <p14:creationId xmlns:p14="http://schemas.microsoft.com/office/powerpoint/2010/main" val="3289749650"/>
       </p:ext>
     </p:extLst>
   </p:cSld>

</xml_diff>